<commit_message>
updating the behavior program part
</commit_message>
<xml_diff>
--- a/docs/Misc/Pictures.pptx
+++ b/docs/Misc/Pictures.pptx
@@ -7,6 +7,7 @@
   <p:sldIdLst>
     <p:sldId id="256" r:id="rId2"/>
     <p:sldId id="257" r:id="rId3"/>
+    <p:sldId id="258" r:id="rId4"/>
   </p:sldIdLst>
   <p:sldSz cx="12192000" cy="6858000"/>
   <p:notesSz cx="6858000" cy="9144000"/>
@@ -3951,751 +3952,42 @@
       </p:grpSpPr>
       <p:grpSp>
         <p:nvGrpSpPr>
-          <p:cNvPr id="56" name="グループ化 55"/>
+          <p:cNvPr id="128" name="グループ化 127"/>
           <p:cNvGrpSpPr/>
           <p:nvPr/>
         </p:nvGrpSpPr>
         <p:grpSpPr>
           <a:xfrm>
-            <a:off x="5102334" y="4003323"/>
-            <a:ext cx="1533437" cy="1019346"/>
-            <a:chOff x="5536674" y="4026183"/>
-            <a:chExt cx="1533437" cy="1019346"/>
+            <a:off x="2689775" y="2253315"/>
+            <a:ext cx="3945996" cy="3111856"/>
+            <a:chOff x="2689775" y="2253315"/>
+            <a:chExt cx="3945996" cy="3111856"/>
           </a:xfrm>
         </p:grpSpPr>
-        <p:pic>
-          <p:nvPicPr>
-            <p:cNvPr id="40" name="図 39"/>
-            <p:cNvPicPr>
-              <a:picLocks noChangeAspect="1"/>
-            </p:cNvPicPr>
-            <p:nvPr/>
-          </p:nvPicPr>
-          <p:blipFill>
-            <a:blip r:embed="rId2">
-              <a:duotone>
-                <a:schemeClr val="bg2">
-                  <a:shade val="45000"/>
-                  <a:satMod val="135000"/>
-                </a:schemeClr>
-                <a:prstClr val="white"/>
-              </a:duotone>
-              <a:extLst>
-                <a:ext uri="{28A0092B-C50C-407E-A947-70E740481C1C}">
-                  <a14:useLocalDpi xmlns:a14="http://schemas.microsoft.com/office/drawing/2010/main" val="0"/>
-                </a:ext>
-              </a:extLst>
-            </a:blip>
-            <a:stretch>
-              <a:fillRect/>
-            </a:stretch>
-          </p:blipFill>
-          <p:spPr>
-            <a:xfrm rot="20528720">
-              <a:off x="5706258" y="4190902"/>
-              <a:ext cx="839423" cy="839423"/>
-            </a:xfrm>
-            <a:prstGeom prst="rect">
-              <a:avLst/>
-            </a:prstGeom>
-            <a:scene3d>
-              <a:camera prst="isometricTopUp"/>
-              <a:lightRig rig="threePt" dir="t"/>
-            </a:scene3d>
-          </p:spPr>
-        </p:pic>
         <p:grpSp>
           <p:nvGrpSpPr>
-            <p:cNvPr id="33" name="グループ化 32"/>
+            <p:cNvPr id="56" name="グループ化 55"/>
             <p:cNvGrpSpPr/>
             <p:nvPr/>
           </p:nvGrpSpPr>
           <p:grpSpPr>
             <a:xfrm>
-              <a:off x="5536674" y="4066039"/>
-              <a:ext cx="1187823" cy="979490"/>
-              <a:chOff x="3981742" y="2955287"/>
-              <a:chExt cx="1187823" cy="979490"/>
-            </a:xfrm>
-          </p:grpSpPr>
-          <p:cxnSp>
-            <p:nvCxnSpPr>
-              <p:cNvPr id="34" name="直線矢印コネクタ 33"/>
-              <p:cNvCxnSpPr/>
-              <p:nvPr/>
-            </p:nvCxnSpPr>
-            <p:spPr>
-              <a:xfrm flipV="1">
-                <a:off x="4556535" y="2971679"/>
-                <a:ext cx="0" cy="516477"/>
-              </a:xfrm>
-              <a:prstGeom prst="straightConnector1">
-                <a:avLst/>
-              </a:prstGeom>
-              <a:ln w="12700">
-                <a:solidFill>
-                  <a:srgbClr val="2300DC"/>
-                </a:solidFill>
-                <a:tailEnd type="triangle"/>
-              </a:ln>
-            </p:spPr>
-            <p:style>
-              <a:lnRef idx="1">
-                <a:schemeClr val="accent1"/>
-              </a:lnRef>
-              <a:fillRef idx="0">
-                <a:schemeClr val="accent1"/>
-              </a:fillRef>
-              <a:effectRef idx="0">
-                <a:schemeClr val="accent1"/>
-              </a:effectRef>
-              <a:fontRef idx="minor">
-                <a:schemeClr val="tx1"/>
-              </a:fontRef>
-            </p:style>
-          </p:cxnSp>
-          <p:cxnSp>
-            <p:nvCxnSpPr>
-              <p:cNvPr id="35" name="直線矢印コネクタ 34"/>
-              <p:cNvCxnSpPr>
-                <a:endCxn id="39" idx="3"/>
-              </p:cNvCxnSpPr>
-              <p:nvPr/>
-            </p:nvCxnSpPr>
-            <p:spPr>
-              <a:xfrm flipH="1">
-                <a:off x="4180440" y="3488156"/>
-                <a:ext cx="376095" cy="323511"/>
-              </a:xfrm>
-              <a:prstGeom prst="straightConnector1">
-                <a:avLst/>
-              </a:prstGeom>
-              <a:ln w="12700">
-                <a:solidFill>
-                  <a:srgbClr val="800000"/>
-                </a:solidFill>
-                <a:tailEnd type="triangle"/>
-              </a:ln>
-            </p:spPr>
-            <p:style>
-              <a:lnRef idx="1">
-                <a:schemeClr val="accent1"/>
-              </a:lnRef>
-              <a:fillRef idx="0">
-                <a:schemeClr val="accent1"/>
-              </a:fillRef>
-              <a:effectRef idx="0">
-                <a:schemeClr val="accent1"/>
-              </a:effectRef>
-              <a:fontRef idx="minor">
-                <a:schemeClr val="tx1"/>
-              </a:fontRef>
-            </p:style>
-          </p:cxnSp>
-          <p:cxnSp>
-            <p:nvCxnSpPr>
-              <p:cNvPr id="36" name="直線矢印コネクタ 35"/>
-              <p:cNvCxnSpPr/>
-              <p:nvPr/>
-            </p:nvCxnSpPr>
-            <p:spPr>
-              <a:xfrm>
-                <a:off x="4556535" y="3483471"/>
-                <a:ext cx="513680" cy="138486"/>
-              </a:xfrm>
-              <a:prstGeom prst="straightConnector1">
-                <a:avLst/>
-              </a:prstGeom>
-              <a:ln w="12700">
-                <a:solidFill>
-                  <a:srgbClr val="008000"/>
-                </a:solidFill>
-                <a:tailEnd type="triangle"/>
-              </a:ln>
-            </p:spPr>
-            <p:style>
-              <a:lnRef idx="1">
-                <a:schemeClr val="accent1"/>
-              </a:lnRef>
-              <a:fillRef idx="0">
-                <a:schemeClr val="accent1"/>
-              </a:fillRef>
-              <a:effectRef idx="0">
-                <a:schemeClr val="accent1"/>
-              </a:effectRef>
-              <a:fontRef idx="minor">
-                <a:schemeClr val="tx1"/>
-              </a:fontRef>
-            </p:style>
-          </p:cxnSp>
-          <p:sp>
-            <p:nvSpPr>
-              <p:cNvPr id="37" name="テキスト ボックス 36"/>
-              <p:cNvSpPr txBox="1"/>
-              <p:nvPr/>
-            </p:nvSpPr>
-            <p:spPr>
-              <a:xfrm>
-                <a:off x="4568165" y="2955287"/>
-                <a:ext cx="198698" cy="246221"/>
-              </a:xfrm>
-              <a:prstGeom prst="rect">
-                <a:avLst/>
-              </a:prstGeom>
-              <a:noFill/>
-            </p:spPr>
-            <p:txBody>
-              <a:bodyPr wrap="square" rtlCol="0">
-                <a:spAutoFit/>
-              </a:bodyPr>
-              <a:lstStyle/>
-              <a:p>
-                <a:r>
-                  <a:rPr lang="en-US" sz="1000" dirty="0" smtClean="0">
-                    <a:solidFill>
-                      <a:srgbClr val="2300DC"/>
-                    </a:solidFill>
-                  </a:rPr>
-                  <a:t>Z</a:t>
-                </a:r>
-                <a:endParaRPr lang="en-US" sz="1000" dirty="0">
-                  <a:solidFill>
-                    <a:srgbClr val="2300DC"/>
-                  </a:solidFill>
-                </a:endParaRPr>
-              </a:p>
-            </p:txBody>
-          </p:sp>
-          <p:sp>
-            <p:nvSpPr>
-              <p:cNvPr id="38" name="テキスト ボックス 37"/>
-              <p:cNvSpPr txBox="1"/>
-              <p:nvPr/>
-            </p:nvSpPr>
-            <p:spPr>
-              <a:xfrm>
-                <a:off x="4970867" y="3376750"/>
-                <a:ext cx="198698" cy="246221"/>
-              </a:xfrm>
-              <a:prstGeom prst="rect">
-                <a:avLst/>
-              </a:prstGeom>
-              <a:noFill/>
-            </p:spPr>
-            <p:txBody>
-              <a:bodyPr wrap="square" rtlCol="0">
-                <a:spAutoFit/>
-              </a:bodyPr>
-              <a:lstStyle/>
-              <a:p>
-                <a:r>
-                  <a:rPr lang="en-US" sz="1000" dirty="0" smtClean="0">
-                    <a:solidFill>
-                      <a:srgbClr val="008000"/>
-                    </a:solidFill>
-                  </a:rPr>
-                  <a:t>Y</a:t>
-                </a:r>
-                <a:endParaRPr lang="en-US" sz="1000" dirty="0">
-                  <a:solidFill>
-                    <a:srgbClr val="008000"/>
-                  </a:solidFill>
-                </a:endParaRPr>
-              </a:p>
-            </p:txBody>
-          </p:sp>
-          <p:sp>
-            <p:nvSpPr>
-              <p:cNvPr id="39" name="テキスト ボックス 38"/>
-              <p:cNvSpPr txBox="1"/>
-              <p:nvPr/>
-            </p:nvSpPr>
-            <p:spPr>
-              <a:xfrm>
-                <a:off x="3981742" y="3688556"/>
-                <a:ext cx="198698" cy="246221"/>
-              </a:xfrm>
-              <a:prstGeom prst="rect">
-                <a:avLst/>
-              </a:prstGeom>
-              <a:noFill/>
-            </p:spPr>
-            <p:txBody>
-              <a:bodyPr wrap="square" rtlCol="0">
-                <a:spAutoFit/>
-              </a:bodyPr>
-              <a:lstStyle/>
-              <a:p>
-                <a:r>
-                  <a:rPr lang="en-US" sz="1000" dirty="0" smtClean="0">
-                    <a:solidFill>
-                      <a:srgbClr val="800000"/>
-                    </a:solidFill>
-                  </a:rPr>
-                  <a:t>X</a:t>
-                </a:r>
-                <a:endParaRPr lang="en-US" sz="1000" dirty="0">
-                  <a:solidFill>
-                    <a:srgbClr val="800000"/>
-                  </a:solidFill>
-                </a:endParaRPr>
-              </a:p>
-            </p:txBody>
-          </p:sp>
-        </p:grpSp>
-        <p:sp>
-          <p:nvSpPr>
-            <p:cNvPr id="50" name="テキスト ボックス 49"/>
-            <p:cNvSpPr txBox="1"/>
-            <p:nvPr/>
-          </p:nvSpPr>
-          <p:spPr>
-            <a:xfrm>
-              <a:off x="6570551" y="4026183"/>
-              <a:ext cx="499560" cy="369332"/>
-            </a:xfrm>
-            <a:prstGeom prst="rect">
-              <a:avLst/>
-            </a:prstGeom>
-            <a:noFill/>
-          </p:spPr>
-          <p:txBody>
-            <a:bodyPr wrap="square" rtlCol="0">
-              <a:spAutoFit/>
-            </a:bodyPr>
-            <a:lstStyle/>
-            <a:p>
-              <a:r>
-                <a:rPr lang="en-US" dirty="0"/>
-                <a:t>F</a:t>
-              </a:r>
-              <a:r>
-                <a:rPr lang="en-US" baseline="-25000" dirty="0" smtClean="0"/>
-                <a:t>W</a:t>
-              </a:r>
-              <a:endParaRPr lang="en-US" baseline="-25000" dirty="0"/>
-            </a:p>
-          </p:txBody>
-        </p:sp>
-      </p:grpSp>
-      <p:grpSp>
-        <p:nvGrpSpPr>
-          <p:cNvPr id="57" name="グループ化 56"/>
-          <p:cNvGrpSpPr/>
-          <p:nvPr/>
-        </p:nvGrpSpPr>
-        <p:grpSpPr>
-          <a:xfrm>
-            <a:off x="3353973" y="2963854"/>
-            <a:ext cx="1269645" cy="2086254"/>
-            <a:chOff x="3829575" y="2978152"/>
-            <a:chExt cx="1269645" cy="2086254"/>
-          </a:xfrm>
-        </p:grpSpPr>
-        <p:pic>
-          <p:nvPicPr>
-            <p:cNvPr id="4" name="Shape 140"/>
-            <p:cNvPicPr preferRelativeResize="0"/>
-            <p:nvPr/>
-          </p:nvPicPr>
-          <p:blipFill>
-            <a:blip r:embed="rId3">
-              <a:alphaModFix/>
-            </a:blip>
-            <a:stretch>
-              <a:fillRect/>
-            </a:stretch>
-          </p:blipFill>
-          <p:spPr>
-            <a:xfrm>
-              <a:off x="4057485" y="3730606"/>
-              <a:ext cx="911850" cy="1333800"/>
-            </a:xfrm>
-            <a:prstGeom prst="rect">
-              <a:avLst/>
-            </a:prstGeom>
-            <a:noFill/>
-            <a:ln>
-              <a:noFill/>
-            </a:ln>
-          </p:spPr>
-        </p:pic>
-        <p:pic>
-          <p:nvPicPr>
-            <p:cNvPr id="5" name="Shape 141"/>
-            <p:cNvPicPr preferRelativeResize="0"/>
-            <p:nvPr/>
-          </p:nvPicPr>
-          <p:blipFill>
-            <a:blip r:embed="rId4">
-              <a:alphaModFix/>
-            </a:blip>
-            <a:stretch>
-              <a:fillRect/>
-            </a:stretch>
-          </p:blipFill>
-          <p:spPr>
-            <a:xfrm>
-              <a:off x="4353985" y="3488156"/>
-              <a:ext cx="405100" cy="288125"/>
-            </a:xfrm>
-            <a:prstGeom prst="rect">
-              <a:avLst/>
-            </a:prstGeom>
-            <a:noFill/>
-            <a:ln>
-              <a:noFill/>
-            </a:ln>
-          </p:spPr>
-        </p:pic>
-        <p:grpSp>
-          <p:nvGrpSpPr>
-            <p:cNvPr id="21" name="グループ化 20"/>
-            <p:cNvGrpSpPr/>
-            <p:nvPr/>
-          </p:nvGrpSpPr>
-          <p:grpSpPr>
-            <a:xfrm>
-              <a:off x="4057485" y="2978152"/>
-              <a:ext cx="1041735" cy="751540"/>
-              <a:chOff x="4057485" y="2978152"/>
-              <a:chExt cx="1041735" cy="751540"/>
-            </a:xfrm>
-          </p:grpSpPr>
-          <p:cxnSp>
-            <p:nvCxnSpPr>
-              <p:cNvPr id="7" name="直線矢印コネクタ 6"/>
-              <p:cNvCxnSpPr>
-                <a:stCxn id="5" idx="0"/>
-              </p:cNvCxnSpPr>
-              <p:nvPr/>
-            </p:nvCxnSpPr>
-            <p:spPr>
-              <a:xfrm flipV="1">
-                <a:off x="4556535" y="3138616"/>
-                <a:ext cx="0" cy="349540"/>
-              </a:xfrm>
-              <a:prstGeom prst="straightConnector1">
-                <a:avLst/>
-              </a:prstGeom>
-              <a:ln w="12700">
-                <a:solidFill>
-                  <a:srgbClr val="2300DC"/>
-                </a:solidFill>
-                <a:tailEnd type="triangle"/>
-              </a:ln>
-            </p:spPr>
-            <p:style>
-              <a:lnRef idx="1">
-                <a:schemeClr val="accent1"/>
-              </a:lnRef>
-              <a:fillRef idx="0">
-                <a:schemeClr val="accent1"/>
-              </a:fillRef>
-              <a:effectRef idx="0">
-                <a:schemeClr val="accent1"/>
-              </a:effectRef>
-              <a:fontRef idx="minor">
-                <a:schemeClr val="tx1"/>
-              </a:fontRef>
-            </p:style>
-          </p:cxnSp>
-          <p:cxnSp>
-            <p:nvCxnSpPr>
-              <p:cNvPr id="9" name="直線矢印コネクタ 8"/>
-              <p:cNvCxnSpPr>
-                <a:stCxn id="5" idx="0"/>
-              </p:cNvCxnSpPr>
-              <p:nvPr/>
-            </p:nvCxnSpPr>
-            <p:spPr>
-              <a:xfrm flipH="1">
-                <a:off x="4244975" y="3488156"/>
-                <a:ext cx="311560" cy="167743"/>
-              </a:xfrm>
-              <a:prstGeom prst="straightConnector1">
-                <a:avLst/>
-              </a:prstGeom>
-              <a:ln w="12700">
-                <a:solidFill>
-                  <a:srgbClr val="800000"/>
-                </a:solidFill>
-                <a:tailEnd type="triangle"/>
-              </a:ln>
-            </p:spPr>
-            <p:style>
-              <a:lnRef idx="1">
-                <a:schemeClr val="accent1"/>
-              </a:lnRef>
-              <a:fillRef idx="0">
-                <a:schemeClr val="accent1"/>
-              </a:fillRef>
-              <a:effectRef idx="0">
-                <a:schemeClr val="accent1"/>
-              </a:effectRef>
-              <a:fontRef idx="minor">
-                <a:schemeClr val="tx1"/>
-              </a:fontRef>
-            </p:style>
-          </p:cxnSp>
-          <p:cxnSp>
-            <p:nvCxnSpPr>
-              <p:cNvPr id="11" name="直線矢印コネクタ 10"/>
-              <p:cNvCxnSpPr/>
-              <p:nvPr/>
-            </p:nvCxnSpPr>
-            <p:spPr>
-              <a:xfrm>
-                <a:off x="4556535" y="3483471"/>
-                <a:ext cx="405100" cy="53545"/>
-              </a:xfrm>
-              <a:prstGeom prst="straightConnector1">
-                <a:avLst/>
-              </a:prstGeom>
-              <a:ln w="12700">
-                <a:solidFill>
-                  <a:srgbClr val="008000"/>
-                </a:solidFill>
-                <a:tailEnd type="triangle"/>
-              </a:ln>
-            </p:spPr>
-            <p:style>
-              <a:lnRef idx="1">
-                <a:schemeClr val="accent1"/>
-              </a:lnRef>
-              <a:fillRef idx="0">
-                <a:schemeClr val="accent1"/>
-              </a:fillRef>
-              <a:effectRef idx="0">
-                <a:schemeClr val="accent1"/>
-              </a:effectRef>
-              <a:fontRef idx="minor">
-                <a:schemeClr val="tx1"/>
-              </a:fontRef>
-            </p:style>
-          </p:cxnSp>
-          <p:sp>
-            <p:nvSpPr>
-              <p:cNvPr id="18" name="テキスト ボックス 17"/>
-              <p:cNvSpPr txBox="1"/>
-              <p:nvPr/>
-            </p:nvSpPr>
-            <p:spPr>
-              <a:xfrm>
-                <a:off x="4513410" y="2978152"/>
-                <a:ext cx="198698" cy="246221"/>
-              </a:xfrm>
-              <a:prstGeom prst="rect">
-                <a:avLst/>
-              </a:prstGeom>
-              <a:noFill/>
-            </p:spPr>
-            <p:txBody>
-              <a:bodyPr wrap="square" rtlCol="0">
-                <a:spAutoFit/>
-              </a:bodyPr>
-              <a:lstStyle/>
-              <a:p>
-                <a:r>
-                  <a:rPr lang="en-US" sz="1000" dirty="0" smtClean="0">
-                    <a:solidFill>
-                      <a:srgbClr val="2300DC"/>
-                    </a:solidFill>
-                  </a:rPr>
-                  <a:t>Z</a:t>
-                </a:r>
-                <a:endParaRPr lang="en-US" sz="1000" dirty="0">
-                  <a:solidFill>
-                    <a:srgbClr val="2300DC"/>
-                  </a:solidFill>
-                </a:endParaRPr>
-              </a:p>
-            </p:txBody>
-          </p:sp>
-          <p:sp>
-            <p:nvSpPr>
-              <p:cNvPr id="19" name="テキスト ボックス 18"/>
-              <p:cNvSpPr txBox="1"/>
-              <p:nvPr/>
-            </p:nvSpPr>
-            <p:spPr>
-              <a:xfrm>
-                <a:off x="4900522" y="3447031"/>
-                <a:ext cx="198698" cy="246221"/>
-              </a:xfrm>
-              <a:prstGeom prst="rect">
-                <a:avLst/>
-              </a:prstGeom>
-              <a:noFill/>
-            </p:spPr>
-            <p:txBody>
-              <a:bodyPr wrap="square" rtlCol="0">
-                <a:spAutoFit/>
-              </a:bodyPr>
-              <a:lstStyle/>
-              <a:p>
-                <a:r>
-                  <a:rPr lang="en-US" sz="1000" dirty="0" smtClean="0">
-                    <a:solidFill>
-                      <a:srgbClr val="008000"/>
-                    </a:solidFill>
-                  </a:rPr>
-                  <a:t>Y</a:t>
-                </a:r>
-                <a:endParaRPr lang="en-US" sz="1000" dirty="0">
-                  <a:solidFill>
-                    <a:srgbClr val="008000"/>
-                  </a:solidFill>
-                </a:endParaRPr>
-              </a:p>
-            </p:txBody>
-          </p:sp>
-          <p:sp>
-            <p:nvSpPr>
-              <p:cNvPr id="20" name="テキスト ボックス 19"/>
-              <p:cNvSpPr txBox="1"/>
-              <p:nvPr/>
-            </p:nvSpPr>
-            <p:spPr>
-              <a:xfrm>
-                <a:off x="4057485" y="3483471"/>
-                <a:ext cx="198698" cy="246221"/>
-              </a:xfrm>
-              <a:prstGeom prst="rect">
-                <a:avLst/>
-              </a:prstGeom>
-              <a:noFill/>
-            </p:spPr>
-            <p:txBody>
-              <a:bodyPr wrap="square" rtlCol="0">
-                <a:spAutoFit/>
-              </a:bodyPr>
-              <a:lstStyle/>
-              <a:p>
-                <a:r>
-                  <a:rPr lang="en-US" sz="1000" dirty="0" smtClean="0">
-                    <a:solidFill>
-                      <a:srgbClr val="800000"/>
-                    </a:solidFill>
-                  </a:rPr>
-                  <a:t>X</a:t>
-                </a:r>
-                <a:endParaRPr lang="en-US" sz="1000" dirty="0">
-                  <a:solidFill>
-                    <a:srgbClr val="800000"/>
-                  </a:solidFill>
-                </a:endParaRPr>
-              </a:p>
-            </p:txBody>
-          </p:sp>
-        </p:grpSp>
-        <p:sp>
-          <p:nvSpPr>
-            <p:cNvPr id="51" name="テキスト ボックス 50"/>
-            <p:cNvSpPr txBox="1"/>
-            <p:nvPr/>
-          </p:nvSpPr>
-          <p:spPr>
-            <a:xfrm>
-              <a:off x="3829575" y="3048404"/>
-              <a:ext cx="499560" cy="369332"/>
-            </a:xfrm>
-            <a:prstGeom prst="rect">
-              <a:avLst/>
-            </a:prstGeom>
-            <a:noFill/>
-          </p:spPr>
-          <p:txBody>
-            <a:bodyPr wrap="square" rtlCol="0">
-              <a:spAutoFit/>
-            </a:bodyPr>
-            <a:lstStyle/>
-            <a:p>
-              <a:r>
-                <a:rPr lang="en-US" dirty="0"/>
-                <a:t>F</a:t>
-              </a:r>
-              <a:r>
-                <a:rPr lang="en-US" baseline="-25000" dirty="0" smtClean="0"/>
-                <a:t>M</a:t>
-              </a:r>
-              <a:endParaRPr lang="en-US" baseline="-25000" dirty="0"/>
-            </a:p>
-          </p:txBody>
-        </p:sp>
-        <p:sp>
-          <p:nvSpPr>
-            <p:cNvPr id="53" name="テキスト ボックス 52"/>
-            <p:cNvSpPr txBox="1"/>
-            <p:nvPr/>
-          </p:nvSpPr>
-          <p:spPr>
-            <a:xfrm>
-              <a:off x="3843739" y="4212840"/>
-              <a:ext cx="499560" cy="369332"/>
-            </a:xfrm>
-            <a:prstGeom prst="rect">
-              <a:avLst/>
-            </a:prstGeom>
-            <a:noFill/>
-          </p:spPr>
-          <p:txBody>
-            <a:bodyPr wrap="square" rtlCol="0">
-              <a:spAutoFit/>
-            </a:bodyPr>
-            <a:lstStyle/>
-            <a:p>
-              <a:r>
-                <a:rPr lang="en-US" dirty="0"/>
-                <a:t>F</a:t>
-              </a:r>
-              <a:r>
-                <a:rPr lang="en-US" baseline="-25000" dirty="0" smtClean="0"/>
-                <a:t>T</a:t>
-              </a:r>
-              <a:endParaRPr lang="en-US" baseline="-25000" dirty="0"/>
-            </a:p>
-          </p:txBody>
-        </p:sp>
-      </p:grpSp>
-      <p:grpSp>
-        <p:nvGrpSpPr>
-          <p:cNvPr id="55" name="グループ化 54"/>
-          <p:cNvGrpSpPr/>
-          <p:nvPr/>
-        </p:nvGrpSpPr>
-        <p:grpSpPr>
-          <a:xfrm>
-            <a:off x="4445158" y="2322043"/>
-            <a:ext cx="1596848" cy="1255344"/>
-            <a:chOff x="5191581" y="2111303"/>
-            <a:chExt cx="1596848" cy="1255344"/>
-          </a:xfrm>
-        </p:grpSpPr>
-        <p:grpSp>
-          <p:nvGrpSpPr>
-            <p:cNvPr id="32" name="グループ化 31"/>
-            <p:cNvGrpSpPr/>
-            <p:nvPr/>
-          </p:nvGrpSpPr>
-          <p:grpSpPr>
-            <a:xfrm>
-              <a:off x="5191581" y="2394283"/>
-              <a:ext cx="1596848" cy="972364"/>
-              <a:chOff x="5511621" y="2531412"/>
-              <a:chExt cx="1596848" cy="972364"/>
+              <a:off x="5102334" y="4003323"/>
+              <a:ext cx="1533437" cy="1019346"/>
+              <a:chOff x="5536674" y="4026183"/>
+              <a:chExt cx="1533437" cy="1019346"/>
             </a:xfrm>
           </p:grpSpPr>
           <p:pic>
             <p:nvPicPr>
-              <p:cNvPr id="31" name="図 30"/>
+              <p:cNvPr id="40" name="図 39"/>
               <p:cNvPicPr>
                 <a:picLocks noChangeAspect="1"/>
               </p:cNvPicPr>
               <p:nvPr/>
             </p:nvPicPr>
             <p:blipFill>
-              <a:blip r:embed="rId5" cstate="print">
+              <a:blip r:embed="rId2">
                 <a:duotone>
                   <a:schemeClr val="bg2">
                     <a:shade val="45000"/>
@@ -4714,75 +4006,43 @@
               </a:stretch>
             </p:blipFill>
             <p:spPr>
-              <a:xfrm>
-                <a:off x="5843344" y="2791875"/>
-                <a:ext cx="1265125" cy="711901"/>
+              <a:xfrm rot="20528720">
+                <a:off x="5706258" y="4190902"/>
+                <a:ext cx="839423" cy="839423"/>
               </a:xfrm>
               <a:prstGeom prst="rect">
                 <a:avLst/>
               </a:prstGeom>
+              <a:scene3d>
+                <a:camera prst="isometricTopUp"/>
+                <a:lightRig rig="threePt" dir="t"/>
+              </a:scene3d>
             </p:spPr>
           </p:pic>
           <p:grpSp>
             <p:nvGrpSpPr>
-              <p:cNvPr id="22" name="グループ化 21"/>
+              <p:cNvPr id="33" name="グループ化 32"/>
               <p:cNvGrpSpPr/>
               <p:nvPr/>
             </p:nvGrpSpPr>
             <p:grpSpPr>
               <a:xfrm>
-                <a:off x="5511621" y="2531412"/>
-                <a:ext cx="1041735" cy="751540"/>
-                <a:chOff x="4027005" y="3084832"/>
-                <a:chExt cx="1041735" cy="751540"/>
+                <a:off x="5536674" y="4066039"/>
+                <a:ext cx="1187823" cy="979490"/>
+                <a:chOff x="3981742" y="2955287"/>
+                <a:chExt cx="1187823" cy="979490"/>
               </a:xfrm>
             </p:grpSpPr>
             <p:cxnSp>
               <p:nvCxnSpPr>
-                <p:cNvPr id="23" name="直線矢印コネクタ 22"/>
+                <p:cNvPr id="34" name="直線矢印コネクタ 33"/>
                 <p:cNvCxnSpPr/>
                 <p:nvPr/>
               </p:nvCxnSpPr>
               <p:spPr>
                 <a:xfrm flipV="1">
-                  <a:off x="4526055" y="3245296"/>
-                  <a:ext cx="0" cy="349540"/>
-                </a:xfrm>
-                <a:prstGeom prst="straightConnector1">
-                  <a:avLst/>
-                </a:prstGeom>
-                <a:ln w="12700">
-                  <a:solidFill>
-                    <a:srgbClr val="008000"/>
-                  </a:solidFill>
-                  <a:tailEnd type="triangle"/>
-                </a:ln>
-              </p:spPr>
-              <p:style>
-                <a:lnRef idx="1">
-                  <a:schemeClr val="accent1"/>
-                </a:lnRef>
-                <a:fillRef idx="0">
-                  <a:schemeClr val="accent1"/>
-                </a:fillRef>
-                <a:effectRef idx="0">
-                  <a:schemeClr val="accent1"/>
-                </a:effectRef>
-                <a:fontRef idx="minor">
-                  <a:schemeClr val="tx1"/>
-                </a:fontRef>
-              </p:style>
-            </p:cxnSp>
-            <p:cxnSp>
-              <p:nvCxnSpPr>
-                <p:cNvPr id="24" name="直線矢印コネクタ 23"/>
-                <p:cNvCxnSpPr/>
-                <p:nvPr/>
-              </p:nvCxnSpPr>
-              <p:spPr>
-                <a:xfrm flipH="1">
-                  <a:off x="4214495" y="3594836"/>
-                  <a:ext cx="311560" cy="167743"/>
+                  <a:off x="4556535" y="2971679"/>
+                  <a:ext cx="0" cy="516477"/>
                 </a:xfrm>
                 <a:prstGeom prst="straightConnector1">
                   <a:avLst/>
@@ -4811,14 +4071,16 @@
             </p:cxnSp>
             <p:cxnSp>
               <p:nvCxnSpPr>
-                <p:cNvPr id="25" name="直線矢印コネクタ 24"/>
-                <p:cNvCxnSpPr/>
+                <p:cNvPr id="35" name="直線矢印コネクタ 34"/>
+                <p:cNvCxnSpPr>
+                  <a:endCxn id="39" idx="3"/>
+                </p:cNvCxnSpPr>
                 <p:nvPr/>
               </p:nvCxnSpPr>
               <p:spPr>
-                <a:xfrm>
-                  <a:off x="4526055" y="3590151"/>
-                  <a:ext cx="405100" cy="53545"/>
+                <a:xfrm flipH="1">
+                  <a:off x="4180440" y="3488156"/>
+                  <a:ext cx="376095" cy="323511"/>
                 </a:xfrm>
                 <a:prstGeom prst="straightConnector1">
                   <a:avLst/>
@@ -4845,15 +4107,89 @@
                 </a:fontRef>
               </p:style>
             </p:cxnSp>
+            <p:cxnSp>
+              <p:nvCxnSpPr>
+                <p:cNvPr id="36" name="直線矢印コネクタ 35"/>
+                <p:cNvCxnSpPr/>
+                <p:nvPr/>
+              </p:nvCxnSpPr>
+              <p:spPr>
+                <a:xfrm>
+                  <a:off x="4556535" y="3483471"/>
+                  <a:ext cx="513680" cy="138486"/>
+                </a:xfrm>
+                <a:prstGeom prst="straightConnector1">
+                  <a:avLst/>
+                </a:prstGeom>
+                <a:ln w="12700">
+                  <a:solidFill>
+                    <a:srgbClr val="008000"/>
+                  </a:solidFill>
+                  <a:tailEnd type="triangle"/>
+                </a:ln>
+              </p:spPr>
+              <p:style>
+                <a:lnRef idx="1">
+                  <a:schemeClr val="accent1"/>
+                </a:lnRef>
+                <a:fillRef idx="0">
+                  <a:schemeClr val="accent1"/>
+                </a:fillRef>
+                <a:effectRef idx="0">
+                  <a:schemeClr val="accent1"/>
+                </a:effectRef>
+                <a:fontRef idx="minor">
+                  <a:schemeClr val="tx1"/>
+                </a:fontRef>
+              </p:style>
+            </p:cxnSp>
             <p:sp>
               <p:nvSpPr>
-                <p:cNvPr id="26" name="テキスト ボックス 25"/>
+                <p:cNvPr id="37" name="テキスト ボックス 36"/>
                 <p:cNvSpPr txBox="1"/>
                 <p:nvPr/>
               </p:nvSpPr>
               <p:spPr>
                 <a:xfrm>
-                  <a:off x="4482930" y="3084832"/>
+                  <a:off x="4568165" y="2955287"/>
+                  <a:ext cx="198698" cy="246221"/>
+                </a:xfrm>
+                <a:prstGeom prst="rect">
+                  <a:avLst/>
+                </a:prstGeom>
+                <a:noFill/>
+              </p:spPr>
+              <p:txBody>
+                <a:bodyPr wrap="square" rtlCol="0">
+                  <a:spAutoFit/>
+                </a:bodyPr>
+                <a:lstStyle/>
+                <a:p>
+                  <a:r>
+                    <a:rPr lang="en-US" sz="1000" dirty="0" smtClean="0">
+                      <a:solidFill>
+                        <a:srgbClr val="2300DC"/>
+                      </a:solidFill>
+                    </a:rPr>
+                    <a:t>Z</a:t>
+                  </a:r>
+                  <a:endParaRPr lang="en-US" sz="1000" dirty="0">
+                    <a:solidFill>
+                      <a:srgbClr val="2300DC"/>
+                    </a:solidFill>
+                  </a:endParaRPr>
+                </a:p>
+              </p:txBody>
+            </p:sp>
+            <p:sp>
+              <p:nvSpPr>
+                <p:cNvPr id="38" name="テキスト ボックス 37"/>
+                <p:cNvSpPr txBox="1"/>
+                <p:nvPr/>
+              </p:nvSpPr>
+              <p:spPr>
+                <a:xfrm>
+                  <a:off x="4970867" y="3376750"/>
                   <a:ext cx="198698" cy="246221"/>
                 </a:xfrm>
                 <a:prstGeom prst="rect">
@@ -4885,13 +4221,13 @@
             </p:sp>
             <p:sp>
               <p:nvSpPr>
-                <p:cNvPr id="27" name="テキスト ボックス 26"/>
+                <p:cNvPr id="39" name="テキスト ボックス 38"/>
                 <p:cNvSpPr txBox="1"/>
                 <p:nvPr/>
               </p:nvSpPr>
               <p:spPr>
                 <a:xfrm>
-                  <a:off x="4870042" y="3553711"/>
+                  <a:off x="3981742" y="3688556"/>
                   <a:ext cx="198698" cy="246221"/>
                 </a:xfrm>
                 <a:prstGeom prst="rect">
@@ -4921,15 +4257,247 @@
                 </a:p>
               </p:txBody>
             </p:sp>
+          </p:grpSp>
+          <p:sp>
+            <p:nvSpPr>
+              <p:cNvPr id="50" name="テキスト ボックス 49"/>
+              <p:cNvSpPr txBox="1"/>
+              <p:nvPr/>
+            </p:nvSpPr>
+            <p:spPr>
+              <a:xfrm>
+                <a:off x="6570551" y="4026183"/>
+                <a:ext cx="499560" cy="369332"/>
+              </a:xfrm>
+              <a:prstGeom prst="rect">
+                <a:avLst/>
+              </a:prstGeom>
+              <a:noFill/>
+            </p:spPr>
+            <p:txBody>
+              <a:bodyPr wrap="square" rtlCol="0">
+                <a:spAutoFit/>
+              </a:bodyPr>
+              <a:lstStyle/>
+              <a:p>
+                <a:r>
+                  <a:rPr lang="en-US" dirty="0"/>
+                  <a:t>F</a:t>
+                </a:r>
+                <a:r>
+                  <a:rPr lang="en-US" baseline="-25000" dirty="0" smtClean="0"/>
+                  <a:t>W</a:t>
+                </a:r>
+                <a:endParaRPr lang="en-US" baseline="-25000" dirty="0"/>
+              </a:p>
+            </p:txBody>
+          </p:sp>
+        </p:grpSp>
+        <p:grpSp>
+          <p:nvGrpSpPr>
+            <p:cNvPr id="57" name="グループ化 56"/>
+            <p:cNvGrpSpPr/>
+            <p:nvPr/>
+          </p:nvGrpSpPr>
+          <p:grpSpPr>
+            <a:xfrm>
+              <a:off x="3353973" y="2963854"/>
+              <a:ext cx="1269645" cy="2086254"/>
+              <a:chOff x="3829575" y="2978152"/>
+              <a:chExt cx="1269645" cy="2086254"/>
+            </a:xfrm>
+          </p:grpSpPr>
+          <p:pic>
+            <p:nvPicPr>
+              <p:cNvPr id="4" name="Shape 140"/>
+              <p:cNvPicPr preferRelativeResize="0"/>
+              <p:nvPr/>
+            </p:nvPicPr>
+            <p:blipFill>
+              <a:blip r:embed="rId3">
+                <a:alphaModFix/>
+              </a:blip>
+              <a:stretch>
+                <a:fillRect/>
+              </a:stretch>
+            </p:blipFill>
+            <p:spPr>
+              <a:xfrm>
+                <a:off x="4057485" y="3730606"/>
+                <a:ext cx="911850" cy="1333800"/>
+              </a:xfrm>
+              <a:prstGeom prst="rect">
+                <a:avLst/>
+              </a:prstGeom>
+              <a:noFill/>
+              <a:ln>
+                <a:noFill/>
+              </a:ln>
+            </p:spPr>
+          </p:pic>
+          <p:pic>
+            <p:nvPicPr>
+              <p:cNvPr id="5" name="Shape 141"/>
+              <p:cNvPicPr preferRelativeResize="0"/>
+              <p:nvPr/>
+            </p:nvPicPr>
+            <p:blipFill>
+              <a:blip r:embed="rId4">
+                <a:alphaModFix/>
+              </a:blip>
+              <a:stretch>
+                <a:fillRect/>
+              </a:stretch>
+            </p:blipFill>
+            <p:spPr>
+              <a:xfrm>
+                <a:off x="4353985" y="3488156"/>
+                <a:ext cx="405100" cy="288125"/>
+              </a:xfrm>
+              <a:prstGeom prst="rect">
+                <a:avLst/>
+              </a:prstGeom>
+              <a:noFill/>
+              <a:ln>
+                <a:noFill/>
+              </a:ln>
+            </p:spPr>
+          </p:pic>
+          <p:grpSp>
+            <p:nvGrpSpPr>
+              <p:cNvPr id="21" name="グループ化 20"/>
+              <p:cNvGrpSpPr/>
+              <p:nvPr/>
+            </p:nvGrpSpPr>
+            <p:grpSpPr>
+              <a:xfrm>
+                <a:off x="4057485" y="2978152"/>
+                <a:ext cx="1041735" cy="751540"/>
+                <a:chOff x="4057485" y="2978152"/>
+                <a:chExt cx="1041735" cy="751540"/>
+              </a:xfrm>
+            </p:grpSpPr>
+            <p:cxnSp>
+              <p:nvCxnSpPr>
+                <p:cNvPr id="7" name="直線矢印コネクタ 6"/>
+                <p:cNvCxnSpPr>
+                  <a:stCxn id="5" idx="0"/>
+                </p:cNvCxnSpPr>
+                <p:nvPr/>
+              </p:nvCxnSpPr>
+              <p:spPr>
+                <a:xfrm flipV="1">
+                  <a:off x="4556535" y="3138616"/>
+                  <a:ext cx="0" cy="349540"/>
+                </a:xfrm>
+                <a:prstGeom prst="straightConnector1">
+                  <a:avLst/>
+                </a:prstGeom>
+                <a:ln w="12700">
+                  <a:solidFill>
+                    <a:srgbClr val="2300DC"/>
+                  </a:solidFill>
+                  <a:tailEnd type="triangle"/>
+                </a:ln>
+              </p:spPr>
+              <p:style>
+                <a:lnRef idx="1">
+                  <a:schemeClr val="accent1"/>
+                </a:lnRef>
+                <a:fillRef idx="0">
+                  <a:schemeClr val="accent1"/>
+                </a:fillRef>
+                <a:effectRef idx="0">
+                  <a:schemeClr val="accent1"/>
+                </a:effectRef>
+                <a:fontRef idx="minor">
+                  <a:schemeClr val="tx1"/>
+                </a:fontRef>
+              </p:style>
+            </p:cxnSp>
+            <p:cxnSp>
+              <p:nvCxnSpPr>
+                <p:cNvPr id="9" name="直線矢印コネクタ 8"/>
+                <p:cNvCxnSpPr>
+                  <a:stCxn id="5" idx="0"/>
+                </p:cNvCxnSpPr>
+                <p:nvPr/>
+              </p:nvCxnSpPr>
+              <p:spPr>
+                <a:xfrm flipH="1">
+                  <a:off x="4244975" y="3488156"/>
+                  <a:ext cx="311560" cy="167743"/>
+                </a:xfrm>
+                <a:prstGeom prst="straightConnector1">
+                  <a:avLst/>
+                </a:prstGeom>
+                <a:ln w="12700">
+                  <a:solidFill>
+                    <a:srgbClr val="800000"/>
+                  </a:solidFill>
+                  <a:tailEnd type="triangle"/>
+                </a:ln>
+              </p:spPr>
+              <p:style>
+                <a:lnRef idx="1">
+                  <a:schemeClr val="accent1"/>
+                </a:lnRef>
+                <a:fillRef idx="0">
+                  <a:schemeClr val="accent1"/>
+                </a:fillRef>
+                <a:effectRef idx="0">
+                  <a:schemeClr val="accent1"/>
+                </a:effectRef>
+                <a:fontRef idx="minor">
+                  <a:schemeClr val="tx1"/>
+                </a:fontRef>
+              </p:style>
+            </p:cxnSp>
+            <p:cxnSp>
+              <p:nvCxnSpPr>
+                <p:cNvPr id="11" name="直線矢印コネクタ 10"/>
+                <p:cNvCxnSpPr/>
+                <p:nvPr/>
+              </p:nvCxnSpPr>
+              <p:spPr>
+                <a:xfrm>
+                  <a:off x="4556535" y="3483471"/>
+                  <a:ext cx="405100" cy="53545"/>
+                </a:xfrm>
+                <a:prstGeom prst="straightConnector1">
+                  <a:avLst/>
+                </a:prstGeom>
+                <a:ln w="12700">
+                  <a:solidFill>
+                    <a:srgbClr val="008000"/>
+                  </a:solidFill>
+                  <a:tailEnd type="triangle"/>
+                </a:ln>
+              </p:spPr>
+              <p:style>
+                <a:lnRef idx="1">
+                  <a:schemeClr val="accent1"/>
+                </a:lnRef>
+                <a:fillRef idx="0">
+                  <a:schemeClr val="accent1"/>
+                </a:fillRef>
+                <a:effectRef idx="0">
+                  <a:schemeClr val="accent1"/>
+                </a:effectRef>
+                <a:fontRef idx="minor">
+                  <a:schemeClr val="tx1"/>
+                </a:fontRef>
+              </p:style>
+            </p:cxnSp>
             <p:sp>
               <p:nvSpPr>
-                <p:cNvPr id="28" name="テキスト ボックス 27"/>
+                <p:cNvPr id="18" name="テキスト ボックス 17"/>
                 <p:cNvSpPr txBox="1"/>
                 <p:nvPr/>
               </p:nvSpPr>
               <p:spPr>
                 <a:xfrm>
-                  <a:off x="4027005" y="3590151"/>
+                  <a:off x="4513410" y="2978152"/>
                   <a:ext cx="198698" cy="246221"/>
                 </a:xfrm>
                 <a:prstGeom prst="rect">
@@ -4959,18 +4527,669 @@
                 </a:p>
               </p:txBody>
             </p:sp>
+            <p:sp>
+              <p:nvSpPr>
+                <p:cNvPr id="19" name="テキスト ボックス 18"/>
+                <p:cNvSpPr txBox="1"/>
+                <p:nvPr/>
+              </p:nvSpPr>
+              <p:spPr>
+                <a:xfrm>
+                  <a:off x="4900522" y="3447031"/>
+                  <a:ext cx="198698" cy="246221"/>
+                </a:xfrm>
+                <a:prstGeom prst="rect">
+                  <a:avLst/>
+                </a:prstGeom>
+                <a:noFill/>
+              </p:spPr>
+              <p:txBody>
+                <a:bodyPr wrap="square" rtlCol="0">
+                  <a:spAutoFit/>
+                </a:bodyPr>
+                <a:lstStyle/>
+                <a:p>
+                  <a:r>
+                    <a:rPr lang="en-US" sz="1000" dirty="0" smtClean="0">
+                      <a:solidFill>
+                        <a:srgbClr val="008000"/>
+                      </a:solidFill>
+                    </a:rPr>
+                    <a:t>Y</a:t>
+                  </a:r>
+                  <a:endParaRPr lang="en-US" sz="1000" dirty="0">
+                    <a:solidFill>
+                      <a:srgbClr val="008000"/>
+                    </a:solidFill>
+                  </a:endParaRPr>
+                </a:p>
+              </p:txBody>
+            </p:sp>
+            <p:sp>
+              <p:nvSpPr>
+                <p:cNvPr id="20" name="テキスト ボックス 19"/>
+                <p:cNvSpPr txBox="1"/>
+                <p:nvPr/>
+              </p:nvSpPr>
+              <p:spPr>
+                <a:xfrm>
+                  <a:off x="4057485" y="3483471"/>
+                  <a:ext cx="198698" cy="246221"/>
+                </a:xfrm>
+                <a:prstGeom prst="rect">
+                  <a:avLst/>
+                </a:prstGeom>
+                <a:noFill/>
+              </p:spPr>
+              <p:txBody>
+                <a:bodyPr wrap="square" rtlCol="0">
+                  <a:spAutoFit/>
+                </a:bodyPr>
+                <a:lstStyle/>
+                <a:p>
+                  <a:r>
+                    <a:rPr lang="en-US" sz="1000" dirty="0" smtClean="0">
+                      <a:solidFill>
+                        <a:srgbClr val="800000"/>
+                      </a:solidFill>
+                    </a:rPr>
+                    <a:t>X</a:t>
+                  </a:r>
+                  <a:endParaRPr lang="en-US" sz="1000" dirty="0">
+                    <a:solidFill>
+                      <a:srgbClr val="800000"/>
+                    </a:solidFill>
+                  </a:endParaRPr>
+                </a:p>
+              </p:txBody>
+            </p:sp>
           </p:grpSp>
+          <p:sp>
+            <p:nvSpPr>
+              <p:cNvPr id="51" name="テキスト ボックス 50"/>
+              <p:cNvSpPr txBox="1"/>
+              <p:nvPr/>
+            </p:nvSpPr>
+            <p:spPr>
+              <a:xfrm>
+                <a:off x="3829575" y="3048404"/>
+                <a:ext cx="499560" cy="369332"/>
+              </a:xfrm>
+              <a:prstGeom prst="rect">
+                <a:avLst/>
+              </a:prstGeom>
+              <a:noFill/>
+            </p:spPr>
+            <p:txBody>
+              <a:bodyPr wrap="square" rtlCol="0">
+                <a:spAutoFit/>
+              </a:bodyPr>
+              <a:lstStyle/>
+              <a:p>
+                <a:r>
+                  <a:rPr lang="en-US" dirty="0"/>
+                  <a:t>F</a:t>
+                </a:r>
+                <a:r>
+                  <a:rPr lang="en-US" baseline="-25000" dirty="0" smtClean="0"/>
+                  <a:t>M</a:t>
+                </a:r>
+                <a:endParaRPr lang="en-US" baseline="-25000" dirty="0"/>
+              </a:p>
+            </p:txBody>
+          </p:sp>
+          <p:sp>
+            <p:nvSpPr>
+              <p:cNvPr id="53" name="テキスト ボックス 52"/>
+              <p:cNvSpPr txBox="1"/>
+              <p:nvPr/>
+            </p:nvSpPr>
+            <p:spPr>
+              <a:xfrm>
+                <a:off x="3843739" y="4212840"/>
+                <a:ext cx="499560" cy="369332"/>
+              </a:xfrm>
+              <a:prstGeom prst="rect">
+                <a:avLst/>
+              </a:prstGeom>
+              <a:noFill/>
+            </p:spPr>
+            <p:txBody>
+              <a:bodyPr wrap="square" rtlCol="0">
+                <a:spAutoFit/>
+              </a:bodyPr>
+              <a:lstStyle/>
+              <a:p>
+                <a:r>
+                  <a:rPr lang="en-US" dirty="0"/>
+                  <a:t>F</a:t>
+                </a:r>
+                <a:r>
+                  <a:rPr lang="en-US" baseline="-25000" dirty="0" smtClean="0"/>
+                  <a:t>T</a:t>
+                </a:r>
+                <a:endParaRPr lang="en-US" baseline="-25000" dirty="0"/>
+              </a:p>
+            </p:txBody>
+          </p:sp>
         </p:grpSp>
+        <p:grpSp>
+          <p:nvGrpSpPr>
+            <p:cNvPr id="55" name="グループ化 54"/>
+            <p:cNvGrpSpPr/>
+            <p:nvPr/>
+          </p:nvGrpSpPr>
+          <p:grpSpPr>
+            <a:xfrm>
+              <a:off x="4445158" y="2322043"/>
+              <a:ext cx="1596848" cy="1255344"/>
+              <a:chOff x="5191581" y="2111303"/>
+              <a:chExt cx="1596848" cy="1255344"/>
+            </a:xfrm>
+          </p:grpSpPr>
+          <p:grpSp>
+            <p:nvGrpSpPr>
+              <p:cNvPr id="32" name="グループ化 31"/>
+              <p:cNvGrpSpPr/>
+              <p:nvPr/>
+            </p:nvGrpSpPr>
+            <p:grpSpPr>
+              <a:xfrm>
+                <a:off x="5191581" y="2394283"/>
+                <a:ext cx="1596848" cy="972364"/>
+                <a:chOff x="5511621" y="2531412"/>
+                <a:chExt cx="1596848" cy="972364"/>
+              </a:xfrm>
+            </p:grpSpPr>
+            <p:pic>
+              <p:nvPicPr>
+                <p:cNvPr id="31" name="図 30"/>
+                <p:cNvPicPr>
+                  <a:picLocks noChangeAspect="1"/>
+                </p:cNvPicPr>
+                <p:nvPr/>
+              </p:nvPicPr>
+              <p:blipFill>
+                <a:blip r:embed="rId5" cstate="print">
+                  <a:duotone>
+                    <a:schemeClr val="bg2">
+                      <a:shade val="45000"/>
+                      <a:satMod val="135000"/>
+                    </a:schemeClr>
+                    <a:prstClr val="white"/>
+                  </a:duotone>
+                  <a:extLst>
+                    <a:ext uri="{28A0092B-C50C-407E-A947-70E740481C1C}">
+                      <a14:useLocalDpi xmlns:a14="http://schemas.microsoft.com/office/drawing/2010/main" val="0"/>
+                    </a:ext>
+                  </a:extLst>
+                </a:blip>
+                <a:stretch>
+                  <a:fillRect/>
+                </a:stretch>
+              </p:blipFill>
+              <p:spPr>
+                <a:xfrm>
+                  <a:off x="5843344" y="2791875"/>
+                  <a:ext cx="1265125" cy="711901"/>
+                </a:xfrm>
+                <a:prstGeom prst="rect">
+                  <a:avLst/>
+                </a:prstGeom>
+              </p:spPr>
+            </p:pic>
+            <p:grpSp>
+              <p:nvGrpSpPr>
+                <p:cNvPr id="22" name="グループ化 21"/>
+                <p:cNvGrpSpPr/>
+                <p:nvPr/>
+              </p:nvGrpSpPr>
+              <p:grpSpPr>
+                <a:xfrm>
+                  <a:off x="5511621" y="2531412"/>
+                  <a:ext cx="1041735" cy="751540"/>
+                  <a:chOff x="4027005" y="3084832"/>
+                  <a:chExt cx="1041735" cy="751540"/>
+                </a:xfrm>
+              </p:grpSpPr>
+              <p:cxnSp>
+                <p:nvCxnSpPr>
+                  <p:cNvPr id="23" name="直線矢印コネクタ 22"/>
+                  <p:cNvCxnSpPr/>
+                  <p:nvPr/>
+                </p:nvCxnSpPr>
+                <p:spPr>
+                  <a:xfrm flipV="1">
+                    <a:off x="4526055" y="3245296"/>
+                    <a:ext cx="0" cy="349540"/>
+                  </a:xfrm>
+                  <a:prstGeom prst="straightConnector1">
+                    <a:avLst/>
+                  </a:prstGeom>
+                  <a:ln w="12700">
+                    <a:solidFill>
+                      <a:srgbClr val="008000"/>
+                    </a:solidFill>
+                    <a:tailEnd type="triangle"/>
+                  </a:ln>
+                </p:spPr>
+                <p:style>
+                  <a:lnRef idx="1">
+                    <a:schemeClr val="accent1"/>
+                  </a:lnRef>
+                  <a:fillRef idx="0">
+                    <a:schemeClr val="accent1"/>
+                  </a:fillRef>
+                  <a:effectRef idx="0">
+                    <a:schemeClr val="accent1"/>
+                  </a:effectRef>
+                  <a:fontRef idx="minor">
+                    <a:schemeClr val="tx1"/>
+                  </a:fontRef>
+                </p:style>
+              </p:cxnSp>
+              <p:cxnSp>
+                <p:nvCxnSpPr>
+                  <p:cNvPr id="24" name="直線矢印コネクタ 23"/>
+                  <p:cNvCxnSpPr/>
+                  <p:nvPr/>
+                </p:nvCxnSpPr>
+                <p:spPr>
+                  <a:xfrm flipH="1">
+                    <a:off x="4214495" y="3594836"/>
+                    <a:ext cx="311560" cy="167743"/>
+                  </a:xfrm>
+                  <a:prstGeom prst="straightConnector1">
+                    <a:avLst/>
+                  </a:prstGeom>
+                  <a:ln w="12700">
+                    <a:solidFill>
+                      <a:srgbClr val="2300DC"/>
+                    </a:solidFill>
+                    <a:tailEnd type="triangle"/>
+                  </a:ln>
+                </p:spPr>
+                <p:style>
+                  <a:lnRef idx="1">
+                    <a:schemeClr val="accent1"/>
+                  </a:lnRef>
+                  <a:fillRef idx="0">
+                    <a:schemeClr val="accent1"/>
+                  </a:fillRef>
+                  <a:effectRef idx="0">
+                    <a:schemeClr val="accent1"/>
+                  </a:effectRef>
+                  <a:fontRef idx="minor">
+                    <a:schemeClr val="tx1"/>
+                  </a:fontRef>
+                </p:style>
+              </p:cxnSp>
+              <p:cxnSp>
+                <p:nvCxnSpPr>
+                  <p:cNvPr id="25" name="直線矢印コネクタ 24"/>
+                  <p:cNvCxnSpPr/>
+                  <p:nvPr/>
+                </p:nvCxnSpPr>
+                <p:spPr>
+                  <a:xfrm>
+                    <a:off x="4526055" y="3590151"/>
+                    <a:ext cx="405100" cy="53545"/>
+                  </a:xfrm>
+                  <a:prstGeom prst="straightConnector1">
+                    <a:avLst/>
+                  </a:prstGeom>
+                  <a:ln w="12700">
+                    <a:solidFill>
+                      <a:srgbClr val="800000"/>
+                    </a:solidFill>
+                    <a:tailEnd type="triangle"/>
+                  </a:ln>
+                </p:spPr>
+                <p:style>
+                  <a:lnRef idx="1">
+                    <a:schemeClr val="accent1"/>
+                  </a:lnRef>
+                  <a:fillRef idx="0">
+                    <a:schemeClr val="accent1"/>
+                  </a:fillRef>
+                  <a:effectRef idx="0">
+                    <a:schemeClr val="accent1"/>
+                  </a:effectRef>
+                  <a:fontRef idx="minor">
+                    <a:schemeClr val="tx1"/>
+                  </a:fontRef>
+                </p:style>
+              </p:cxnSp>
+              <p:sp>
+                <p:nvSpPr>
+                  <p:cNvPr id="26" name="テキスト ボックス 25"/>
+                  <p:cNvSpPr txBox="1"/>
+                  <p:nvPr/>
+                </p:nvSpPr>
+                <p:spPr>
+                  <a:xfrm>
+                    <a:off x="4482930" y="3084832"/>
+                    <a:ext cx="198698" cy="246221"/>
+                  </a:xfrm>
+                  <a:prstGeom prst="rect">
+                    <a:avLst/>
+                  </a:prstGeom>
+                  <a:noFill/>
+                </p:spPr>
+                <p:txBody>
+                  <a:bodyPr wrap="square" rtlCol="0">
+                    <a:spAutoFit/>
+                  </a:bodyPr>
+                  <a:lstStyle/>
+                  <a:p>
+                    <a:r>
+                      <a:rPr lang="en-US" sz="1000" dirty="0" smtClean="0">
+                        <a:solidFill>
+                          <a:srgbClr val="008000"/>
+                        </a:solidFill>
+                      </a:rPr>
+                      <a:t>Y</a:t>
+                    </a:r>
+                    <a:endParaRPr lang="en-US" sz="1000" dirty="0">
+                      <a:solidFill>
+                        <a:srgbClr val="008000"/>
+                      </a:solidFill>
+                    </a:endParaRPr>
+                  </a:p>
+                </p:txBody>
+              </p:sp>
+              <p:sp>
+                <p:nvSpPr>
+                  <p:cNvPr id="27" name="テキスト ボックス 26"/>
+                  <p:cNvSpPr txBox="1"/>
+                  <p:nvPr/>
+                </p:nvSpPr>
+                <p:spPr>
+                  <a:xfrm>
+                    <a:off x="4870042" y="3553711"/>
+                    <a:ext cx="198698" cy="246221"/>
+                  </a:xfrm>
+                  <a:prstGeom prst="rect">
+                    <a:avLst/>
+                  </a:prstGeom>
+                  <a:noFill/>
+                </p:spPr>
+                <p:txBody>
+                  <a:bodyPr wrap="square" rtlCol="0">
+                    <a:spAutoFit/>
+                  </a:bodyPr>
+                  <a:lstStyle/>
+                  <a:p>
+                    <a:r>
+                      <a:rPr lang="en-US" sz="1000" dirty="0" smtClean="0">
+                        <a:solidFill>
+                          <a:srgbClr val="800000"/>
+                        </a:solidFill>
+                      </a:rPr>
+                      <a:t>X</a:t>
+                    </a:r>
+                    <a:endParaRPr lang="en-US" sz="1000" dirty="0">
+                      <a:solidFill>
+                        <a:srgbClr val="800000"/>
+                      </a:solidFill>
+                    </a:endParaRPr>
+                  </a:p>
+                </p:txBody>
+              </p:sp>
+              <p:sp>
+                <p:nvSpPr>
+                  <p:cNvPr id="28" name="テキスト ボックス 27"/>
+                  <p:cNvSpPr txBox="1"/>
+                  <p:nvPr/>
+                </p:nvSpPr>
+                <p:spPr>
+                  <a:xfrm>
+                    <a:off x="4027005" y="3590151"/>
+                    <a:ext cx="198698" cy="246221"/>
+                  </a:xfrm>
+                  <a:prstGeom prst="rect">
+                    <a:avLst/>
+                  </a:prstGeom>
+                  <a:noFill/>
+                </p:spPr>
+                <p:txBody>
+                  <a:bodyPr wrap="square" rtlCol="0">
+                    <a:spAutoFit/>
+                  </a:bodyPr>
+                  <a:lstStyle/>
+                  <a:p>
+                    <a:r>
+                      <a:rPr lang="en-US" sz="1000" dirty="0" smtClean="0">
+                        <a:solidFill>
+                          <a:srgbClr val="2300DC"/>
+                        </a:solidFill>
+                      </a:rPr>
+                      <a:t>Z</a:t>
+                    </a:r>
+                    <a:endParaRPr lang="en-US" sz="1000" dirty="0">
+                      <a:solidFill>
+                        <a:srgbClr val="2300DC"/>
+                      </a:solidFill>
+                    </a:endParaRPr>
+                  </a:p>
+                </p:txBody>
+              </p:sp>
+            </p:grpSp>
+          </p:grpSp>
+          <p:sp>
+            <p:nvSpPr>
+              <p:cNvPr id="54" name="テキスト ボックス 53"/>
+              <p:cNvSpPr txBox="1"/>
+              <p:nvPr/>
+            </p:nvSpPr>
+            <p:spPr>
+              <a:xfrm>
+                <a:off x="5266922" y="2111303"/>
+                <a:ext cx="420420" cy="369332"/>
+              </a:xfrm>
+              <a:prstGeom prst="rect">
+                <a:avLst/>
+              </a:prstGeom>
+              <a:noFill/>
+            </p:spPr>
+            <p:txBody>
+              <a:bodyPr wrap="square" rtlCol="0">
+                <a:spAutoFit/>
+              </a:bodyPr>
+              <a:lstStyle/>
+              <a:p>
+                <a:r>
+                  <a:rPr lang="en-US" dirty="0"/>
+                  <a:t>F</a:t>
+                </a:r>
+                <a:r>
+                  <a:rPr lang="en-US" baseline="-25000" dirty="0" smtClean="0"/>
+                  <a:t>K</a:t>
+                </a:r>
+                <a:endParaRPr lang="en-US" baseline="-25000" dirty="0"/>
+              </a:p>
+            </p:txBody>
+          </p:sp>
+        </p:grpSp>
+        <p:cxnSp>
+          <p:nvCxnSpPr>
+            <p:cNvPr id="59" name="曲線コネクタ 58"/>
+            <p:cNvCxnSpPr>
+              <a:stCxn id="54" idx="1"/>
+              <a:endCxn id="51" idx="0"/>
+            </p:cNvCxnSpPr>
+            <p:nvPr/>
+          </p:nvCxnSpPr>
+          <p:spPr>
+            <a:xfrm rot="10800000" flipV="1">
+              <a:off x="3603753" y="2506708"/>
+              <a:ext cx="916746" cy="527397"/>
+            </a:xfrm>
+            <a:prstGeom prst="curvedConnector2">
+              <a:avLst/>
+            </a:prstGeom>
+            <a:ln w="12700">
+              <a:solidFill>
+                <a:schemeClr val="tx1">
+                  <a:lumMod val="85000"/>
+                  <a:lumOff val="15000"/>
+                </a:schemeClr>
+              </a:solidFill>
+              <a:tailEnd type="triangle"/>
+            </a:ln>
+          </p:spPr>
+          <p:style>
+            <a:lnRef idx="1">
+              <a:schemeClr val="accent1"/>
+            </a:lnRef>
+            <a:fillRef idx="0">
+              <a:schemeClr val="accent1"/>
+            </a:fillRef>
+            <a:effectRef idx="0">
+              <a:schemeClr val="accent1"/>
+            </a:effectRef>
+            <a:fontRef idx="minor">
+              <a:schemeClr val="tx1"/>
+            </a:fontRef>
+          </p:style>
+        </p:cxnSp>
+        <p:cxnSp>
+          <p:nvCxnSpPr>
+            <p:cNvPr id="70" name="曲線コネクタ 69"/>
+            <p:cNvCxnSpPr>
+              <a:stCxn id="53" idx="1"/>
+              <a:endCxn id="51" idx="1"/>
+            </p:cNvCxnSpPr>
+            <p:nvPr/>
+          </p:nvCxnSpPr>
+          <p:spPr>
+            <a:xfrm rot="10800000">
+              <a:off x="3353973" y="3218772"/>
+              <a:ext cx="14164" cy="1164436"/>
+            </a:xfrm>
+            <a:prstGeom prst="curvedConnector3">
+              <a:avLst>
+                <a:gd name="adj1" fmla="val 1713951"/>
+              </a:avLst>
+            </a:prstGeom>
+            <a:ln w="12700">
+              <a:solidFill>
+                <a:schemeClr val="bg2">
+                  <a:lumMod val="10000"/>
+                </a:schemeClr>
+              </a:solidFill>
+              <a:tailEnd type="triangle"/>
+            </a:ln>
+          </p:spPr>
+          <p:style>
+            <a:lnRef idx="1">
+              <a:schemeClr val="accent1"/>
+            </a:lnRef>
+            <a:fillRef idx="0">
+              <a:schemeClr val="accent1"/>
+            </a:fillRef>
+            <a:effectRef idx="0">
+              <a:schemeClr val="accent1"/>
+            </a:effectRef>
+            <a:fontRef idx="minor">
+              <a:schemeClr val="tx1"/>
+            </a:fontRef>
+          </p:style>
+        </p:cxnSp>
+        <p:cxnSp>
+          <p:nvCxnSpPr>
+            <p:cNvPr id="78" name="曲線コネクタ 77"/>
+            <p:cNvCxnSpPr>
+              <a:stCxn id="50" idx="2"/>
+              <a:endCxn id="53" idx="2"/>
+            </p:cNvCxnSpPr>
+            <p:nvPr/>
+          </p:nvCxnSpPr>
+          <p:spPr>
+            <a:xfrm rot="5400000">
+              <a:off x="4904345" y="3086227"/>
+              <a:ext cx="195219" cy="2768074"/>
+            </a:xfrm>
+            <a:prstGeom prst="curvedConnector3">
+              <a:avLst>
+                <a:gd name="adj1" fmla="val 517655"/>
+              </a:avLst>
+            </a:prstGeom>
+            <a:ln w="12700">
+              <a:solidFill>
+                <a:schemeClr val="bg2">
+                  <a:lumMod val="10000"/>
+                </a:schemeClr>
+              </a:solidFill>
+              <a:tailEnd type="triangle"/>
+            </a:ln>
+          </p:spPr>
+          <p:style>
+            <a:lnRef idx="1">
+              <a:schemeClr val="accent1"/>
+            </a:lnRef>
+            <a:fillRef idx="0">
+              <a:schemeClr val="accent1"/>
+            </a:fillRef>
+            <a:effectRef idx="0">
+              <a:schemeClr val="accent1"/>
+            </a:effectRef>
+            <a:fontRef idx="minor">
+              <a:schemeClr val="tx1"/>
+            </a:fontRef>
+          </p:style>
+        </p:cxnSp>
+        <p:cxnSp>
+          <p:nvCxnSpPr>
+            <p:cNvPr id="116" name="曲線コネクタ 115"/>
+            <p:cNvCxnSpPr>
+              <a:stCxn id="54" idx="3"/>
+              <a:endCxn id="50" idx="0"/>
+            </p:cNvCxnSpPr>
+            <p:nvPr/>
+          </p:nvCxnSpPr>
+          <p:spPr>
+            <a:xfrm>
+              <a:off x="4940919" y="2506709"/>
+              <a:ext cx="1445072" cy="1496614"/>
+            </a:xfrm>
+            <a:prstGeom prst="curvedConnector2">
+              <a:avLst/>
+            </a:prstGeom>
+            <a:ln w="12700">
+              <a:solidFill>
+                <a:schemeClr val="bg2">
+                  <a:lumMod val="10000"/>
+                </a:schemeClr>
+              </a:solidFill>
+              <a:tailEnd type="triangle"/>
+            </a:ln>
+          </p:spPr>
+          <p:style>
+            <a:lnRef idx="1">
+              <a:schemeClr val="accent1"/>
+            </a:lnRef>
+            <a:fillRef idx="0">
+              <a:schemeClr val="accent1"/>
+            </a:fillRef>
+            <a:effectRef idx="0">
+              <a:schemeClr val="accent1"/>
+            </a:effectRef>
+            <a:fontRef idx="minor">
+              <a:schemeClr val="tx1"/>
+            </a:fontRef>
+          </p:style>
+        </p:cxnSp>
         <p:sp>
           <p:nvSpPr>
-            <p:cNvPr id="54" name="テキスト ボックス 53"/>
+            <p:cNvPr id="123" name="テキスト ボックス 122"/>
             <p:cNvSpPr txBox="1"/>
             <p:nvPr/>
           </p:nvSpPr>
           <p:spPr>
             <a:xfrm>
-              <a:off x="5266922" y="2111303"/>
-              <a:ext cx="420420" cy="369332"/>
+              <a:off x="3603753" y="2253315"/>
+              <a:ext cx="615296" cy="369332"/>
             </a:xfrm>
             <a:prstGeom prst="rect">
               <a:avLst/>
@@ -4984,43 +5203,518 @@
             <a:lstStyle/>
             <a:p>
               <a:r>
-                <a:rPr lang="en-US" dirty="0"/>
-                <a:t>F</a:t>
+                <a:rPr lang="en-US" b="1" baseline="30000" dirty="0" smtClean="0"/>
+                <a:t>K</a:t>
               </a:r>
               <a:r>
-                <a:rPr lang="en-US" baseline="-25000" dirty="0" smtClean="0"/>
+                <a:rPr lang="en-US" b="1" dirty="0" smtClean="0"/>
+                <a:t>T</a:t>
+              </a:r>
+              <a:r>
+                <a:rPr lang="en-US" b="1" baseline="-25000" dirty="0" smtClean="0"/>
+                <a:t>M</a:t>
+              </a:r>
+              <a:endParaRPr lang="en-US" b="1" baseline="-25000" dirty="0"/>
+            </a:p>
+          </p:txBody>
+        </p:sp>
+        <p:sp>
+          <p:nvSpPr>
+            <p:cNvPr id="124" name="テキスト ボックス 123"/>
+            <p:cNvSpPr txBox="1"/>
+            <p:nvPr/>
+          </p:nvSpPr>
+          <p:spPr>
+            <a:xfrm>
+              <a:off x="2689775" y="3581497"/>
+              <a:ext cx="615296" cy="369332"/>
+            </a:xfrm>
+            <a:prstGeom prst="rect">
+              <a:avLst/>
+            </a:prstGeom>
+            <a:noFill/>
+          </p:spPr>
+          <p:txBody>
+            <a:bodyPr wrap="square" rtlCol="0">
+              <a:spAutoFit/>
+            </a:bodyPr>
+            <a:lstStyle/>
+            <a:p>
+              <a:r>
+                <a:rPr lang="en-US" b="1" baseline="30000" dirty="0" smtClean="0"/>
+                <a:t>T</a:t>
+              </a:r>
+              <a:r>
+                <a:rPr lang="en-US" b="1" dirty="0" smtClean="0"/>
+                <a:t>T</a:t>
+              </a:r>
+              <a:r>
+                <a:rPr lang="en-US" b="1" baseline="-25000" dirty="0" smtClean="0"/>
+                <a:t>M</a:t>
+              </a:r>
+              <a:endParaRPr lang="en-US" b="1" baseline="-25000" dirty="0"/>
+            </a:p>
+          </p:txBody>
+        </p:sp>
+        <p:sp>
+          <p:nvSpPr>
+            <p:cNvPr id="125" name="テキスト ボックス 124"/>
+            <p:cNvSpPr txBox="1"/>
+            <p:nvPr/>
+          </p:nvSpPr>
+          <p:spPr>
+            <a:xfrm>
+              <a:off x="4554846" y="4995839"/>
+              <a:ext cx="615296" cy="369332"/>
+            </a:xfrm>
+            <a:prstGeom prst="rect">
+              <a:avLst/>
+            </a:prstGeom>
+            <a:noFill/>
+          </p:spPr>
+          <p:txBody>
+            <a:bodyPr wrap="square" rtlCol="0">
+              <a:spAutoFit/>
+            </a:bodyPr>
+            <a:lstStyle/>
+            <a:p>
+              <a:r>
+                <a:rPr lang="en-US" b="1" baseline="30000" dirty="0" smtClean="0"/>
+                <a:t>W</a:t>
+              </a:r>
+              <a:r>
+                <a:rPr lang="en-US" b="1" dirty="0" smtClean="0"/>
+                <a:t>T</a:t>
+              </a:r>
+              <a:r>
+                <a:rPr lang="en-US" b="1" baseline="-25000" dirty="0" smtClean="0"/>
+                <a:t>T</a:t>
+              </a:r>
+              <a:endParaRPr lang="en-US" b="1" baseline="-25000" dirty="0"/>
+            </a:p>
+          </p:txBody>
+        </p:sp>
+        <p:sp>
+          <p:nvSpPr>
+            <p:cNvPr id="126" name="テキスト ボックス 125"/>
+            <p:cNvSpPr txBox="1"/>
+            <p:nvPr/>
+          </p:nvSpPr>
+          <p:spPr>
+            <a:xfrm>
+              <a:off x="5942688" y="2765487"/>
+              <a:ext cx="615296" cy="369332"/>
+            </a:xfrm>
+            <a:prstGeom prst="rect">
+              <a:avLst/>
+            </a:prstGeom>
+            <a:noFill/>
+          </p:spPr>
+          <p:txBody>
+            <a:bodyPr wrap="square" rtlCol="0">
+              <a:spAutoFit/>
+            </a:bodyPr>
+            <a:lstStyle/>
+            <a:p>
+              <a:r>
+                <a:rPr lang="en-US" b="1" baseline="30000" dirty="0" smtClean="0"/>
                 <a:t>K</a:t>
               </a:r>
-              <a:endParaRPr lang="en-US" baseline="-25000" dirty="0"/>
+              <a:r>
+                <a:rPr lang="en-US" b="1" dirty="0" smtClean="0"/>
+                <a:t>T</a:t>
+              </a:r>
+              <a:r>
+                <a:rPr lang="en-US" b="1" baseline="-25000" dirty="0" smtClean="0"/>
+                <a:t>W</a:t>
+              </a:r>
+              <a:endParaRPr lang="en-US" b="1" baseline="-25000" dirty="0"/>
             </a:p>
           </p:txBody>
         </p:sp>
       </p:grpSp>
+    </p:spTree>
+    <p:extLst>
+      <p:ext uri="{BB962C8B-B14F-4D97-AF65-F5344CB8AC3E}">
+        <p14:creationId xmlns:p14="http://schemas.microsoft.com/office/powerpoint/2010/main" val="2128383894"/>
+      </p:ext>
+    </p:extLst>
+  </p:cSld>
+  <p:clrMapOvr>
+    <a:masterClrMapping/>
+  </p:clrMapOvr>
+</p:sld>
+</file>
+
+<file path=ppt/slides/slide3.xml><?xml version="1.0" encoding="utf-8"?>
+<p:sld xmlns:a="http://schemas.openxmlformats.org/drawingml/2006/main" xmlns:r="http://schemas.openxmlformats.org/officeDocument/2006/relationships" xmlns:p="http://schemas.openxmlformats.org/presentationml/2006/main">
+  <p:cSld>
+    <p:spTree>
+      <p:nvGrpSpPr>
+        <p:cNvPr id="1" name=""/>
+        <p:cNvGrpSpPr/>
+        <p:nvPr/>
+      </p:nvGrpSpPr>
+      <p:grpSpPr>
+        <a:xfrm>
+          <a:off x="0" y="0"/>
+          <a:ext cx="0" cy="0"/>
+          <a:chOff x="0" y="0"/>
+          <a:chExt cx="0" cy="0"/>
+        </a:xfrm>
+      </p:grpSpPr>
+      <p:sp>
+        <p:nvSpPr>
+          <p:cNvPr id="307" name="正方形/長方形 306"/>
+          <p:cNvSpPr/>
+          <p:nvPr/>
+        </p:nvSpPr>
+        <p:spPr>
+          <a:xfrm>
+            <a:off x="2197419" y="1998820"/>
+            <a:ext cx="2771774" cy="2262188"/>
+          </a:xfrm>
+          <a:prstGeom prst="rect">
+            <a:avLst/>
+          </a:prstGeom>
+          <a:solidFill>
+            <a:schemeClr val="bg1"/>
+          </a:solidFill>
+        </p:spPr>
+        <p:style>
+          <a:lnRef idx="2">
+            <a:schemeClr val="dk1">
+              <a:shade val="50000"/>
+            </a:schemeClr>
+          </a:lnRef>
+          <a:fillRef idx="1">
+            <a:schemeClr val="dk1"/>
+          </a:fillRef>
+          <a:effectRef idx="0">
+            <a:schemeClr val="dk1"/>
+          </a:effectRef>
+          <a:fontRef idx="minor">
+            <a:schemeClr val="lt1"/>
+          </a:fontRef>
+        </p:style>
+        <p:txBody>
+          <a:bodyPr rtlCol="0" anchor="ctr"/>
+          <a:lstStyle/>
+          <a:p>
+            <a:pPr algn="ctr"/>
+            <a:endParaRPr lang="en-US"/>
+          </a:p>
+        </p:txBody>
+      </p:sp>
+      <p:sp>
+        <p:nvSpPr>
+          <p:cNvPr id="306" name="正方形/長方形 305"/>
+          <p:cNvSpPr/>
+          <p:nvPr/>
+        </p:nvSpPr>
+        <p:spPr>
+          <a:xfrm>
+            <a:off x="2112646" y="2101691"/>
+            <a:ext cx="2771774" cy="2262188"/>
+          </a:xfrm>
+          <a:prstGeom prst="rect">
+            <a:avLst/>
+          </a:prstGeom>
+          <a:solidFill>
+            <a:schemeClr val="bg1"/>
+          </a:solidFill>
+        </p:spPr>
+        <p:style>
+          <a:lnRef idx="2">
+            <a:schemeClr val="dk1">
+              <a:shade val="50000"/>
+            </a:schemeClr>
+          </a:lnRef>
+          <a:fillRef idx="1">
+            <a:schemeClr val="dk1"/>
+          </a:fillRef>
+          <a:effectRef idx="0">
+            <a:schemeClr val="dk1"/>
+          </a:effectRef>
+          <a:fontRef idx="minor">
+            <a:schemeClr val="lt1"/>
+          </a:fontRef>
+        </p:style>
+        <p:txBody>
+          <a:bodyPr rtlCol="0" anchor="ctr"/>
+          <a:lstStyle/>
+          <a:p>
+            <a:pPr algn="ctr"/>
+            <a:endParaRPr lang="en-US"/>
+          </a:p>
+        </p:txBody>
+      </p:sp>
+      <p:pic>
+        <p:nvPicPr>
+          <p:cNvPr id="302" name="図 301"/>
+          <p:cNvPicPr>
+            <a:picLocks noChangeAspect="1"/>
+          </p:cNvPicPr>
+          <p:nvPr/>
+        </p:nvPicPr>
+        <p:blipFill>
+          <a:blip r:embed="rId3" cstate="print">
+            <a:extLst>
+              <a:ext uri="{28A0092B-C50C-407E-A947-70E740481C1C}">
+                <a14:useLocalDpi xmlns:a14="http://schemas.microsoft.com/office/drawing/2010/main" val="0"/>
+              </a:ext>
+            </a:extLst>
+          </a:blip>
+          <a:stretch>
+            <a:fillRect/>
+          </a:stretch>
+        </p:blipFill>
+        <p:spPr>
+          <a:xfrm>
+            <a:off x="6096000" y="1243013"/>
+            <a:ext cx="4048125" cy="4371975"/>
+          </a:xfrm>
+          <a:prstGeom prst="rect">
+            <a:avLst/>
+          </a:prstGeom>
+        </p:spPr>
+      </p:pic>
+      <p:sp>
+        <p:nvSpPr>
+          <p:cNvPr id="303" name="正方形/長方形 302"/>
+          <p:cNvSpPr/>
+          <p:nvPr/>
+        </p:nvSpPr>
+        <p:spPr>
+          <a:xfrm>
+            <a:off x="2112646" y="1099899"/>
+            <a:ext cx="2771774" cy="776287"/>
+          </a:xfrm>
+          <a:prstGeom prst="rect">
+            <a:avLst/>
+          </a:prstGeom>
+          <a:solidFill>
+            <a:schemeClr val="bg1"/>
+          </a:solidFill>
+        </p:spPr>
+        <p:style>
+          <a:lnRef idx="2">
+            <a:schemeClr val="dk1">
+              <a:shade val="50000"/>
+            </a:schemeClr>
+          </a:lnRef>
+          <a:fillRef idx="1">
+            <a:schemeClr val="dk1"/>
+          </a:fillRef>
+          <a:effectRef idx="0">
+            <a:schemeClr val="dk1"/>
+          </a:effectRef>
+          <a:fontRef idx="minor">
+            <a:schemeClr val="lt1"/>
+          </a:fontRef>
+        </p:style>
+        <p:txBody>
+          <a:bodyPr rtlCol="0" anchor="ctr"/>
+          <a:lstStyle/>
+          <a:p>
+            <a:pPr algn="ctr"/>
+            <a:endParaRPr lang="en-US"/>
+          </a:p>
+        </p:txBody>
+      </p:sp>
+      <p:sp>
+        <p:nvSpPr>
+          <p:cNvPr id="304" name="正方形/長方形 303"/>
+          <p:cNvSpPr/>
+          <p:nvPr/>
+        </p:nvSpPr>
+        <p:spPr>
+          <a:xfrm>
+            <a:off x="2028826" y="2218372"/>
+            <a:ext cx="2771774" cy="2262188"/>
+          </a:xfrm>
+          <a:prstGeom prst="rect">
+            <a:avLst/>
+          </a:prstGeom>
+          <a:solidFill>
+            <a:schemeClr val="bg1"/>
+          </a:solidFill>
+        </p:spPr>
+        <p:style>
+          <a:lnRef idx="2">
+            <a:schemeClr val="dk1">
+              <a:shade val="50000"/>
+            </a:schemeClr>
+          </a:lnRef>
+          <a:fillRef idx="1">
+            <a:schemeClr val="dk1"/>
+          </a:fillRef>
+          <a:effectRef idx="0">
+            <a:schemeClr val="dk1"/>
+          </a:effectRef>
+          <a:fontRef idx="minor">
+            <a:schemeClr val="lt1"/>
+          </a:fontRef>
+        </p:style>
+        <p:txBody>
+          <a:bodyPr rtlCol="0" anchor="ctr"/>
+          <a:lstStyle/>
+          <a:p>
+            <a:pPr algn="ctr"/>
+            <a:endParaRPr lang="en-US"/>
+          </a:p>
+        </p:txBody>
+      </p:sp>
+      <p:sp>
+        <p:nvSpPr>
+          <p:cNvPr id="305" name="正方形/長方形 304"/>
+          <p:cNvSpPr/>
+          <p:nvPr/>
+        </p:nvSpPr>
+        <p:spPr>
+          <a:xfrm>
+            <a:off x="2112646" y="4618435"/>
+            <a:ext cx="2771774" cy="776287"/>
+          </a:xfrm>
+          <a:prstGeom prst="rect">
+            <a:avLst/>
+          </a:prstGeom>
+          <a:solidFill>
+            <a:schemeClr val="bg1"/>
+          </a:solidFill>
+        </p:spPr>
+        <p:style>
+          <a:lnRef idx="2">
+            <a:schemeClr val="dk1">
+              <a:shade val="50000"/>
+            </a:schemeClr>
+          </a:lnRef>
+          <a:fillRef idx="1">
+            <a:schemeClr val="dk1"/>
+          </a:fillRef>
+          <a:effectRef idx="0">
+            <a:schemeClr val="dk1"/>
+          </a:effectRef>
+          <a:fontRef idx="minor">
+            <a:schemeClr val="lt1"/>
+          </a:fontRef>
+        </p:style>
+        <p:txBody>
+          <a:bodyPr rtlCol="0" anchor="ctr"/>
+          <a:lstStyle/>
+          <a:p>
+            <a:pPr algn="ctr"/>
+            <a:endParaRPr lang="en-US"/>
+          </a:p>
+        </p:txBody>
+      </p:sp>
+      <p:sp>
+        <p:nvSpPr>
+          <p:cNvPr id="308" name="正方形/長方形 307"/>
+          <p:cNvSpPr/>
+          <p:nvPr/>
+        </p:nvSpPr>
+        <p:spPr>
+          <a:xfrm>
+            <a:off x="4071938" y="5664817"/>
+            <a:ext cx="2313623" cy="584714"/>
+          </a:xfrm>
+          <a:prstGeom prst="rect">
+            <a:avLst/>
+          </a:prstGeom>
+          <a:solidFill>
+            <a:schemeClr val="bg1"/>
+          </a:solidFill>
+        </p:spPr>
+        <p:style>
+          <a:lnRef idx="2">
+            <a:schemeClr val="dk1">
+              <a:shade val="50000"/>
+            </a:schemeClr>
+          </a:lnRef>
+          <a:fillRef idx="1">
+            <a:schemeClr val="dk1"/>
+          </a:fillRef>
+          <a:effectRef idx="0">
+            <a:schemeClr val="dk1"/>
+          </a:effectRef>
+          <a:fontRef idx="minor">
+            <a:schemeClr val="lt1"/>
+          </a:fontRef>
+        </p:style>
+        <p:txBody>
+          <a:bodyPr rtlCol="0" anchor="ctr"/>
+          <a:lstStyle/>
+          <a:p>
+            <a:pPr algn="ctr"/>
+            <a:endParaRPr lang="en-US"/>
+          </a:p>
+        </p:txBody>
+      </p:sp>
+      <p:sp>
+        <p:nvSpPr>
+          <p:cNvPr id="309" name="正方形/長方形 308"/>
+          <p:cNvSpPr/>
+          <p:nvPr/>
+        </p:nvSpPr>
+        <p:spPr>
+          <a:xfrm>
+            <a:off x="5258754" y="5664817"/>
+            <a:ext cx="1126807" cy="584714"/>
+          </a:xfrm>
+          <a:prstGeom prst="rect">
+            <a:avLst/>
+          </a:prstGeom>
+          <a:solidFill>
+            <a:schemeClr val="bg1"/>
+          </a:solidFill>
+        </p:spPr>
+        <p:style>
+          <a:lnRef idx="2">
+            <a:schemeClr val="dk1">
+              <a:shade val="50000"/>
+            </a:schemeClr>
+          </a:lnRef>
+          <a:fillRef idx="1">
+            <a:schemeClr val="dk1"/>
+          </a:fillRef>
+          <a:effectRef idx="0">
+            <a:schemeClr val="dk1"/>
+          </a:effectRef>
+          <a:fontRef idx="minor">
+            <a:schemeClr val="lt1"/>
+          </a:fontRef>
+        </p:style>
+        <p:txBody>
+          <a:bodyPr rtlCol="0" anchor="ctr"/>
+          <a:lstStyle/>
+          <a:p>
+            <a:pPr algn="ctr"/>
+            <a:endParaRPr lang="en-US" dirty="0"/>
+          </a:p>
+        </p:txBody>
+      </p:sp>
       <p:cxnSp>
         <p:nvCxnSpPr>
-          <p:cNvPr id="59" name="曲線コネクタ 58"/>
+          <p:cNvPr id="311" name="直線コネクタ 310"/>
           <p:cNvCxnSpPr>
-            <a:stCxn id="54" idx="1"/>
-            <a:endCxn id="51" idx="0"/>
+            <a:stCxn id="309" idx="1"/>
+            <a:endCxn id="308" idx="3"/>
           </p:cNvCxnSpPr>
           <p:nvPr/>
         </p:nvCxnSpPr>
         <p:spPr>
-          <a:xfrm rot="10800000" flipV="1">
-            <a:off x="3603753" y="2506708"/>
-            <a:ext cx="916746" cy="527397"/>
+          <a:xfrm>
+            <a:off x="5258754" y="5957174"/>
+            <a:ext cx="1126807" cy="0"/>
           </a:xfrm>
-          <a:prstGeom prst="curvedConnector2">
+          <a:prstGeom prst="line">
             <a:avLst/>
           </a:prstGeom>
           <a:ln w="12700">
             <a:solidFill>
-              <a:schemeClr val="tx1">
-                <a:lumMod val="85000"/>
-                <a:lumOff val="15000"/>
-              </a:schemeClr>
+              <a:schemeClr val="tx1"/>
             </a:solidFill>
-            <a:tailEnd type="triangle"/>
           </a:ln>
         </p:spPr>
         <p:style>
@@ -5038,133 +5732,16 @@
           </a:fontRef>
         </p:style>
       </p:cxnSp>
-      <p:cxnSp>
-        <p:nvCxnSpPr>
-          <p:cNvPr id="70" name="曲線コネクタ 69"/>
-          <p:cNvCxnSpPr>
-            <a:stCxn id="53" idx="1"/>
-            <a:endCxn id="51" idx="1"/>
-          </p:cNvCxnSpPr>
+      <p:sp>
+        <p:nvSpPr>
+          <p:cNvPr id="312" name="テキスト ボックス 311"/>
+          <p:cNvSpPr txBox="1"/>
           <p:nvPr/>
-        </p:nvCxnSpPr>
-        <p:spPr>
-          <a:xfrm rot="10800000">
-            <a:off x="3353973" y="3218772"/>
-            <a:ext cx="14164" cy="1164436"/>
-          </a:xfrm>
-          <a:prstGeom prst="curvedConnector3">
-            <a:avLst>
-              <a:gd name="adj1" fmla="val 1713951"/>
-            </a:avLst>
-          </a:prstGeom>
-          <a:ln>
-            <a:tailEnd type="triangle"/>
-          </a:ln>
-        </p:spPr>
-        <p:style>
-          <a:lnRef idx="1">
-            <a:schemeClr val="accent1"/>
-          </a:lnRef>
-          <a:fillRef idx="0">
-            <a:schemeClr val="accent1"/>
-          </a:fillRef>
-          <a:effectRef idx="0">
-            <a:schemeClr val="accent1"/>
-          </a:effectRef>
-          <a:fontRef idx="minor">
-            <a:schemeClr val="tx1"/>
-          </a:fontRef>
-        </p:style>
-      </p:cxnSp>
-      <p:cxnSp>
-        <p:nvCxnSpPr>
-          <p:cNvPr id="78" name="曲線コネクタ 77"/>
-          <p:cNvCxnSpPr>
-            <a:stCxn id="50" idx="2"/>
-            <a:endCxn id="53" idx="2"/>
-          </p:cNvCxnSpPr>
-          <p:nvPr/>
-        </p:nvCxnSpPr>
-        <p:spPr>
-          <a:xfrm rot="5400000">
-            <a:off x="4904345" y="3086227"/>
-            <a:ext cx="195219" cy="2768074"/>
-          </a:xfrm>
-          <a:prstGeom prst="curvedConnector3">
-            <a:avLst>
-              <a:gd name="adj1" fmla="val 517655"/>
-            </a:avLst>
-          </a:prstGeom>
-          <a:ln>
-            <a:tailEnd type="triangle"/>
-          </a:ln>
-        </p:spPr>
-        <p:style>
-          <a:lnRef idx="1">
-            <a:schemeClr val="accent1"/>
-          </a:lnRef>
-          <a:fillRef idx="0">
-            <a:schemeClr val="accent1"/>
-          </a:fillRef>
-          <a:effectRef idx="0">
-            <a:schemeClr val="accent1"/>
-          </a:effectRef>
-          <a:fontRef idx="minor">
-            <a:schemeClr val="tx1"/>
-          </a:fontRef>
-        </p:style>
-      </p:cxnSp>
-      <p:cxnSp>
-        <p:nvCxnSpPr>
-          <p:cNvPr id="116" name="曲線コネクタ 115"/>
-          <p:cNvCxnSpPr>
-            <a:stCxn id="54" idx="3"/>
-            <a:endCxn id="50" idx="0"/>
-          </p:cNvCxnSpPr>
-          <p:nvPr/>
-        </p:nvCxnSpPr>
+        </p:nvSpPr>
         <p:spPr>
           <a:xfrm>
-            <a:off x="4940919" y="2506709"/>
-            <a:ext cx="1445072" cy="1496614"/>
-          </a:xfrm>
-          <a:prstGeom prst="curvedConnector2">
-            <a:avLst/>
-          </a:prstGeom>
-          <a:ln w="12700">
-            <a:solidFill>
-              <a:schemeClr val="bg2">
-                <a:lumMod val="10000"/>
-              </a:schemeClr>
-            </a:solidFill>
-            <a:tailEnd type="triangle"/>
-          </a:ln>
-        </p:spPr>
-        <p:style>
-          <a:lnRef idx="1">
-            <a:schemeClr val="accent1"/>
-          </a:lnRef>
-          <a:fillRef idx="0">
-            <a:schemeClr val="accent1"/>
-          </a:fillRef>
-          <a:effectRef idx="0">
-            <a:schemeClr val="accent1"/>
-          </a:effectRef>
-          <a:fontRef idx="minor">
-            <a:schemeClr val="tx1"/>
-          </a:fontRef>
-        </p:style>
-      </p:cxnSp>
-      <p:sp>
-        <p:nvSpPr>
-          <p:cNvPr id="123" name="テキスト ボックス 122"/>
-          <p:cNvSpPr txBox="1"/>
-          <p:nvPr/>
-        </p:nvSpPr>
-        <p:spPr>
-          <a:xfrm>
-            <a:off x="3603753" y="2253315"/>
-            <a:ext cx="615296" cy="369332"/>
+            <a:off x="5532120" y="3962400"/>
+            <a:ext cx="976549" cy="369332"/>
           </a:xfrm>
           <a:prstGeom prst="rect">
             <a:avLst/>
@@ -5172,145 +5749,23 @@
           <a:noFill/>
         </p:spPr>
         <p:txBody>
-          <a:bodyPr wrap="square" rtlCol="0">
+          <a:bodyPr wrap="none" rtlCol="0">
             <a:spAutoFit/>
           </a:bodyPr>
           <a:lstStyle/>
           <a:p>
             <a:r>
-              <a:rPr lang="en-US" b="1" baseline="30000" dirty="0" smtClean="0"/>
-              <a:t>K</a:t>
-            </a:r>
-            <a:r>
-              <a:rPr lang="en-US" b="1" dirty="0" smtClean="0"/>
-              <a:t>T</a:t>
-            </a:r>
-            <a:r>
-              <a:rPr lang="en-US" b="1" baseline="-25000" dirty="0" smtClean="0"/>
-              <a:t>M</a:t>
-            </a:r>
-            <a:endParaRPr lang="en-US" b="1" baseline="-25000" dirty="0"/>
-          </a:p>
-        </p:txBody>
-      </p:sp>
-      <p:sp>
-        <p:nvSpPr>
-          <p:cNvPr id="124" name="テキスト ボックス 123"/>
-          <p:cNvSpPr txBox="1"/>
-          <p:nvPr/>
-        </p:nvSpPr>
-        <p:spPr>
-          <a:xfrm>
-            <a:off x="2689775" y="3581497"/>
-            <a:ext cx="615296" cy="369332"/>
-          </a:xfrm>
-          <a:prstGeom prst="rect">
-            <a:avLst/>
-          </a:prstGeom>
-          <a:noFill/>
-        </p:spPr>
-        <p:txBody>
-          <a:bodyPr wrap="square" rtlCol="0">
-            <a:spAutoFit/>
-          </a:bodyPr>
-          <a:lstStyle/>
-          <a:p>
-            <a:r>
-              <a:rPr lang="en-US" b="1" baseline="30000" dirty="0" smtClean="0"/>
-              <a:t>T</a:t>
-            </a:r>
-            <a:r>
-              <a:rPr lang="en-US" b="1" dirty="0" smtClean="0"/>
-              <a:t>T</a:t>
-            </a:r>
-            <a:r>
-              <a:rPr lang="en-US" b="1" baseline="-25000" dirty="0" smtClean="0"/>
-              <a:t>M</a:t>
-            </a:r>
-            <a:endParaRPr lang="en-US" b="1" baseline="-25000" dirty="0"/>
-          </a:p>
-        </p:txBody>
-      </p:sp>
-      <p:sp>
-        <p:nvSpPr>
-          <p:cNvPr id="125" name="テキスト ボックス 124"/>
-          <p:cNvSpPr txBox="1"/>
-          <p:nvPr/>
-        </p:nvSpPr>
-        <p:spPr>
-          <a:xfrm>
-            <a:off x="4554846" y="4995839"/>
-            <a:ext cx="615296" cy="369332"/>
-          </a:xfrm>
-          <a:prstGeom prst="rect">
-            <a:avLst/>
-          </a:prstGeom>
-          <a:noFill/>
-        </p:spPr>
-        <p:txBody>
-          <a:bodyPr wrap="square" rtlCol="0">
-            <a:spAutoFit/>
-          </a:bodyPr>
-          <a:lstStyle/>
-          <a:p>
-            <a:r>
-              <a:rPr lang="en-US" b="1" baseline="30000" dirty="0" smtClean="0"/>
-              <a:t>W</a:t>
-            </a:r>
-            <a:r>
-              <a:rPr lang="en-US" b="1" dirty="0" smtClean="0"/>
-              <a:t>T</a:t>
-            </a:r>
-            <a:r>
-              <a:rPr lang="en-US" b="1" baseline="-25000" dirty="0" smtClean="0"/>
-              <a:t>T</a:t>
-            </a:r>
-            <a:endParaRPr lang="en-US" b="1" baseline="-25000" dirty="0"/>
-          </a:p>
-        </p:txBody>
-      </p:sp>
-      <p:sp>
-        <p:nvSpPr>
-          <p:cNvPr id="126" name="テキスト ボックス 125"/>
-          <p:cNvSpPr txBox="1"/>
-          <p:nvPr/>
-        </p:nvSpPr>
-        <p:spPr>
-          <a:xfrm>
-            <a:off x="5942688" y="2765487"/>
-            <a:ext cx="615296" cy="369332"/>
-          </a:xfrm>
-          <a:prstGeom prst="rect">
-            <a:avLst/>
-          </a:prstGeom>
-          <a:noFill/>
-        </p:spPr>
-        <p:txBody>
-          <a:bodyPr wrap="square" rtlCol="0">
-            <a:spAutoFit/>
-          </a:bodyPr>
-          <a:lstStyle/>
-          <a:p>
-            <a:r>
-              <a:rPr lang="en-US" b="1" baseline="30000" dirty="0" smtClean="0"/>
-              <a:t>K</a:t>
-            </a:r>
-            <a:r>
-              <a:rPr lang="en-US" b="1" dirty="0" smtClean="0"/>
-              <a:t>T</a:t>
-            </a:r>
-            <a:r>
-              <a:rPr lang="en-US" b="1" baseline="-25000" dirty="0" smtClean="0"/>
-              <a:t>W</a:t>
-            </a:r>
-            <a:endParaRPr lang="en-US" b="1" baseline="-25000" dirty="0"/>
+              <a:rPr lang="en-US" smtClean="0"/>
+              <a:t>Action-1</a:t>
+            </a:r>
+            <a:endParaRPr lang="en-US"/>
           </a:p>
         </p:txBody>
       </p:sp>
     </p:spTree>
     <p:extLst>
       <p:ext uri="{BB962C8B-B14F-4D97-AF65-F5344CB8AC3E}">
-        <p14:creationId xmlns:p14="http://schemas.microsoft.com/office/powerpoint/2010/main" val="2128383894"/>
+        <p14:creationId xmlns:p14="http://schemas.microsoft.com/office/powerpoint/2010/main" val="4228795550"/>
       </p:ext>
     </p:extLst>
   </p:cSld>

</xml_diff>

<commit_message>
modifying the implementation chapter
</commit_message>
<xml_diff>
--- a/docs/Misc/Pictures.pptx
+++ b/docs/Misc/Pictures.pptx
@@ -8,6 +8,7 @@
     <p:sldId id="256" r:id="rId2"/>
     <p:sldId id="257" r:id="rId3"/>
     <p:sldId id="258" r:id="rId4"/>
+    <p:sldId id="259" r:id="rId5"/>
   </p:sldIdLst>
   <p:sldSz cx="12192000" cy="6858000"/>
   <p:notesSz cx="6858000" cy="9144000"/>
@@ -5363,92 +5364,6 @@
           <a:chExt cx="0" cy="0"/>
         </a:xfrm>
       </p:grpSpPr>
-      <p:sp>
-        <p:nvSpPr>
-          <p:cNvPr id="307" name="正方形/長方形 306"/>
-          <p:cNvSpPr/>
-          <p:nvPr/>
-        </p:nvSpPr>
-        <p:spPr>
-          <a:xfrm>
-            <a:off x="2197419" y="1998820"/>
-            <a:ext cx="2771774" cy="2262188"/>
-          </a:xfrm>
-          <a:prstGeom prst="rect">
-            <a:avLst/>
-          </a:prstGeom>
-          <a:solidFill>
-            <a:schemeClr val="bg1"/>
-          </a:solidFill>
-        </p:spPr>
-        <p:style>
-          <a:lnRef idx="2">
-            <a:schemeClr val="dk1">
-              <a:shade val="50000"/>
-            </a:schemeClr>
-          </a:lnRef>
-          <a:fillRef idx="1">
-            <a:schemeClr val="dk1"/>
-          </a:fillRef>
-          <a:effectRef idx="0">
-            <a:schemeClr val="dk1"/>
-          </a:effectRef>
-          <a:fontRef idx="minor">
-            <a:schemeClr val="lt1"/>
-          </a:fontRef>
-        </p:style>
-        <p:txBody>
-          <a:bodyPr rtlCol="0" anchor="ctr"/>
-          <a:lstStyle/>
-          <a:p>
-            <a:pPr algn="ctr"/>
-            <a:endParaRPr lang="en-US"/>
-          </a:p>
-        </p:txBody>
-      </p:sp>
-      <p:sp>
-        <p:nvSpPr>
-          <p:cNvPr id="306" name="正方形/長方形 305"/>
-          <p:cNvSpPr/>
-          <p:nvPr/>
-        </p:nvSpPr>
-        <p:spPr>
-          <a:xfrm>
-            <a:off x="2112646" y="2101691"/>
-            <a:ext cx="2771774" cy="2262188"/>
-          </a:xfrm>
-          <a:prstGeom prst="rect">
-            <a:avLst/>
-          </a:prstGeom>
-          <a:solidFill>
-            <a:schemeClr val="bg1"/>
-          </a:solidFill>
-        </p:spPr>
-        <p:style>
-          <a:lnRef idx="2">
-            <a:schemeClr val="dk1">
-              <a:shade val="50000"/>
-            </a:schemeClr>
-          </a:lnRef>
-          <a:fillRef idx="1">
-            <a:schemeClr val="dk1"/>
-          </a:fillRef>
-          <a:effectRef idx="0">
-            <a:schemeClr val="dk1"/>
-          </a:effectRef>
-          <a:fontRef idx="minor">
-            <a:schemeClr val="lt1"/>
-          </a:fontRef>
-        </p:style>
-        <p:txBody>
-          <a:bodyPr rtlCol="0" anchor="ctr"/>
-          <a:lstStyle/>
-          <a:p>
-            <a:pPr algn="ctr"/>
-            <a:endParaRPr lang="en-US"/>
-          </a:p>
-        </p:txBody>
-      </p:sp>
       <p:pic>
         <p:nvPicPr>
           <p:cNvPr id="302" name="図 301"/>
@@ -5479,293 +5394,2551 @@
           </a:prstGeom>
         </p:spPr>
       </p:pic>
-      <p:sp>
-        <p:nvSpPr>
-          <p:cNvPr id="303" name="正方形/長方形 302"/>
-          <p:cNvSpPr/>
+      <p:grpSp>
+        <p:nvGrpSpPr>
+          <p:cNvPr id="348" name="グループ化 347"/>
+          <p:cNvGrpSpPr/>
           <p:nvPr/>
-        </p:nvSpPr>
-        <p:spPr>
+        </p:nvGrpSpPr>
+        <p:grpSpPr>
           <a:xfrm>
-            <a:off x="2112646" y="1099899"/>
-            <a:ext cx="2771774" cy="776287"/>
+            <a:off x="2028826" y="1168479"/>
+            <a:ext cx="2940367" cy="4462464"/>
+            <a:chOff x="2028826" y="1168479"/>
+            <a:chExt cx="2940367" cy="4462464"/>
           </a:xfrm>
-          <a:prstGeom prst="rect">
-            <a:avLst/>
-          </a:prstGeom>
-          <a:solidFill>
-            <a:schemeClr val="bg1"/>
-          </a:solidFill>
-        </p:spPr>
-        <p:style>
-          <a:lnRef idx="2">
-            <a:schemeClr val="dk1">
-              <a:shade val="50000"/>
-            </a:schemeClr>
-          </a:lnRef>
-          <a:fillRef idx="1">
-            <a:schemeClr val="dk1"/>
-          </a:fillRef>
-          <a:effectRef idx="0">
-            <a:schemeClr val="dk1"/>
-          </a:effectRef>
-          <a:fontRef idx="minor">
-            <a:schemeClr val="lt1"/>
-          </a:fontRef>
-        </p:style>
-        <p:txBody>
-          <a:bodyPr rtlCol="0" anchor="ctr"/>
-          <a:lstStyle/>
-          <a:p>
-            <a:pPr algn="ctr"/>
-            <a:endParaRPr lang="en-US"/>
-          </a:p>
-        </p:txBody>
-      </p:sp>
-      <p:sp>
-        <p:nvSpPr>
-          <p:cNvPr id="304" name="正方形/長方形 303"/>
-          <p:cNvSpPr/>
-          <p:nvPr/>
-        </p:nvSpPr>
-        <p:spPr>
-          <a:xfrm>
-            <a:off x="2028826" y="2218372"/>
-            <a:ext cx="2771774" cy="2262188"/>
-          </a:xfrm>
-          <a:prstGeom prst="rect">
-            <a:avLst/>
-          </a:prstGeom>
-          <a:solidFill>
-            <a:schemeClr val="bg1"/>
-          </a:solidFill>
-        </p:spPr>
-        <p:style>
-          <a:lnRef idx="2">
-            <a:schemeClr val="dk1">
-              <a:shade val="50000"/>
-            </a:schemeClr>
-          </a:lnRef>
-          <a:fillRef idx="1">
-            <a:schemeClr val="dk1"/>
-          </a:fillRef>
-          <a:effectRef idx="0">
-            <a:schemeClr val="dk1"/>
-          </a:effectRef>
-          <a:fontRef idx="minor">
-            <a:schemeClr val="lt1"/>
-          </a:fontRef>
-        </p:style>
-        <p:txBody>
-          <a:bodyPr rtlCol="0" anchor="ctr"/>
-          <a:lstStyle/>
-          <a:p>
-            <a:pPr algn="ctr"/>
-            <a:endParaRPr lang="en-US"/>
-          </a:p>
-        </p:txBody>
-      </p:sp>
-      <p:sp>
-        <p:nvSpPr>
-          <p:cNvPr id="305" name="正方形/長方形 304"/>
-          <p:cNvSpPr/>
-          <p:nvPr/>
-        </p:nvSpPr>
-        <p:spPr>
-          <a:xfrm>
-            <a:off x="2112646" y="4618435"/>
-            <a:ext cx="2771774" cy="776287"/>
-          </a:xfrm>
-          <a:prstGeom prst="rect">
-            <a:avLst/>
-          </a:prstGeom>
-          <a:solidFill>
-            <a:schemeClr val="bg1"/>
-          </a:solidFill>
-        </p:spPr>
-        <p:style>
-          <a:lnRef idx="2">
-            <a:schemeClr val="dk1">
-              <a:shade val="50000"/>
-            </a:schemeClr>
-          </a:lnRef>
-          <a:fillRef idx="1">
-            <a:schemeClr val="dk1"/>
-          </a:fillRef>
-          <a:effectRef idx="0">
-            <a:schemeClr val="dk1"/>
-          </a:effectRef>
-          <a:fontRef idx="minor">
-            <a:schemeClr val="lt1"/>
-          </a:fontRef>
-        </p:style>
-        <p:txBody>
-          <a:bodyPr rtlCol="0" anchor="ctr"/>
-          <a:lstStyle/>
-          <a:p>
-            <a:pPr algn="ctr"/>
-            <a:endParaRPr lang="en-US"/>
-          </a:p>
-        </p:txBody>
-      </p:sp>
-      <p:sp>
-        <p:nvSpPr>
-          <p:cNvPr id="308" name="正方形/長方形 307"/>
-          <p:cNvSpPr/>
-          <p:nvPr/>
-        </p:nvSpPr>
-        <p:spPr>
-          <a:xfrm>
-            <a:off x="4071938" y="5664817"/>
-            <a:ext cx="2313623" cy="584714"/>
-          </a:xfrm>
-          <a:prstGeom prst="rect">
-            <a:avLst/>
-          </a:prstGeom>
-          <a:solidFill>
-            <a:schemeClr val="bg1"/>
-          </a:solidFill>
-        </p:spPr>
-        <p:style>
-          <a:lnRef idx="2">
-            <a:schemeClr val="dk1">
-              <a:shade val="50000"/>
-            </a:schemeClr>
-          </a:lnRef>
-          <a:fillRef idx="1">
-            <a:schemeClr val="dk1"/>
-          </a:fillRef>
-          <a:effectRef idx="0">
-            <a:schemeClr val="dk1"/>
-          </a:effectRef>
-          <a:fontRef idx="minor">
-            <a:schemeClr val="lt1"/>
-          </a:fontRef>
-        </p:style>
-        <p:txBody>
-          <a:bodyPr rtlCol="0" anchor="ctr"/>
-          <a:lstStyle/>
-          <a:p>
-            <a:pPr algn="ctr"/>
-            <a:endParaRPr lang="en-US"/>
-          </a:p>
-        </p:txBody>
-      </p:sp>
-      <p:sp>
-        <p:nvSpPr>
-          <p:cNvPr id="309" name="正方形/長方形 308"/>
-          <p:cNvSpPr/>
-          <p:nvPr/>
-        </p:nvSpPr>
-        <p:spPr>
-          <a:xfrm>
-            <a:off x="5258754" y="5664817"/>
-            <a:ext cx="1126807" cy="584714"/>
-          </a:xfrm>
-          <a:prstGeom prst="rect">
-            <a:avLst/>
-          </a:prstGeom>
-          <a:solidFill>
-            <a:schemeClr val="bg1"/>
-          </a:solidFill>
-        </p:spPr>
-        <p:style>
-          <a:lnRef idx="2">
-            <a:schemeClr val="dk1">
-              <a:shade val="50000"/>
-            </a:schemeClr>
-          </a:lnRef>
-          <a:fillRef idx="1">
-            <a:schemeClr val="dk1"/>
-          </a:fillRef>
-          <a:effectRef idx="0">
-            <a:schemeClr val="dk1"/>
-          </a:effectRef>
-          <a:fontRef idx="minor">
-            <a:schemeClr val="lt1"/>
-          </a:fontRef>
-        </p:style>
-        <p:txBody>
-          <a:bodyPr rtlCol="0" anchor="ctr"/>
-          <a:lstStyle/>
-          <a:p>
-            <a:pPr algn="ctr"/>
-            <a:endParaRPr lang="en-US" dirty="0"/>
-          </a:p>
-        </p:txBody>
-      </p:sp>
-      <p:cxnSp>
-        <p:nvCxnSpPr>
-          <p:cNvPr id="311" name="直線コネクタ 310"/>
-          <p:cNvCxnSpPr>
-            <a:stCxn id="309" idx="1"/>
-            <a:endCxn id="308" idx="3"/>
-          </p:cNvCxnSpPr>
-          <p:nvPr/>
-        </p:nvCxnSpPr>
-        <p:spPr>
-          <a:xfrm>
-            <a:off x="5258754" y="5957174"/>
-            <a:ext cx="1126807" cy="0"/>
-          </a:xfrm>
-          <a:prstGeom prst="line">
-            <a:avLst/>
-          </a:prstGeom>
-          <a:ln w="12700">
+        </p:grpSpPr>
+        <p:sp>
+          <p:nvSpPr>
+            <p:cNvPr id="307" name="正方形/長方形 306"/>
+            <p:cNvSpPr/>
+            <p:nvPr/>
+          </p:nvSpPr>
+          <p:spPr>
+            <a:xfrm>
+              <a:off x="2197419" y="1998820"/>
+              <a:ext cx="2771774" cy="2420780"/>
+            </a:xfrm>
+            <a:prstGeom prst="rect">
+              <a:avLst/>
+            </a:prstGeom>
             <a:solidFill>
-              <a:schemeClr val="tx1"/>
+              <a:schemeClr val="bg1"/>
             </a:solidFill>
-          </a:ln>
-        </p:spPr>
-        <p:style>
-          <a:lnRef idx="1">
-            <a:schemeClr val="accent1"/>
-          </a:lnRef>
-          <a:fillRef idx="0">
-            <a:schemeClr val="accent1"/>
-          </a:fillRef>
-          <a:effectRef idx="0">
-            <a:schemeClr val="accent1"/>
-          </a:effectRef>
-          <a:fontRef idx="minor">
-            <a:schemeClr val="tx1"/>
-          </a:fontRef>
-        </p:style>
-      </p:cxnSp>
-      <p:sp>
-        <p:nvSpPr>
-          <p:cNvPr id="312" name="テキスト ボックス 311"/>
-          <p:cNvSpPr txBox="1"/>
-          <p:nvPr/>
-        </p:nvSpPr>
-        <p:spPr>
-          <a:xfrm>
-            <a:off x="5532120" y="3962400"/>
-            <a:ext cx="976549" cy="369332"/>
-          </a:xfrm>
-          <a:prstGeom prst="rect">
-            <a:avLst/>
-          </a:prstGeom>
-          <a:noFill/>
-        </p:spPr>
-        <p:txBody>
-          <a:bodyPr wrap="none" rtlCol="0">
-            <a:spAutoFit/>
-          </a:bodyPr>
-          <a:lstStyle/>
-          <a:p>
-            <a:r>
-              <a:rPr lang="en-US" smtClean="0"/>
-              <a:t>Action-1</a:t>
-            </a:r>
-            <a:endParaRPr lang="en-US"/>
-          </a:p>
-        </p:txBody>
-      </p:sp>
+          </p:spPr>
+          <p:style>
+            <a:lnRef idx="2">
+              <a:schemeClr val="dk1">
+                <a:shade val="50000"/>
+              </a:schemeClr>
+            </a:lnRef>
+            <a:fillRef idx="1">
+              <a:schemeClr val="dk1"/>
+            </a:fillRef>
+            <a:effectRef idx="0">
+              <a:schemeClr val="dk1"/>
+            </a:effectRef>
+            <a:fontRef idx="minor">
+              <a:schemeClr val="lt1"/>
+            </a:fontRef>
+          </p:style>
+          <p:txBody>
+            <a:bodyPr rtlCol="0" anchor="ctr"/>
+            <a:lstStyle/>
+            <a:p>
+              <a:pPr algn="ctr"/>
+              <a:endParaRPr lang="en-US"/>
+            </a:p>
+          </p:txBody>
+        </p:sp>
+        <p:sp>
+          <p:nvSpPr>
+            <p:cNvPr id="306" name="正方形/長方形 305"/>
+            <p:cNvSpPr/>
+            <p:nvPr/>
+          </p:nvSpPr>
+          <p:spPr>
+            <a:xfrm>
+              <a:off x="2112646" y="2078236"/>
+              <a:ext cx="2771774" cy="2467330"/>
+            </a:xfrm>
+            <a:prstGeom prst="rect">
+              <a:avLst/>
+            </a:prstGeom>
+            <a:solidFill>
+              <a:schemeClr val="bg1"/>
+            </a:solidFill>
+          </p:spPr>
+          <p:style>
+            <a:lnRef idx="2">
+              <a:schemeClr val="dk1">
+                <a:shade val="50000"/>
+              </a:schemeClr>
+            </a:lnRef>
+            <a:fillRef idx="1">
+              <a:schemeClr val="dk1"/>
+            </a:fillRef>
+            <a:effectRef idx="0">
+              <a:schemeClr val="dk1"/>
+            </a:effectRef>
+            <a:fontRef idx="minor">
+              <a:schemeClr val="lt1"/>
+            </a:fontRef>
+          </p:style>
+          <p:txBody>
+            <a:bodyPr rtlCol="0" anchor="ctr"/>
+            <a:lstStyle/>
+            <a:p>
+              <a:pPr algn="ctr"/>
+              <a:endParaRPr lang="en-US"/>
+            </a:p>
+          </p:txBody>
+        </p:sp>
+        <p:sp>
+          <p:nvSpPr>
+            <p:cNvPr id="304" name="正方形/長方形 303"/>
+            <p:cNvSpPr/>
+            <p:nvPr/>
+          </p:nvSpPr>
+          <p:spPr>
+            <a:xfrm>
+              <a:off x="2028826" y="2168543"/>
+              <a:ext cx="2771774" cy="2624587"/>
+            </a:xfrm>
+            <a:prstGeom prst="rect">
+              <a:avLst/>
+            </a:prstGeom>
+            <a:solidFill>
+              <a:schemeClr val="bg1"/>
+            </a:solidFill>
+          </p:spPr>
+          <p:style>
+            <a:lnRef idx="2">
+              <a:schemeClr val="dk1">
+                <a:shade val="50000"/>
+              </a:schemeClr>
+            </a:lnRef>
+            <a:fillRef idx="1">
+              <a:schemeClr val="dk1"/>
+            </a:fillRef>
+            <a:effectRef idx="0">
+              <a:schemeClr val="dk1"/>
+            </a:effectRef>
+            <a:fontRef idx="minor">
+              <a:schemeClr val="lt1"/>
+            </a:fontRef>
+          </p:style>
+          <p:txBody>
+            <a:bodyPr rtlCol="0" anchor="ctr"/>
+            <a:lstStyle/>
+            <a:p>
+              <a:pPr algn="ctr"/>
+              <a:endParaRPr lang="en-US"/>
+            </a:p>
+          </p:txBody>
+        </p:sp>
+        <p:grpSp>
+          <p:nvGrpSpPr>
+            <p:cNvPr id="314" name="グループ化 313"/>
+            <p:cNvGrpSpPr/>
+            <p:nvPr/>
+          </p:nvGrpSpPr>
+          <p:grpSpPr>
+            <a:xfrm>
+              <a:off x="2243138" y="4125575"/>
+              <a:ext cx="2313623" cy="607934"/>
+              <a:chOff x="4071938" y="5649218"/>
+              <a:chExt cx="2313623" cy="607934"/>
+            </a:xfrm>
+          </p:grpSpPr>
+          <p:sp>
+            <p:nvSpPr>
+              <p:cNvPr id="308" name="正方形/長方形 307"/>
+              <p:cNvSpPr/>
+              <p:nvPr/>
+            </p:nvSpPr>
+            <p:spPr>
+              <a:xfrm>
+                <a:off x="4071938" y="5664817"/>
+                <a:ext cx="2313623" cy="584714"/>
+              </a:xfrm>
+              <a:prstGeom prst="rect">
+                <a:avLst/>
+              </a:prstGeom>
+              <a:solidFill>
+                <a:schemeClr val="bg1"/>
+              </a:solidFill>
+            </p:spPr>
+            <p:style>
+              <a:lnRef idx="2">
+                <a:schemeClr val="dk1">
+                  <a:shade val="50000"/>
+                </a:schemeClr>
+              </a:lnRef>
+              <a:fillRef idx="1">
+                <a:schemeClr val="dk1"/>
+              </a:fillRef>
+              <a:effectRef idx="0">
+                <a:schemeClr val="dk1"/>
+              </a:effectRef>
+              <a:fontRef idx="minor">
+                <a:schemeClr val="lt1"/>
+              </a:fontRef>
+            </p:style>
+            <p:txBody>
+              <a:bodyPr rtlCol="0" anchor="ctr"/>
+              <a:lstStyle/>
+              <a:p>
+                <a:pPr algn="ctr"/>
+                <a:endParaRPr lang="en-US"/>
+              </a:p>
+            </p:txBody>
+          </p:sp>
+          <p:sp>
+            <p:nvSpPr>
+              <p:cNvPr id="309" name="正方形/長方形 308"/>
+              <p:cNvSpPr/>
+              <p:nvPr/>
+            </p:nvSpPr>
+            <p:spPr>
+              <a:xfrm>
+                <a:off x="5258754" y="5664817"/>
+                <a:ext cx="1126807" cy="584714"/>
+              </a:xfrm>
+              <a:prstGeom prst="rect">
+                <a:avLst/>
+              </a:prstGeom>
+              <a:solidFill>
+                <a:schemeClr val="bg1"/>
+              </a:solidFill>
+            </p:spPr>
+            <p:style>
+              <a:lnRef idx="2">
+                <a:schemeClr val="dk1">
+                  <a:shade val="50000"/>
+                </a:schemeClr>
+              </a:lnRef>
+              <a:fillRef idx="1">
+                <a:schemeClr val="dk1"/>
+              </a:fillRef>
+              <a:effectRef idx="0">
+                <a:schemeClr val="dk1"/>
+              </a:effectRef>
+              <a:fontRef idx="minor">
+                <a:schemeClr val="lt1"/>
+              </a:fontRef>
+            </p:style>
+            <p:txBody>
+              <a:bodyPr rtlCol="0" anchor="ctr"/>
+              <a:lstStyle/>
+              <a:p>
+                <a:pPr algn="ctr"/>
+                <a:endParaRPr lang="en-US" dirty="0"/>
+              </a:p>
+            </p:txBody>
+          </p:sp>
+          <p:cxnSp>
+            <p:nvCxnSpPr>
+              <p:cNvPr id="311" name="直線コネクタ 310"/>
+              <p:cNvCxnSpPr>
+                <a:stCxn id="309" idx="1"/>
+                <a:endCxn id="308" idx="3"/>
+              </p:cNvCxnSpPr>
+              <p:nvPr/>
+            </p:nvCxnSpPr>
+            <p:spPr>
+              <a:xfrm>
+                <a:off x="5258754" y="5957174"/>
+                <a:ext cx="1126807" cy="0"/>
+              </a:xfrm>
+              <a:prstGeom prst="line">
+                <a:avLst/>
+              </a:prstGeom>
+              <a:ln w="12700">
+                <a:solidFill>
+                  <a:schemeClr val="tx1"/>
+                </a:solidFill>
+              </a:ln>
+            </p:spPr>
+            <p:style>
+              <a:lnRef idx="1">
+                <a:schemeClr val="accent1"/>
+              </a:lnRef>
+              <a:fillRef idx="0">
+                <a:schemeClr val="accent1"/>
+              </a:fillRef>
+              <a:effectRef idx="0">
+                <a:schemeClr val="accent1"/>
+              </a:effectRef>
+              <a:fontRef idx="minor">
+                <a:schemeClr val="tx1"/>
+              </a:fontRef>
+            </p:style>
+          </p:cxnSp>
+          <p:sp>
+            <p:nvSpPr>
+              <p:cNvPr id="312" name="テキスト ボックス 311"/>
+              <p:cNvSpPr txBox="1"/>
+              <p:nvPr/>
+            </p:nvSpPr>
+            <p:spPr>
+              <a:xfrm>
+                <a:off x="5421245" y="5649218"/>
+                <a:ext cx="801823" cy="307777"/>
+              </a:xfrm>
+              <a:prstGeom prst="rect">
+                <a:avLst/>
+              </a:prstGeom>
+              <a:noFill/>
+            </p:spPr>
+            <p:txBody>
+              <a:bodyPr wrap="none" rtlCol="0">
+                <a:spAutoFit/>
+              </a:bodyPr>
+              <a:lstStyle/>
+              <a:p>
+                <a:r>
+                  <a:rPr lang="en-US" sz="1400" dirty="0" smtClean="0"/>
+                  <a:t>Action-1</a:t>
+                </a:r>
+                <a:endParaRPr lang="en-US" sz="1400" dirty="0"/>
+              </a:p>
+            </p:txBody>
+          </p:sp>
+          <p:sp>
+            <p:nvSpPr>
+              <p:cNvPr id="313" name="テキスト ボックス 312"/>
+              <p:cNvSpPr txBox="1"/>
+              <p:nvPr/>
+            </p:nvSpPr>
+            <p:spPr>
+              <a:xfrm>
+                <a:off x="5413625" y="5949375"/>
+                <a:ext cx="825867" cy="307777"/>
+              </a:xfrm>
+              <a:prstGeom prst="rect">
+                <a:avLst/>
+              </a:prstGeom>
+              <a:noFill/>
+            </p:spPr>
+            <p:txBody>
+              <a:bodyPr wrap="none" rtlCol="0">
+                <a:spAutoFit/>
+              </a:bodyPr>
+              <a:lstStyle/>
+              <a:p>
+                <a:r>
+                  <a:rPr lang="en-US" sz="1400" dirty="0" smtClean="0"/>
+                  <a:t>Action-N</a:t>
+                </a:r>
+                <a:endParaRPr lang="en-US" sz="1400" dirty="0"/>
+              </a:p>
+            </p:txBody>
+          </p:sp>
+        </p:grpSp>
+        <p:grpSp>
+          <p:nvGrpSpPr>
+            <p:cNvPr id="327" name="グループ化 326"/>
+            <p:cNvGrpSpPr/>
+            <p:nvPr/>
+          </p:nvGrpSpPr>
+          <p:grpSpPr>
+            <a:xfrm>
+              <a:off x="2243139" y="2830113"/>
+              <a:ext cx="2313623" cy="607934"/>
+              <a:chOff x="4071938" y="5649218"/>
+              <a:chExt cx="2313623" cy="607934"/>
+            </a:xfrm>
+          </p:grpSpPr>
+          <p:sp>
+            <p:nvSpPr>
+              <p:cNvPr id="328" name="正方形/長方形 327"/>
+              <p:cNvSpPr/>
+              <p:nvPr/>
+            </p:nvSpPr>
+            <p:spPr>
+              <a:xfrm>
+                <a:off x="4071938" y="5664817"/>
+                <a:ext cx="2313623" cy="584714"/>
+              </a:xfrm>
+              <a:prstGeom prst="rect">
+                <a:avLst/>
+              </a:prstGeom>
+              <a:solidFill>
+                <a:schemeClr val="bg1"/>
+              </a:solidFill>
+            </p:spPr>
+            <p:style>
+              <a:lnRef idx="2">
+                <a:schemeClr val="dk1">
+                  <a:shade val="50000"/>
+                </a:schemeClr>
+              </a:lnRef>
+              <a:fillRef idx="1">
+                <a:schemeClr val="dk1"/>
+              </a:fillRef>
+              <a:effectRef idx="0">
+                <a:schemeClr val="dk1"/>
+              </a:effectRef>
+              <a:fontRef idx="minor">
+                <a:schemeClr val="lt1"/>
+              </a:fontRef>
+            </p:style>
+            <p:txBody>
+              <a:bodyPr rtlCol="0" anchor="ctr"/>
+              <a:lstStyle/>
+              <a:p>
+                <a:pPr algn="ctr"/>
+                <a:endParaRPr lang="en-US"/>
+              </a:p>
+            </p:txBody>
+          </p:sp>
+          <p:sp>
+            <p:nvSpPr>
+              <p:cNvPr id="329" name="正方形/長方形 328"/>
+              <p:cNvSpPr/>
+              <p:nvPr/>
+            </p:nvSpPr>
+            <p:spPr>
+              <a:xfrm>
+                <a:off x="5258754" y="5664817"/>
+                <a:ext cx="1126807" cy="584714"/>
+              </a:xfrm>
+              <a:prstGeom prst="rect">
+                <a:avLst/>
+              </a:prstGeom>
+              <a:solidFill>
+                <a:schemeClr val="bg1"/>
+              </a:solidFill>
+            </p:spPr>
+            <p:style>
+              <a:lnRef idx="2">
+                <a:schemeClr val="dk1">
+                  <a:shade val="50000"/>
+                </a:schemeClr>
+              </a:lnRef>
+              <a:fillRef idx="1">
+                <a:schemeClr val="dk1"/>
+              </a:fillRef>
+              <a:effectRef idx="0">
+                <a:schemeClr val="dk1"/>
+              </a:effectRef>
+              <a:fontRef idx="minor">
+                <a:schemeClr val="lt1"/>
+              </a:fontRef>
+            </p:style>
+            <p:txBody>
+              <a:bodyPr rtlCol="0" anchor="ctr"/>
+              <a:lstStyle/>
+              <a:p>
+                <a:pPr algn="ctr"/>
+                <a:endParaRPr lang="en-US" dirty="0"/>
+              </a:p>
+            </p:txBody>
+          </p:sp>
+          <p:cxnSp>
+            <p:nvCxnSpPr>
+              <p:cNvPr id="330" name="直線コネクタ 329"/>
+              <p:cNvCxnSpPr>
+                <a:stCxn id="329" idx="1"/>
+                <a:endCxn id="328" idx="3"/>
+              </p:cNvCxnSpPr>
+              <p:nvPr/>
+            </p:nvCxnSpPr>
+            <p:spPr>
+              <a:xfrm>
+                <a:off x="5258754" y="5957174"/>
+                <a:ext cx="1126807" cy="0"/>
+              </a:xfrm>
+              <a:prstGeom prst="line">
+                <a:avLst/>
+              </a:prstGeom>
+              <a:ln w="12700">
+                <a:solidFill>
+                  <a:schemeClr val="tx1"/>
+                </a:solidFill>
+              </a:ln>
+            </p:spPr>
+            <p:style>
+              <a:lnRef idx="1">
+                <a:schemeClr val="accent1"/>
+              </a:lnRef>
+              <a:fillRef idx="0">
+                <a:schemeClr val="accent1"/>
+              </a:fillRef>
+              <a:effectRef idx="0">
+                <a:schemeClr val="accent1"/>
+              </a:effectRef>
+              <a:fontRef idx="minor">
+                <a:schemeClr val="tx1"/>
+              </a:fontRef>
+            </p:style>
+          </p:cxnSp>
+          <p:sp>
+            <p:nvSpPr>
+              <p:cNvPr id="331" name="テキスト ボックス 330"/>
+              <p:cNvSpPr txBox="1"/>
+              <p:nvPr/>
+            </p:nvSpPr>
+            <p:spPr>
+              <a:xfrm>
+                <a:off x="5421245" y="5649218"/>
+                <a:ext cx="801823" cy="307777"/>
+              </a:xfrm>
+              <a:prstGeom prst="rect">
+                <a:avLst/>
+              </a:prstGeom>
+              <a:noFill/>
+            </p:spPr>
+            <p:txBody>
+              <a:bodyPr wrap="none" rtlCol="0">
+                <a:spAutoFit/>
+              </a:bodyPr>
+              <a:lstStyle/>
+              <a:p>
+                <a:r>
+                  <a:rPr lang="en-US" sz="1400" dirty="0" smtClean="0"/>
+                  <a:t>Action-1</a:t>
+                </a:r>
+                <a:endParaRPr lang="en-US" sz="1400" dirty="0"/>
+              </a:p>
+            </p:txBody>
+          </p:sp>
+          <p:sp>
+            <p:nvSpPr>
+              <p:cNvPr id="332" name="テキスト ボックス 331"/>
+              <p:cNvSpPr txBox="1"/>
+              <p:nvPr/>
+            </p:nvSpPr>
+            <p:spPr>
+              <a:xfrm>
+                <a:off x="5413625" y="5949375"/>
+                <a:ext cx="825867" cy="307777"/>
+              </a:xfrm>
+              <a:prstGeom prst="rect">
+                <a:avLst/>
+              </a:prstGeom>
+              <a:noFill/>
+            </p:spPr>
+            <p:txBody>
+              <a:bodyPr wrap="none" rtlCol="0">
+                <a:spAutoFit/>
+              </a:bodyPr>
+              <a:lstStyle/>
+              <a:p>
+                <a:r>
+                  <a:rPr lang="en-US" sz="1400" dirty="0" smtClean="0"/>
+                  <a:t>Action-N</a:t>
+                </a:r>
+                <a:endParaRPr lang="en-US" sz="1400" dirty="0"/>
+              </a:p>
+            </p:txBody>
+          </p:sp>
+        </p:grpSp>
+        <p:grpSp>
+          <p:nvGrpSpPr>
+            <p:cNvPr id="333" name="グループ化 332"/>
+            <p:cNvGrpSpPr/>
+            <p:nvPr/>
+          </p:nvGrpSpPr>
+          <p:grpSpPr>
+            <a:xfrm>
+              <a:off x="2243137" y="3469388"/>
+              <a:ext cx="2313623" cy="607934"/>
+              <a:chOff x="4071938" y="5649218"/>
+              <a:chExt cx="2313623" cy="607934"/>
+            </a:xfrm>
+          </p:grpSpPr>
+          <p:sp>
+            <p:nvSpPr>
+              <p:cNvPr id="334" name="正方形/長方形 333"/>
+              <p:cNvSpPr/>
+              <p:nvPr/>
+            </p:nvSpPr>
+            <p:spPr>
+              <a:xfrm>
+                <a:off x="4071938" y="5664817"/>
+                <a:ext cx="2313623" cy="584714"/>
+              </a:xfrm>
+              <a:prstGeom prst="rect">
+                <a:avLst/>
+              </a:prstGeom>
+              <a:solidFill>
+                <a:schemeClr val="bg1"/>
+              </a:solidFill>
+            </p:spPr>
+            <p:style>
+              <a:lnRef idx="2">
+                <a:schemeClr val="dk1">
+                  <a:shade val="50000"/>
+                </a:schemeClr>
+              </a:lnRef>
+              <a:fillRef idx="1">
+                <a:schemeClr val="dk1"/>
+              </a:fillRef>
+              <a:effectRef idx="0">
+                <a:schemeClr val="dk1"/>
+              </a:effectRef>
+              <a:fontRef idx="minor">
+                <a:schemeClr val="lt1"/>
+              </a:fontRef>
+            </p:style>
+            <p:txBody>
+              <a:bodyPr rtlCol="0" anchor="ctr"/>
+              <a:lstStyle/>
+              <a:p>
+                <a:pPr algn="ctr"/>
+                <a:endParaRPr lang="en-US"/>
+              </a:p>
+            </p:txBody>
+          </p:sp>
+          <p:sp>
+            <p:nvSpPr>
+              <p:cNvPr id="335" name="正方形/長方形 334"/>
+              <p:cNvSpPr/>
+              <p:nvPr/>
+            </p:nvSpPr>
+            <p:spPr>
+              <a:xfrm>
+                <a:off x="5258754" y="5664817"/>
+                <a:ext cx="1126807" cy="584714"/>
+              </a:xfrm>
+              <a:prstGeom prst="rect">
+                <a:avLst/>
+              </a:prstGeom>
+              <a:solidFill>
+                <a:schemeClr val="bg1"/>
+              </a:solidFill>
+            </p:spPr>
+            <p:style>
+              <a:lnRef idx="2">
+                <a:schemeClr val="dk1">
+                  <a:shade val="50000"/>
+                </a:schemeClr>
+              </a:lnRef>
+              <a:fillRef idx="1">
+                <a:schemeClr val="dk1"/>
+              </a:fillRef>
+              <a:effectRef idx="0">
+                <a:schemeClr val="dk1"/>
+              </a:effectRef>
+              <a:fontRef idx="minor">
+                <a:schemeClr val="lt1"/>
+              </a:fontRef>
+            </p:style>
+            <p:txBody>
+              <a:bodyPr rtlCol="0" anchor="ctr"/>
+              <a:lstStyle/>
+              <a:p>
+                <a:pPr algn="ctr"/>
+                <a:endParaRPr lang="en-US" dirty="0"/>
+              </a:p>
+            </p:txBody>
+          </p:sp>
+          <p:cxnSp>
+            <p:nvCxnSpPr>
+              <p:cNvPr id="336" name="直線コネクタ 335"/>
+              <p:cNvCxnSpPr>
+                <a:stCxn id="335" idx="1"/>
+                <a:endCxn id="334" idx="3"/>
+              </p:cNvCxnSpPr>
+              <p:nvPr/>
+            </p:nvCxnSpPr>
+            <p:spPr>
+              <a:xfrm>
+                <a:off x="5258754" y="5957174"/>
+                <a:ext cx="1126807" cy="0"/>
+              </a:xfrm>
+              <a:prstGeom prst="line">
+                <a:avLst/>
+              </a:prstGeom>
+              <a:ln w="12700">
+                <a:solidFill>
+                  <a:schemeClr val="tx1"/>
+                </a:solidFill>
+              </a:ln>
+            </p:spPr>
+            <p:style>
+              <a:lnRef idx="1">
+                <a:schemeClr val="accent1"/>
+              </a:lnRef>
+              <a:fillRef idx="0">
+                <a:schemeClr val="accent1"/>
+              </a:fillRef>
+              <a:effectRef idx="0">
+                <a:schemeClr val="accent1"/>
+              </a:effectRef>
+              <a:fontRef idx="minor">
+                <a:schemeClr val="tx1"/>
+              </a:fontRef>
+            </p:style>
+          </p:cxnSp>
+          <p:sp>
+            <p:nvSpPr>
+              <p:cNvPr id="337" name="テキスト ボックス 336"/>
+              <p:cNvSpPr txBox="1"/>
+              <p:nvPr/>
+            </p:nvSpPr>
+            <p:spPr>
+              <a:xfrm>
+                <a:off x="5421245" y="5649218"/>
+                <a:ext cx="801823" cy="307777"/>
+              </a:xfrm>
+              <a:prstGeom prst="rect">
+                <a:avLst/>
+              </a:prstGeom>
+              <a:noFill/>
+            </p:spPr>
+            <p:txBody>
+              <a:bodyPr wrap="none" rtlCol="0">
+                <a:spAutoFit/>
+              </a:bodyPr>
+              <a:lstStyle/>
+              <a:p>
+                <a:r>
+                  <a:rPr lang="en-US" sz="1400" dirty="0" smtClean="0"/>
+                  <a:t>Action-1</a:t>
+                </a:r>
+                <a:endParaRPr lang="en-US" sz="1400" dirty="0"/>
+              </a:p>
+            </p:txBody>
+          </p:sp>
+          <p:sp>
+            <p:nvSpPr>
+              <p:cNvPr id="338" name="テキスト ボックス 337"/>
+              <p:cNvSpPr txBox="1"/>
+              <p:nvPr/>
+            </p:nvSpPr>
+            <p:spPr>
+              <a:xfrm>
+                <a:off x="5413625" y="5949375"/>
+                <a:ext cx="825867" cy="307777"/>
+              </a:xfrm>
+              <a:prstGeom prst="rect">
+                <a:avLst/>
+              </a:prstGeom>
+              <a:noFill/>
+            </p:spPr>
+            <p:txBody>
+              <a:bodyPr wrap="none" rtlCol="0">
+                <a:spAutoFit/>
+              </a:bodyPr>
+              <a:lstStyle/>
+              <a:p>
+                <a:r>
+                  <a:rPr lang="en-US" sz="1400" dirty="0" smtClean="0"/>
+                  <a:t>Action-N</a:t>
+                </a:r>
+                <a:endParaRPr lang="en-US" sz="1400" dirty="0"/>
+              </a:p>
+            </p:txBody>
+          </p:sp>
+        </p:grpSp>
+        <p:grpSp>
+          <p:nvGrpSpPr>
+            <p:cNvPr id="347" name="グループ化 346"/>
+            <p:cNvGrpSpPr/>
+            <p:nvPr/>
+          </p:nvGrpSpPr>
+          <p:grpSpPr>
+            <a:xfrm>
+              <a:off x="2112646" y="1168479"/>
+              <a:ext cx="2771774" cy="776287"/>
+              <a:chOff x="2112646" y="1099899"/>
+              <a:chExt cx="2771774" cy="776287"/>
+            </a:xfrm>
+          </p:grpSpPr>
+          <p:sp>
+            <p:nvSpPr>
+              <p:cNvPr id="303" name="正方形/長方形 302"/>
+              <p:cNvSpPr/>
+              <p:nvPr/>
+            </p:nvSpPr>
+            <p:spPr>
+              <a:xfrm>
+                <a:off x="2112646" y="1099899"/>
+                <a:ext cx="2771774" cy="776287"/>
+              </a:xfrm>
+              <a:prstGeom prst="rect">
+                <a:avLst/>
+              </a:prstGeom>
+              <a:solidFill>
+                <a:schemeClr val="bg1"/>
+              </a:solidFill>
+            </p:spPr>
+            <p:style>
+              <a:lnRef idx="2">
+                <a:schemeClr val="dk1">
+                  <a:shade val="50000"/>
+                </a:schemeClr>
+              </a:lnRef>
+              <a:fillRef idx="1">
+                <a:schemeClr val="dk1"/>
+              </a:fillRef>
+              <a:effectRef idx="0">
+                <a:schemeClr val="dk1"/>
+              </a:effectRef>
+              <a:fontRef idx="minor">
+                <a:schemeClr val="lt1"/>
+              </a:fontRef>
+            </p:style>
+            <p:txBody>
+              <a:bodyPr rtlCol="0" anchor="ctr"/>
+              <a:lstStyle/>
+              <a:p>
+                <a:pPr algn="ctr"/>
+                <a:endParaRPr lang="en-US"/>
+              </a:p>
+            </p:txBody>
+          </p:sp>
+          <p:grpSp>
+            <p:nvGrpSpPr>
+              <p:cNvPr id="315" name="グループ化 314"/>
+              <p:cNvGrpSpPr/>
+              <p:nvPr/>
+            </p:nvGrpSpPr>
+            <p:grpSpPr>
+              <a:xfrm>
+                <a:off x="2326481" y="1177944"/>
+                <a:ext cx="2313623" cy="607934"/>
+                <a:chOff x="4071938" y="5649218"/>
+                <a:chExt cx="2313623" cy="607934"/>
+              </a:xfrm>
+            </p:grpSpPr>
+            <p:sp>
+              <p:nvSpPr>
+                <p:cNvPr id="316" name="正方形/長方形 315"/>
+                <p:cNvSpPr/>
+                <p:nvPr/>
+              </p:nvSpPr>
+              <p:spPr>
+                <a:xfrm>
+                  <a:off x="4071938" y="5664817"/>
+                  <a:ext cx="2313623" cy="584714"/>
+                </a:xfrm>
+                <a:prstGeom prst="rect">
+                  <a:avLst/>
+                </a:prstGeom>
+                <a:solidFill>
+                  <a:schemeClr val="bg1"/>
+                </a:solidFill>
+              </p:spPr>
+              <p:style>
+                <a:lnRef idx="2">
+                  <a:schemeClr val="dk1">
+                    <a:shade val="50000"/>
+                  </a:schemeClr>
+                </a:lnRef>
+                <a:fillRef idx="1">
+                  <a:schemeClr val="dk1"/>
+                </a:fillRef>
+                <a:effectRef idx="0">
+                  <a:schemeClr val="dk1"/>
+                </a:effectRef>
+                <a:fontRef idx="minor">
+                  <a:schemeClr val="lt1"/>
+                </a:fontRef>
+              </p:style>
+              <p:txBody>
+                <a:bodyPr rtlCol="0" anchor="ctr"/>
+                <a:lstStyle/>
+                <a:p>
+                  <a:pPr algn="ctr"/>
+                  <a:endParaRPr lang="en-US" dirty="0"/>
+                </a:p>
+              </p:txBody>
+            </p:sp>
+            <p:sp>
+              <p:nvSpPr>
+                <p:cNvPr id="317" name="正方形/長方形 316"/>
+                <p:cNvSpPr/>
+                <p:nvPr/>
+              </p:nvSpPr>
+              <p:spPr>
+                <a:xfrm>
+                  <a:off x="5258754" y="5664817"/>
+                  <a:ext cx="1126807" cy="584714"/>
+                </a:xfrm>
+                <a:prstGeom prst="rect">
+                  <a:avLst/>
+                </a:prstGeom>
+                <a:solidFill>
+                  <a:schemeClr val="bg1"/>
+                </a:solidFill>
+              </p:spPr>
+              <p:style>
+                <a:lnRef idx="2">
+                  <a:schemeClr val="dk1">
+                    <a:shade val="50000"/>
+                  </a:schemeClr>
+                </a:lnRef>
+                <a:fillRef idx="1">
+                  <a:schemeClr val="dk1"/>
+                </a:fillRef>
+                <a:effectRef idx="0">
+                  <a:schemeClr val="dk1"/>
+                </a:effectRef>
+                <a:fontRef idx="minor">
+                  <a:schemeClr val="lt1"/>
+                </a:fontRef>
+              </p:style>
+              <p:txBody>
+                <a:bodyPr rtlCol="0" anchor="ctr"/>
+                <a:lstStyle/>
+                <a:p>
+                  <a:pPr algn="ctr"/>
+                  <a:endParaRPr lang="en-US" dirty="0"/>
+                </a:p>
+              </p:txBody>
+            </p:sp>
+            <p:cxnSp>
+              <p:nvCxnSpPr>
+                <p:cNvPr id="318" name="直線コネクタ 317"/>
+                <p:cNvCxnSpPr>
+                  <a:stCxn id="317" idx="1"/>
+                  <a:endCxn id="316" idx="3"/>
+                </p:cNvCxnSpPr>
+                <p:nvPr/>
+              </p:nvCxnSpPr>
+              <p:spPr>
+                <a:xfrm>
+                  <a:off x="5258754" y="5957174"/>
+                  <a:ext cx="1126807" cy="0"/>
+                </a:xfrm>
+                <a:prstGeom prst="line">
+                  <a:avLst/>
+                </a:prstGeom>
+                <a:ln w="12700">
+                  <a:solidFill>
+                    <a:schemeClr val="tx1"/>
+                  </a:solidFill>
+                </a:ln>
+              </p:spPr>
+              <p:style>
+                <a:lnRef idx="1">
+                  <a:schemeClr val="accent1"/>
+                </a:lnRef>
+                <a:fillRef idx="0">
+                  <a:schemeClr val="accent1"/>
+                </a:fillRef>
+                <a:effectRef idx="0">
+                  <a:schemeClr val="accent1"/>
+                </a:effectRef>
+                <a:fontRef idx="minor">
+                  <a:schemeClr val="tx1"/>
+                </a:fontRef>
+              </p:style>
+            </p:cxnSp>
+            <p:sp>
+              <p:nvSpPr>
+                <p:cNvPr id="319" name="テキスト ボックス 318"/>
+                <p:cNvSpPr txBox="1"/>
+                <p:nvPr/>
+              </p:nvSpPr>
+              <p:spPr>
+                <a:xfrm>
+                  <a:off x="5421245" y="5649218"/>
+                  <a:ext cx="801823" cy="307777"/>
+                </a:xfrm>
+                <a:prstGeom prst="rect">
+                  <a:avLst/>
+                </a:prstGeom>
+                <a:noFill/>
+              </p:spPr>
+              <p:txBody>
+                <a:bodyPr wrap="none" rtlCol="0">
+                  <a:spAutoFit/>
+                </a:bodyPr>
+                <a:lstStyle/>
+                <a:p>
+                  <a:r>
+                    <a:rPr lang="en-US" sz="1400" dirty="0" smtClean="0"/>
+                    <a:t>Action-1</a:t>
+                  </a:r>
+                  <a:endParaRPr lang="en-US" sz="1400" dirty="0"/>
+                </a:p>
+              </p:txBody>
+            </p:sp>
+            <p:sp>
+              <p:nvSpPr>
+                <p:cNvPr id="320" name="テキスト ボックス 319"/>
+                <p:cNvSpPr txBox="1"/>
+                <p:nvPr/>
+              </p:nvSpPr>
+              <p:spPr>
+                <a:xfrm>
+                  <a:off x="5413625" y="5949375"/>
+                  <a:ext cx="825867" cy="307777"/>
+                </a:xfrm>
+                <a:prstGeom prst="rect">
+                  <a:avLst/>
+                </a:prstGeom>
+                <a:noFill/>
+              </p:spPr>
+              <p:txBody>
+                <a:bodyPr wrap="none" rtlCol="0">
+                  <a:spAutoFit/>
+                </a:bodyPr>
+                <a:lstStyle/>
+                <a:p>
+                  <a:r>
+                    <a:rPr lang="en-US" sz="1400" dirty="0" smtClean="0"/>
+                    <a:t>Action-N</a:t>
+                  </a:r>
+                  <a:endParaRPr lang="en-US" sz="1400" dirty="0"/>
+                </a:p>
+              </p:txBody>
+            </p:sp>
+          </p:grpSp>
+          <p:sp>
+            <p:nvSpPr>
+              <p:cNvPr id="339" name="テキスト ボックス 338"/>
+              <p:cNvSpPr txBox="1"/>
+              <p:nvPr/>
+            </p:nvSpPr>
+            <p:spPr>
+              <a:xfrm>
+                <a:off x="2523077" y="1224111"/>
+                <a:ext cx="827727" cy="523220"/>
+              </a:xfrm>
+              <a:prstGeom prst="rect">
+                <a:avLst/>
+              </a:prstGeom>
+              <a:noFill/>
+            </p:spPr>
+            <p:txBody>
+              <a:bodyPr wrap="none" rtlCol="0">
+                <a:spAutoFit/>
+              </a:bodyPr>
+              <a:lstStyle/>
+              <a:p>
+                <a:pPr algn="ctr"/>
+                <a:r>
+                  <a:rPr lang="en-US" sz="1400" dirty="0" smtClean="0"/>
+                  <a:t>Startup </a:t>
+                </a:r>
+              </a:p>
+              <a:p>
+                <a:pPr algn="ctr"/>
+                <a:r>
+                  <a:rPr lang="en-US" sz="1400" dirty="0" smtClean="0"/>
+                  <a:t>behavior</a:t>
+                </a:r>
+                <a:endParaRPr lang="en-US" sz="1400" dirty="0"/>
+              </a:p>
+            </p:txBody>
+          </p:sp>
+        </p:grpSp>
+        <p:grpSp>
+          <p:nvGrpSpPr>
+            <p:cNvPr id="346" name="グループ化 345"/>
+            <p:cNvGrpSpPr/>
+            <p:nvPr/>
+          </p:nvGrpSpPr>
+          <p:grpSpPr>
+            <a:xfrm>
+              <a:off x="2112646" y="4854656"/>
+              <a:ext cx="2771774" cy="776287"/>
+              <a:chOff x="2112646" y="4763216"/>
+              <a:chExt cx="2771774" cy="776287"/>
+            </a:xfrm>
+          </p:grpSpPr>
+          <p:sp>
+            <p:nvSpPr>
+              <p:cNvPr id="305" name="正方形/長方形 304"/>
+              <p:cNvSpPr/>
+              <p:nvPr/>
+            </p:nvSpPr>
+            <p:spPr>
+              <a:xfrm>
+                <a:off x="2112646" y="4763216"/>
+                <a:ext cx="2771774" cy="776287"/>
+              </a:xfrm>
+              <a:prstGeom prst="rect">
+                <a:avLst/>
+              </a:prstGeom>
+              <a:solidFill>
+                <a:schemeClr val="bg1"/>
+              </a:solidFill>
+            </p:spPr>
+            <p:style>
+              <a:lnRef idx="2">
+                <a:schemeClr val="dk1">
+                  <a:shade val="50000"/>
+                </a:schemeClr>
+              </a:lnRef>
+              <a:fillRef idx="1">
+                <a:schemeClr val="dk1"/>
+              </a:fillRef>
+              <a:effectRef idx="0">
+                <a:schemeClr val="dk1"/>
+              </a:effectRef>
+              <a:fontRef idx="minor">
+                <a:schemeClr val="lt1"/>
+              </a:fontRef>
+            </p:style>
+            <p:txBody>
+              <a:bodyPr rtlCol="0" anchor="ctr"/>
+              <a:lstStyle/>
+              <a:p>
+                <a:pPr algn="ctr"/>
+                <a:endParaRPr lang="en-US"/>
+              </a:p>
+            </p:txBody>
+          </p:sp>
+          <p:grpSp>
+            <p:nvGrpSpPr>
+              <p:cNvPr id="321" name="グループ化 320"/>
+              <p:cNvGrpSpPr/>
+              <p:nvPr/>
+            </p:nvGrpSpPr>
+            <p:grpSpPr>
+              <a:xfrm>
+                <a:off x="2326481" y="4849265"/>
+                <a:ext cx="2313623" cy="607934"/>
+                <a:chOff x="4071938" y="5649218"/>
+                <a:chExt cx="2313623" cy="607934"/>
+              </a:xfrm>
+            </p:grpSpPr>
+            <p:sp>
+              <p:nvSpPr>
+                <p:cNvPr id="322" name="正方形/長方形 321"/>
+                <p:cNvSpPr/>
+                <p:nvPr/>
+              </p:nvSpPr>
+              <p:spPr>
+                <a:xfrm>
+                  <a:off x="4071938" y="5664817"/>
+                  <a:ext cx="2313623" cy="584714"/>
+                </a:xfrm>
+                <a:prstGeom prst="rect">
+                  <a:avLst/>
+                </a:prstGeom>
+                <a:solidFill>
+                  <a:schemeClr val="bg1"/>
+                </a:solidFill>
+              </p:spPr>
+              <p:style>
+                <a:lnRef idx="2">
+                  <a:schemeClr val="dk1">
+                    <a:shade val="50000"/>
+                  </a:schemeClr>
+                </a:lnRef>
+                <a:fillRef idx="1">
+                  <a:schemeClr val="dk1"/>
+                </a:fillRef>
+                <a:effectRef idx="0">
+                  <a:schemeClr val="dk1"/>
+                </a:effectRef>
+                <a:fontRef idx="minor">
+                  <a:schemeClr val="lt1"/>
+                </a:fontRef>
+              </p:style>
+              <p:txBody>
+                <a:bodyPr rtlCol="0" anchor="ctr"/>
+                <a:lstStyle/>
+                <a:p>
+                  <a:pPr algn="ctr"/>
+                  <a:endParaRPr lang="en-US"/>
+                </a:p>
+              </p:txBody>
+            </p:sp>
+            <p:sp>
+              <p:nvSpPr>
+                <p:cNvPr id="323" name="正方形/長方形 322"/>
+                <p:cNvSpPr/>
+                <p:nvPr/>
+              </p:nvSpPr>
+              <p:spPr>
+                <a:xfrm>
+                  <a:off x="5258754" y="5664817"/>
+                  <a:ext cx="1126807" cy="584714"/>
+                </a:xfrm>
+                <a:prstGeom prst="rect">
+                  <a:avLst/>
+                </a:prstGeom>
+                <a:solidFill>
+                  <a:schemeClr val="bg1"/>
+                </a:solidFill>
+              </p:spPr>
+              <p:style>
+                <a:lnRef idx="2">
+                  <a:schemeClr val="dk1">
+                    <a:shade val="50000"/>
+                  </a:schemeClr>
+                </a:lnRef>
+                <a:fillRef idx="1">
+                  <a:schemeClr val="dk1"/>
+                </a:fillRef>
+                <a:effectRef idx="0">
+                  <a:schemeClr val="dk1"/>
+                </a:effectRef>
+                <a:fontRef idx="minor">
+                  <a:schemeClr val="lt1"/>
+                </a:fontRef>
+              </p:style>
+              <p:txBody>
+                <a:bodyPr rtlCol="0" anchor="ctr"/>
+                <a:lstStyle/>
+                <a:p>
+                  <a:pPr algn="ctr"/>
+                  <a:endParaRPr lang="en-US" dirty="0"/>
+                </a:p>
+              </p:txBody>
+            </p:sp>
+            <p:cxnSp>
+              <p:nvCxnSpPr>
+                <p:cNvPr id="324" name="直線コネクタ 323"/>
+                <p:cNvCxnSpPr>
+                  <a:stCxn id="323" idx="1"/>
+                  <a:endCxn id="322" idx="3"/>
+                </p:cNvCxnSpPr>
+                <p:nvPr/>
+              </p:nvCxnSpPr>
+              <p:spPr>
+                <a:xfrm>
+                  <a:off x="5258754" y="5957174"/>
+                  <a:ext cx="1126807" cy="0"/>
+                </a:xfrm>
+                <a:prstGeom prst="line">
+                  <a:avLst/>
+                </a:prstGeom>
+                <a:ln w="12700">
+                  <a:solidFill>
+                    <a:schemeClr val="tx1"/>
+                  </a:solidFill>
+                </a:ln>
+              </p:spPr>
+              <p:style>
+                <a:lnRef idx="1">
+                  <a:schemeClr val="accent1"/>
+                </a:lnRef>
+                <a:fillRef idx="0">
+                  <a:schemeClr val="accent1"/>
+                </a:fillRef>
+                <a:effectRef idx="0">
+                  <a:schemeClr val="accent1"/>
+                </a:effectRef>
+                <a:fontRef idx="minor">
+                  <a:schemeClr val="tx1"/>
+                </a:fontRef>
+              </p:style>
+            </p:cxnSp>
+            <p:sp>
+              <p:nvSpPr>
+                <p:cNvPr id="325" name="テキスト ボックス 324"/>
+                <p:cNvSpPr txBox="1"/>
+                <p:nvPr/>
+              </p:nvSpPr>
+              <p:spPr>
+                <a:xfrm>
+                  <a:off x="5421245" y="5649218"/>
+                  <a:ext cx="801823" cy="307777"/>
+                </a:xfrm>
+                <a:prstGeom prst="rect">
+                  <a:avLst/>
+                </a:prstGeom>
+                <a:noFill/>
+              </p:spPr>
+              <p:txBody>
+                <a:bodyPr wrap="none" rtlCol="0">
+                  <a:spAutoFit/>
+                </a:bodyPr>
+                <a:lstStyle/>
+                <a:p>
+                  <a:r>
+                    <a:rPr lang="en-US" sz="1400" dirty="0" smtClean="0"/>
+                    <a:t>Action-1</a:t>
+                  </a:r>
+                  <a:endParaRPr lang="en-US" sz="1400" dirty="0"/>
+                </a:p>
+              </p:txBody>
+            </p:sp>
+            <p:sp>
+              <p:nvSpPr>
+                <p:cNvPr id="326" name="テキスト ボックス 325"/>
+                <p:cNvSpPr txBox="1"/>
+                <p:nvPr/>
+              </p:nvSpPr>
+              <p:spPr>
+                <a:xfrm>
+                  <a:off x="5413625" y="5949375"/>
+                  <a:ext cx="825867" cy="307777"/>
+                </a:xfrm>
+                <a:prstGeom prst="rect">
+                  <a:avLst/>
+                </a:prstGeom>
+                <a:noFill/>
+              </p:spPr>
+              <p:txBody>
+                <a:bodyPr wrap="none" rtlCol="0">
+                  <a:spAutoFit/>
+                </a:bodyPr>
+                <a:lstStyle/>
+                <a:p>
+                  <a:r>
+                    <a:rPr lang="en-US" sz="1400" dirty="0" smtClean="0"/>
+                    <a:t>Action-N</a:t>
+                  </a:r>
+                  <a:endParaRPr lang="en-US" sz="1400" dirty="0"/>
+                </a:p>
+              </p:txBody>
+            </p:sp>
+          </p:grpSp>
+          <p:sp>
+            <p:nvSpPr>
+              <p:cNvPr id="340" name="テキスト ボックス 339"/>
+              <p:cNvSpPr txBox="1"/>
+              <p:nvPr/>
+            </p:nvSpPr>
+            <p:spPr>
+              <a:xfrm>
+                <a:off x="2521081" y="4896178"/>
+                <a:ext cx="827727" cy="523220"/>
+              </a:xfrm>
+              <a:prstGeom prst="rect">
+                <a:avLst/>
+              </a:prstGeom>
+              <a:noFill/>
+            </p:spPr>
+            <p:txBody>
+              <a:bodyPr wrap="none" rtlCol="0">
+                <a:spAutoFit/>
+              </a:bodyPr>
+              <a:lstStyle/>
+              <a:p>
+                <a:pPr algn="ctr"/>
+                <a:r>
+                  <a:rPr lang="en-US" sz="1400" dirty="0" smtClean="0"/>
+                  <a:t>Exit</a:t>
+                </a:r>
+              </a:p>
+              <a:p>
+                <a:pPr algn="ctr"/>
+                <a:r>
+                  <a:rPr lang="en-US" sz="1400" dirty="0" smtClean="0"/>
+                  <a:t>behavior</a:t>
+                </a:r>
+                <a:endParaRPr lang="en-US" sz="1400" dirty="0"/>
+              </a:p>
+            </p:txBody>
+          </p:sp>
+        </p:grpSp>
+        <p:sp>
+          <p:nvSpPr>
+            <p:cNvPr id="341" name="テキスト ボックス 340"/>
+            <p:cNvSpPr txBox="1"/>
+            <p:nvPr/>
+          </p:nvSpPr>
+          <p:spPr>
+            <a:xfrm>
+              <a:off x="2454359" y="2876280"/>
+              <a:ext cx="764376" cy="523220"/>
+            </a:xfrm>
+            <a:prstGeom prst="rect">
+              <a:avLst/>
+            </a:prstGeom>
+            <a:noFill/>
+          </p:spPr>
+          <p:txBody>
+            <a:bodyPr wrap="none" rtlCol="0">
+              <a:spAutoFit/>
+            </a:bodyPr>
+            <a:lstStyle/>
+            <a:p>
+              <a:pPr algn="ctr"/>
+              <a:r>
+                <a:rPr lang="en-US" sz="1400" dirty="0" smtClean="0"/>
+                <a:t>Startup </a:t>
+              </a:r>
+            </a:p>
+            <a:p>
+              <a:pPr algn="ctr"/>
+              <a:r>
+                <a:rPr lang="en-US" sz="1400" dirty="0" smtClean="0"/>
+                <a:t>block</a:t>
+              </a:r>
+              <a:endParaRPr lang="en-US" sz="1400" dirty="0"/>
+            </a:p>
+          </p:txBody>
+        </p:sp>
+        <p:sp>
+          <p:nvSpPr>
+            <p:cNvPr id="342" name="テキスト ボックス 341"/>
+            <p:cNvSpPr txBox="1"/>
+            <p:nvPr/>
+          </p:nvSpPr>
+          <p:spPr>
+            <a:xfrm>
+              <a:off x="2539382" y="3508437"/>
+              <a:ext cx="594330" cy="523220"/>
+            </a:xfrm>
+            <a:prstGeom prst="rect">
+              <a:avLst/>
+            </a:prstGeom>
+            <a:noFill/>
+          </p:spPr>
+          <p:txBody>
+            <a:bodyPr wrap="none" rtlCol="0">
+              <a:spAutoFit/>
+            </a:bodyPr>
+            <a:lstStyle/>
+            <a:p>
+              <a:pPr algn="ctr"/>
+              <a:r>
+                <a:rPr lang="en-US" sz="1400" dirty="0" smtClean="0"/>
+                <a:t>Cyclic</a:t>
+              </a:r>
+            </a:p>
+            <a:p>
+              <a:pPr algn="ctr"/>
+              <a:r>
+                <a:rPr lang="en-US" sz="1400" dirty="0" smtClean="0"/>
+                <a:t>block</a:t>
+              </a:r>
+              <a:endParaRPr lang="en-US" sz="1400" dirty="0"/>
+            </a:p>
+          </p:txBody>
+        </p:sp>
+        <p:sp>
+          <p:nvSpPr>
+            <p:cNvPr id="343" name="テキスト ボックス 342"/>
+            <p:cNvSpPr txBox="1"/>
+            <p:nvPr/>
+          </p:nvSpPr>
+          <p:spPr>
+            <a:xfrm>
+              <a:off x="2550250" y="4180052"/>
+              <a:ext cx="572593" cy="523220"/>
+            </a:xfrm>
+            <a:prstGeom prst="rect">
+              <a:avLst/>
+            </a:prstGeom>
+            <a:noFill/>
+          </p:spPr>
+          <p:txBody>
+            <a:bodyPr wrap="none" rtlCol="0">
+              <a:spAutoFit/>
+            </a:bodyPr>
+            <a:lstStyle/>
+            <a:p>
+              <a:pPr algn="ctr"/>
+              <a:r>
+                <a:rPr lang="en-US" sz="1400" dirty="0" smtClean="0"/>
+                <a:t>Exit</a:t>
+              </a:r>
+            </a:p>
+            <a:p>
+              <a:pPr algn="ctr"/>
+              <a:r>
+                <a:rPr lang="en-US" sz="1400" dirty="0" smtClean="0"/>
+                <a:t>block</a:t>
+              </a:r>
+              <a:endParaRPr lang="en-US" sz="1400" dirty="0"/>
+            </a:p>
+          </p:txBody>
+        </p:sp>
+        <p:sp>
+          <p:nvSpPr>
+            <p:cNvPr id="344" name="テキスト ボックス 343"/>
+            <p:cNvSpPr txBox="1"/>
+            <p:nvPr/>
+          </p:nvSpPr>
+          <p:spPr>
+            <a:xfrm>
+              <a:off x="2103532" y="2133806"/>
+              <a:ext cx="2499274" cy="738664"/>
+            </a:xfrm>
+            <a:prstGeom prst="rect">
+              <a:avLst/>
+            </a:prstGeom>
+            <a:noFill/>
+          </p:spPr>
+          <p:txBody>
+            <a:bodyPr wrap="none" rtlCol="0">
+              <a:spAutoFit/>
+            </a:bodyPr>
+            <a:lstStyle/>
+            <a:p>
+              <a:pPr algn="ctr"/>
+              <a:r>
+                <a:rPr lang="en-US" sz="1400" dirty="0" smtClean="0"/>
+                <a:t>Trigger behavior</a:t>
+              </a:r>
+            </a:p>
+            <a:p>
+              <a:r>
+                <a:rPr lang="en-US" sz="1400" dirty="0"/>
+                <a:t>Lifetime: &lt;Once, Until, Forever&gt;</a:t>
+              </a:r>
+            </a:p>
+            <a:p>
+              <a:r>
+                <a:rPr lang="en-US" sz="1400" dirty="0" smtClean="0"/>
+                <a:t>Priority: &lt;Low, Normal, High&gt;</a:t>
+              </a:r>
+              <a:endParaRPr lang="en-US" sz="1400" dirty="0"/>
+            </a:p>
+          </p:txBody>
+        </p:sp>
+      </p:grpSp>
     </p:spTree>
     <p:extLst>
       <p:ext uri="{BB962C8B-B14F-4D97-AF65-F5344CB8AC3E}">
         <p14:creationId xmlns:p14="http://schemas.microsoft.com/office/powerpoint/2010/main" val="4228795550"/>
+      </p:ext>
+    </p:extLst>
+  </p:cSld>
+  <p:clrMapOvr>
+    <a:masterClrMapping/>
+  </p:clrMapOvr>
+</p:sld>
+</file>
+
+<file path=ppt/slides/slide4.xml><?xml version="1.0" encoding="utf-8"?>
+<p:sld xmlns:a="http://schemas.openxmlformats.org/drawingml/2006/main" xmlns:r="http://schemas.openxmlformats.org/officeDocument/2006/relationships" xmlns:p="http://schemas.openxmlformats.org/presentationml/2006/main">
+  <p:cSld>
+    <p:spTree>
+      <p:nvGrpSpPr>
+        <p:cNvPr id="1" name=""/>
+        <p:cNvGrpSpPr/>
+        <p:nvPr/>
+      </p:nvGrpSpPr>
+      <p:grpSpPr>
+        <a:xfrm>
+          <a:off x="0" y="0"/>
+          <a:ext cx="0" cy="0"/>
+          <a:chOff x="0" y="0"/>
+          <a:chExt cx="0" cy="0"/>
+        </a:xfrm>
+      </p:grpSpPr>
+      <p:grpSp>
+        <p:nvGrpSpPr>
+          <p:cNvPr id="99" name="グループ化 98"/>
+          <p:cNvGrpSpPr/>
+          <p:nvPr/>
+        </p:nvGrpSpPr>
+        <p:grpSpPr>
+          <a:xfrm>
+            <a:off x="4015740" y="983954"/>
+            <a:ext cx="4762500" cy="731195"/>
+            <a:chOff x="4015740" y="983954"/>
+            <a:chExt cx="4762500" cy="731195"/>
+          </a:xfrm>
+        </p:grpSpPr>
+        <p:sp>
+          <p:nvSpPr>
+            <p:cNvPr id="6" name="正方形/長方形 5"/>
+            <p:cNvSpPr/>
+            <p:nvPr/>
+          </p:nvSpPr>
+          <p:spPr>
+            <a:xfrm>
+              <a:off x="4015740" y="989894"/>
+              <a:ext cx="996332" cy="724605"/>
+            </a:xfrm>
+            <a:prstGeom prst="rect">
+              <a:avLst/>
+            </a:prstGeom>
+            <a:solidFill>
+              <a:schemeClr val="bg1"/>
+            </a:solidFill>
+          </p:spPr>
+          <p:style>
+            <a:lnRef idx="2">
+              <a:schemeClr val="dk1">
+                <a:shade val="50000"/>
+              </a:schemeClr>
+            </a:lnRef>
+            <a:fillRef idx="1">
+              <a:schemeClr val="dk1"/>
+            </a:fillRef>
+            <a:effectRef idx="0">
+              <a:schemeClr val="dk1"/>
+            </a:effectRef>
+            <a:fontRef idx="minor">
+              <a:schemeClr val="lt1"/>
+            </a:fontRef>
+          </p:style>
+          <p:txBody>
+            <a:bodyPr rtlCol="0" anchor="ctr"/>
+            <a:lstStyle/>
+            <a:p>
+              <a:pPr algn="ctr"/>
+              <a:r>
+                <a:rPr lang="en-US" sz="1400" dirty="0" smtClean="0">
+                  <a:solidFill>
+                    <a:schemeClr val="tx1"/>
+                  </a:solidFill>
+                </a:rPr>
+                <a:t>Behavior</a:t>
+              </a:r>
+            </a:p>
+            <a:p>
+              <a:pPr algn="ctr"/>
+              <a:r>
+                <a:rPr lang="en-US" sz="1400" dirty="0" smtClean="0">
+                  <a:solidFill>
+                    <a:schemeClr val="tx1"/>
+                  </a:solidFill>
+                </a:rPr>
+                <a:t>Execution</a:t>
+              </a:r>
+            </a:p>
+            <a:p>
+              <a:pPr algn="ctr"/>
+              <a:r>
+                <a:rPr lang="en-US" sz="1400" dirty="0" smtClean="0">
+                  <a:solidFill>
+                    <a:schemeClr val="tx1"/>
+                  </a:solidFill>
+                </a:rPr>
+                <a:t>Engine</a:t>
+              </a:r>
+              <a:endParaRPr lang="en-US" sz="1400" dirty="0">
+                <a:solidFill>
+                  <a:schemeClr val="tx1"/>
+                </a:solidFill>
+              </a:endParaRPr>
+            </a:p>
+          </p:txBody>
+        </p:sp>
+        <p:cxnSp>
+          <p:nvCxnSpPr>
+            <p:cNvPr id="60" name="直線矢印コネクタ 59"/>
+            <p:cNvCxnSpPr>
+              <a:stCxn id="6" idx="3"/>
+              <a:endCxn id="90" idx="1"/>
+            </p:cNvCxnSpPr>
+            <p:nvPr/>
+          </p:nvCxnSpPr>
+          <p:spPr>
+            <a:xfrm flipV="1">
+              <a:off x="5012072" y="1346257"/>
+              <a:ext cx="247302" cy="5940"/>
+            </a:xfrm>
+            <a:prstGeom prst="straightConnector1">
+              <a:avLst/>
+            </a:prstGeom>
+            <a:ln w="12700">
+              <a:solidFill>
+                <a:schemeClr val="tx1"/>
+              </a:solidFill>
+              <a:tailEnd type="triangle"/>
+            </a:ln>
+          </p:spPr>
+          <p:style>
+            <a:lnRef idx="1">
+              <a:schemeClr val="accent1"/>
+            </a:lnRef>
+            <a:fillRef idx="0">
+              <a:schemeClr val="accent1"/>
+            </a:fillRef>
+            <a:effectRef idx="0">
+              <a:schemeClr val="accent1"/>
+            </a:effectRef>
+            <a:fontRef idx="minor">
+              <a:schemeClr val="tx1"/>
+            </a:fontRef>
+          </p:style>
+        </p:cxnSp>
+        <p:cxnSp>
+          <p:nvCxnSpPr>
+            <p:cNvPr id="61" name="直線矢印コネクタ 60"/>
+            <p:cNvCxnSpPr>
+              <a:stCxn id="90" idx="3"/>
+              <a:endCxn id="91" idx="1"/>
+            </p:cNvCxnSpPr>
+            <p:nvPr/>
+          </p:nvCxnSpPr>
+          <p:spPr>
+            <a:xfrm>
+              <a:off x="6255706" y="1346257"/>
+              <a:ext cx="228621" cy="6590"/>
+            </a:xfrm>
+            <a:prstGeom prst="straightConnector1">
+              <a:avLst/>
+            </a:prstGeom>
+            <a:ln w="12700">
+              <a:solidFill>
+                <a:schemeClr val="tx1"/>
+              </a:solidFill>
+              <a:tailEnd type="triangle"/>
+            </a:ln>
+          </p:spPr>
+          <p:style>
+            <a:lnRef idx="1">
+              <a:schemeClr val="accent1"/>
+            </a:lnRef>
+            <a:fillRef idx="0">
+              <a:schemeClr val="accent1"/>
+            </a:fillRef>
+            <a:effectRef idx="0">
+              <a:schemeClr val="accent1"/>
+            </a:effectRef>
+            <a:fontRef idx="minor">
+              <a:schemeClr val="tx1"/>
+            </a:fontRef>
+          </p:style>
+        </p:cxnSp>
+        <p:cxnSp>
+          <p:nvCxnSpPr>
+            <p:cNvPr id="64" name="直線矢印コネクタ 63"/>
+            <p:cNvCxnSpPr>
+              <a:stCxn id="91" idx="3"/>
+              <a:endCxn id="92" idx="1"/>
+            </p:cNvCxnSpPr>
+            <p:nvPr/>
+          </p:nvCxnSpPr>
+          <p:spPr>
+            <a:xfrm flipV="1">
+              <a:off x="7480659" y="1352846"/>
+              <a:ext cx="266721" cy="1"/>
+            </a:xfrm>
+            <a:prstGeom prst="straightConnector1">
+              <a:avLst/>
+            </a:prstGeom>
+            <a:ln w="12700">
+              <a:solidFill>
+                <a:schemeClr val="tx1"/>
+              </a:solidFill>
+              <a:tailEnd type="triangle"/>
+            </a:ln>
+          </p:spPr>
+          <p:style>
+            <a:lnRef idx="1">
+              <a:schemeClr val="accent1"/>
+            </a:lnRef>
+            <a:fillRef idx="0">
+              <a:schemeClr val="accent1"/>
+            </a:fillRef>
+            <a:effectRef idx="0">
+              <a:schemeClr val="accent1"/>
+            </a:effectRef>
+            <a:fontRef idx="minor">
+              <a:schemeClr val="tx1"/>
+            </a:fontRef>
+          </p:style>
+        </p:cxnSp>
+        <p:sp>
+          <p:nvSpPr>
+            <p:cNvPr id="90" name="正方形/長方形 89"/>
+            <p:cNvSpPr/>
+            <p:nvPr/>
+          </p:nvSpPr>
+          <p:spPr>
+            <a:xfrm>
+              <a:off x="5259374" y="983954"/>
+              <a:ext cx="996332" cy="724605"/>
+            </a:xfrm>
+            <a:prstGeom prst="rect">
+              <a:avLst/>
+            </a:prstGeom>
+            <a:solidFill>
+              <a:schemeClr val="bg1"/>
+            </a:solidFill>
+          </p:spPr>
+          <p:style>
+            <a:lnRef idx="2">
+              <a:schemeClr val="dk1">
+                <a:shade val="50000"/>
+              </a:schemeClr>
+            </a:lnRef>
+            <a:fillRef idx="1">
+              <a:schemeClr val="dk1"/>
+            </a:fillRef>
+            <a:effectRef idx="0">
+              <a:schemeClr val="dk1"/>
+            </a:effectRef>
+            <a:fontRef idx="minor">
+              <a:schemeClr val="lt1"/>
+            </a:fontRef>
+          </p:style>
+          <p:txBody>
+            <a:bodyPr rtlCol="0" anchor="ctr"/>
+            <a:lstStyle/>
+            <a:p>
+              <a:pPr algn="ctr"/>
+              <a:r>
+                <a:rPr lang="en-US" sz="1400" dirty="0" smtClean="0">
+                  <a:solidFill>
+                    <a:schemeClr val="tx1"/>
+                  </a:solidFill>
+                </a:rPr>
+                <a:t>Behavior</a:t>
+              </a:r>
+            </a:p>
+            <a:p>
+              <a:pPr algn="ctr"/>
+              <a:r>
+                <a:rPr lang="en-US" sz="1400" dirty="0" smtClean="0">
+                  <a:solidFill>
+                    <a:schemeClr val="tx1"/>
+                  </a:solidFill>
+                </a:rPr>
+                <a:t>Program</a:t>
+              </a:r>
+              <a:endParaRPr lang="en-US" sz="1400" dirty="0">
+                <a:solidFill>
+                  <a:schemeClr val="tx1"/>
+                </a:solidFill>
+              </a:endParaRPr>
+            </a:p>
+          </p:txBody>
+        </p:sp>
+        <p:sp>
+          <p:nvSpPr>
+            <p:cNvPr id="91" name="正方形/長方形 90"/>
+            <p:cNvSpPr/>
+            <p:nvPr/>
+          </p:nvSpPr>
+          <p:spPr>
+            <a:xfrm>
+              <a:off x="6484327" y="990544"/>
+              <a:ext cx="996332" cy="724605"/>
+            </a:xfrm>
+            <a:prstGeom prst="rect">
+              <a:avLst/>
+            </a:prstGeom>
+            <a:solidFill>
+              <a:schemeClr val="bg1"/>
+            </a:solidFill>
+          </p:spPr>
+          <p:style>
+            <a:lnRef idx="2">
+              <a:schemeClr val="dk1">
+                <a:shade val="50000"/>
+              </a:schemeClr>
+            </a:lnRef>
+            <a:fillRef idx="1">
+              <a:schemeClr val="dk1"/>
+            </a:fillRef>
+            <a:effectRef idx="0">
+              <a:schemeClr val="dk1"/>
+            </a:effectRef>
+            <a:fontRef idx="minor">
+              <a:schemeClr val="lt1"/>
+            </a:fontRef>
+          </p:style>
+          <p:txBody>
+            <a:bodyPr rtlCol="0" anchor="ctr"/>
+            <a:lstStyle/>
+            <a:p>
+              <a:pPr algn="ctr"/>
+              <a:r>
+                <a:rPr lang="en-US" sz="1400" dirty="0" smtClean="0">
+                  <a:solidFill>
+                    <a:schemeClr val="tx1"/>
+                  </a:solidFill>
+                </a:rPr>
+                <a:t>Behavior Execution Context</a:t>
+              </a:r>
+              <a:endParaRPr lang="en-US" sz="1400" dirty="0">
+                <a:solidFill>
+                  <a:schemeClr val="tx1"/>
+                </a:solidFill>
+              </a:endParaRPr>
+            </a:p>
+          </p:txBody>
+        </p:sp>
+        <p:sp>
+          <p:nvSpPr>
+            <p:cNvPr id="92" name="正方形/長方形 91"/>
+            <p:cNvSpPr/>
+            <p:nvPr/>
+          </p:nvSpPr>
+          <p:spPr>
+            <a:xfrm>
+              <a:off x="7747380" y="990543"/>
+              <a:ext cx="1030860" cy="724605"/>
+            </a:xfrm>
+            <a:prstGeom prst="rect">
+              <a:avLst/>
+            </a:prstGeom>
+            <a:solidFill>
+              <a:schemeClr val="bg1"/>
+            </a:solidFill>
+          </p:spPr>
+          <p:style>
+            <a:lnRef idx="2">
+              <a:schemeClr val="dk1">
+                <a:shade val="50000"/>
+              </a:schemeClr>
+            </a:lnRef>
+            <a:fillRef idx="1">
+              <a:schemeClr val="dk1"/>
+            </a:fillRef>
+            <a:effectRef idx="0">
+              <a:schemeClr val="dk1"/>
+            </a:effectRef>
+            <a:fontRef idx="minor">
+              <a:schemeClr val="lt1"/>
+            </a:fontRef>
+          </p:style>
+          <p:txBody>
+            <a:bodyPr rtlCol="0" anchor="ctr"/>
+            <a:lstStyle/>
+            <a:p>
+              <a:pPr algn="ctr"/>
+              <a:r>
+                <a:rPr lang="en-US" sz="1400" dirty="0" smtClean="0">
+                  <a:solidFill>
+                    <a:schemeClr val="tx1"/>
+                  </a:solidFill>
+                </a:rPr>
+                <a:t>Application Context</a:t>
+              </a:r>
+              <a:endParaRPr lang="en-US" sz="1400" dirty="0">
+                <a:solidFill>
+                  <a:schemeClr val="tx1"/>
+                </a:solidFill>
+              </a:endParaRPr>
+            </a:p>
+          </p:txBody>
+        </p:sp>
+      </p:grpSp>
+      <p:grpSp>
+        <p:nvGrpSpPr>
+          <p:cNvPr id="146" name="グループ化 145"/>
+          <p:cNvGrpSpPr/>
+          <p:nvPr/>
+        </p:nvGrpSpPr>
+        <p:grpSpPr>
+          <a:xfrm>
+            <a:off x="2750820" y="2414834"/>
+            <a:ext cx="5440680" cy="1633927"/>
+            <a:chOff x="2750820" y="2414834"/>
+            <a:chExt cx="5440680" cy="1633927"/>
+          </a:xfrm>
+        </p:grpSpPr>
+        <p:grpSp>
+          <p:nvGrpSpPr>
+            <p:cNvPr id="100" name="グループ化 99"/>
+            <p:cNvGrpSpPr/>
+            <p:nvPr/>
+          </p:nvGrpSpPr>
+          <p:grpSpPr>
+            <a:xfrm>
+              <a:off x="4015740" y="2414834"/>
+              <a:ext cx="4175760" cy="725255"/>
+              <a:chOff x="4015740" y="989894"/>
+              <a:chExt cx="4175760" cy="725255"/>
+            </a:xfrm>
+          </p:grpSpPr>
+          <p:sp>
+            <p:nvSpPr>
+              <p:cNvPr id="101" name="正方形/長方形 100"/>
+              <p:cNvSpPr/>
+              <p:nvPr/>
+            </p:nvSpPr>
+            <p:spPr>
+              <a:xfrm>
+                <a:off x="4015740" y="989894"/>
+                <a:ext cx="996332" cy="724605"/>
+              </a:xfrm>
+              <a:prstGeom prst="rect">
+                <a:avLst/>
+              </a:prstGeom>
+              <a:solidFill>
+                <a:schemeClr val="bg1"/>
+              </a:solidFill>
+            </p:spPr>
+            <p:style>
+              <a:lnRef idx="2">
+                <a:schemeClr val="dk1">
+                  <a:shade val="50000"/>
+                </a:schemeClr>
+              </a:lnRef>
+              <a:fillRef idx="1">
+                <a:schemeClr val="dk1"/>
+              </a:fillRef>
+              <a:effectRef idx="0">
+                <a:schemeClr val="dk1"/>
+              </a:effectRef>
+              <a:fontRef idx="minor">
+                <a:schemeClr val="lt1"/>
+              </a:fontRef>
+            </p:style>
+            <p:txBody>
+              <a:bodyPr rtlCol="0" anchor="ctr"/>
+              <a:lstStyle/>
+              <a:p>
+                <a:pPr algn="ctr"/>
+                <a:r>
+                  <a:rPr lang="en-US" sz="1400" dirty="0" smtClean="0">
+                    <a:solidFill>
+                      <a:schemeClr val="tx1"/>
+                    </a:solidFill>
+                  </a:rPr>
+                  <a:t>Visual Gesture Builder</a:t>
+                </a:r>
+                <a:endParaRPr lang="en-US" sz="1400" dirty="0">
+                  <a:solidFill>
+                    <a:schemeClr val="tx1"/>
+                  </a:solidFill>
+                </a:endParaRPr>
+              </a:p>
+            </p:txBody>
+          </p:sp>
+          <p:cxnSp>
+            <p:nvCxnSpPr>
+              <p:cNvPr id="102" name="直線矢印コネクタ 101"/>
+              <p:cNvCxnSpPr>
+                <a:stCxn id="101" idx="3"/>
+                <a:endCxn id="108" idx="2"/>
+              </p:cNvCxnSpPr>
+              <p:nvPr/>
+            </p:nvCxnSpPr>
+            <p:spPr>
+              <a:xfrm>
+                <a:off x="5012072" y="1352197"/>
+                <a:ext cx="321592" cy="10268"/>
+              </a:xfrm>
+              <a:prstGeom prst="straightConnector1">
+                <a:avLst/>
+              </a:prstGeom>
+              <a:ln w="12700">
+                <a:solidFill>
+                  <a:schemeClr val="tx1"/>
+                </a:solidFill>
+                <a:tailEnd type="triangle"/>
+              </a:ln>
+            </p:spPr>
+            <p:style>
+              <a:lnRef idx="1">
+                <a:schemeClr val="accent1"/>
+              </a:lnRef>
+              <a:fillRef idx="0">
+                <a:schemeClr val="accent1"/>
+              </a:fillRef>
+              <a:effectRef idx="0">
+                <a:schemeClr val="accent1"/>
+              </a:effectRef>
+              <a:fontRef idx="minor">
+                <a:schemeClr val="tx1"/>
+              </a:fontRef>
+            </p:style>
+          </p:cxnSp>
+          <p:cxnSp>
+            <p:nvCxnSpPr>
+              <p:cNvPr id="103" name="直線矢印コネクタ 102"/>
+              <p:cNvCxnSpPr>
+                <a:stCxn id="108" idx="4"/>
+                <a:endCxn id="106" idx="1"/>
+              </p:cNvCxnSpPr>
+              <p:nvPr/>
+            </p:nvCxnSpPr>
+            <p:spPr>
+              <a:xfrm flipV="1">
+                <a:off x="6233160" y="1352847"/>
+                <a:ext cx="464527" cy="9618"/>
+              </a:xfrm>
+              <a:prstGeom prst="straightConnector1">
+                <a:avLst/>
+              </a:prstGeom>
+              <a:ln w="12700">
+                <a:solidFill>
+                  <a:schemeClr val="tx1"/>
+                </a:solidFill>
+                <a:prstDash val="sysDot"/>
+                <a:tailEnd type="triangle"/>
+              </a:ln>
+            </p:spPr>
+            <p:style>
+              <a:lnRef idx="1">
+                <a:schemeClr val="accent1"/>
+              </a:lnRef>
+              <a:fillRef idx="0">
+                <a:schemeClr val="accent1"/>
+              </a:fillRef>
+              <a:effectRef idx="0">
+                <a:schemeClr val="accent1"/>
+              </a:effectRef>
+              <a:fontRef idx="minor">
+                <a:schemeClr val="tx1"/>
+              </a:fontRef>
+            </p:style>
+          </p:cxnSp>
+          <p:sp>
+            <p:nvSpPr>
+              <p:cNvPr id="106" name="正方形/長方形 105"/>
+              <p:cNvSpPr/>
+              <p:nvPr/>
+            </p:nvSpPr>
+            <p:spPr>
+              <a:xfrm>
+                <a:off x="6697687" y="990544"/>
+                <a:ext cx="467381" cy="724605"/>
+              </a:xfrm>
+              <a:prstGeom prst="rect">
+                <a:avLst/>
+              </a:prstGeom>
+              <a:solidFill>
+                <a:schemeClr val="bg1"/>
+              </a:solidFill>
+            </p:spPr>
+            <p:style>
+              <a:lnRef idx="2">
+                <a:schemeClr val="dk1">
+                  <a:shade val="50000"/>
+                </a:schemeClr>
+              </a:lnRef>
+              <a:fillRef idx="1">
+                <a:schemeClr val="dk1"/>
+              </a:fillRef>
+              <a:effectRef idx="0">
+                <a:schemeClr val="dk1"/>
+              </a:effectRef>
+              <a:fontRef idx="minor">
+                <a:schemeClr val="lt1"/>
+              </a:fontRef>
+            </p:style>
+            <p:txBody>
+              <a:bodyPr vert="vert270" rtlCol="0" anchor="ctr"/>
+              <a:lstStyle/>
+              <a:p>
+                <a:pPr algn="ctr"/>
+                <a:r>
+                  <a:rPr lang="en-US" sz="1400" dirty="0" smtClean="0">
+                    <a:solidFill>
+                      <a:schemeClr val="tx1"/>
+                    </a:solidFill>
+                  </a:rPr>
+                  <a:t>Gesture Runtime</a:t>
+                </a:r>
+                <a:endParaRPr lang="en-US" sz="1400" dirty="0">
+                  <a:solidFill>
+                    <a:schemeClr val="tx1"/>
+                  </a:solidFill>
+                </a:endParaRPr>
+              </a:p>
+            </p:txBody>
+          </p:sp>
+          <p:sp>
+            <p:nvSpPr>
+              <p:cNvPr id="107" name="正方形/長方形 106"/>
+              <p:cNvSpPr/>
+              <p:nvPr/>
+            </p:nvSpPr>
+            <p:spPr>
+              <a:xfrm>
+                <a:off x="7160640" y="990543"/>
+                <a:ext cx="1030860" cy="724605"/>
+              </a:xfrm>
+              <a:prstGeom prst="rect">
+                <a:avLst/>
+              </a:prstGeom>
+              <a:solidFill>
+                <a:schemeClr val="bg1"/>
+              </a:solidFill>
+            </p:spPr>
+            <p:style>
+              <a:lnRef idx="2">
+                <a:schemeClr val="dk1">
+                  <a:shade val="50000"/>
+                </a:schemeClr>
+              </a:lnRef>
+              <a:fillRef idx="1">
+                <a:schemeClr val="dk1"/>
+              </a:fillRef>
+              <a:effectRef idx="0">
+                <a:schemeClr val="dk1"/>
+              </a:effectRef>
+              <a:fontRef idx="minor">
+                <a:schemeClr val="lt1"/>
+              </a:fontRef>
+            </p:style>
+            <p:txBody>
+              <a:bodyPr rtlCol="0" anchor="ctr"/>
+              <a:lstStyle/>
+              <a:p>
+                <a:pPr algn="ctr"/>
+                <a:r>
+                  <a:rPr lang="en-US" sz="1400" dirty="0" smtClean="0">
+                    <a:solidFill>
+                      <a:schemeClr val="tx1"/>
+                    </a:solidFill>
+                  </a:rPr>
+                  <a:t>Application</a:t>
+                </a:r>
+                <a:endParaRPr lang="en-US" sz="1400" dirty="0">
+                  <a:solidFill>
+                    <a:schemeClr val="tx1"/>
+                  </a:solidFill>
+                </a:endParaRPr>
+              </a:p>
+            </p:txBody>
+          </p:sp>
+        </p:grpSp>
+        <p:sp>
+          <p:nvSpPr>
+            <p:cNvPr id="108" name="円柱 107"/>
+            <p:cNvSpPr/>
+            <p:nvPr/>
+          </p:nvSpPr>
+          <p:spPr>
+            <a:xfrm>
+              <a:off x="5333664" y="2488711"/>
+              <a:ext cx="899496" cy="597387"/>
+            </a:xfrm>
+            <a:prstGeom prst="can">
+              <a:avLst/>
+            </a:prstGeom>
+            <a:noFill/>
+          </p:spPr>
+          <p:style>
+            <a:lnRef idx="2">
+              <a:schemeClr val="dk1">
+                <a:shade val="50000"/>
+              </a:schemeClr>
+            </a:lnRef>
+            <a:fillRef idx="1">
+              <a:schemeClr val="dk1"/>
+            </a:fillRef>
+            <a:effectRef idx="0">
+              <a:schemeClr val="dk1"/>
+            </a:effectRef>
+            <a:fontRef idx="minor">
+              <a:schemeClr val="lt1"/>
+            </a:fontRef>
+          </p:style>
+          <p:txBody>
+            <a:bodyPr rtlCol="0" anchor="ctr"/>
+            <a:lstStyle/>
+            <a:p>
+              <a:pPr algn="ctr"/>
+              <a:r>
+                <a:rPr lang="en-US" sz="1400" dirty="0" smtClean="0">
+                  <a:solidFill>
+                    <a:schemeClr val="tx1"/>
+                  </a:solidFill>
+                </a:rPr>
+                <a:t>Gesture</a:t>
+              </a:r>
+            </a:p>
+            <a:p>
+              <a:pPr algn="ctr"/>
+              <a:r>
+                <a:rPr lang="en-US" sz="1400" dirty="0" smtClean="0">
+                  <a:solidFill>
+                    <a:schemeClr val="tx1"/>
+                  </a:solidFill>
+                </a:rPr>
+                <a:t>Database</a:t>
+              </a:r>
+              <a:endParaRPr lang="en-US" sz="1400" dirty="0">
+                <a:solidFill>
+                  <a:schemeClr val="tx1"/>
+                </a:solidFill>
+              </a:endParaRPr>
+            </a:p>
+          </p:txBody>
+        </p:sp>
+        <p:sp>
+          <p:nvSpPr>
+            <p:cNvPr id="124" name="正方形/長方形 123"/>
+            <p:cNvSpPr/>
+            <p:nvPr/>
+          </p:nvSpPr>
+          <p:spPr>
+            <a:xfrm>
+              <a:off x="4015740" y="3324156"/>
+              <a:ext cx="996332" cy="724605"/>
+            </a:xfrm>
+            <a:prstGeom prst="rect">
+              <a:avLst/>
+            </a:prstGeom>
+            <a:solidFill>
+              <a:schemeClr val="bg1"/>
+            </a:solidFill>
+          </p:spPr>
+          <p:style>
+            <a:lnRef idx="2">
+              <a:schemeClr val="dk1">
+                <a:shade val="50000"/>
+              </a:schemeClr>
+            </a:lnRef>
+            <a:fillRef idx="1">
+              <a:schemeClr val="dk1"/>
+            </a:fillRef>
+            <a:effectRef idx="0">
+              <a:schemeClr val="dk1"/>
+            </a:effectRef>
+            <a:fontRef idx="minor">
+              <a:schemeClr val="lt1"/>
+            </a:fontRef>
+          </p:style>
+          <p:txBody>
+            <a:bodyPr rtlCol="0" anchor="ctr"/>
+            <a:lstStyle/>
+            <a:p>
+              <a:pPr algn="ctr"/>
+              <a:r>
+                <a:rPr lang="en-US" sz="1400" dirty="0" smtClean="0">
+                  <a:solidFill>
+                    <a:schemeClr val="tx1"/>
+                  </a:solidFill>
+                </a:rPr>
+                <a:t>Recorded Clips</a:t>
+              </a:r>
+            </a:p>
+          </p:txBody>
+        </p:sp>
+        <p:sp>
+          <p:nvSpPr>
+            <p:cNvPr id="125" name="正方形/長方形 124"/>
+            <p:cNvSpPr/>
+            <p:nvPr/>
+          </p:nvSpPr>
+          <p:spPr>
+            <a:xfrm>
+              <a:off x="2750820" y="3324155"/>
+              <a:ext cx="996332" cy="724605"/>
+            </a:xfrm>
+            <a:prstGeom prst="rect">
+              <a:avLst/>
+            </a:prstGeom>
+            <a:solidFill>
+              <a:schemeClr val="bg1"/>
+            </a:solidFill>
+          </p:spPr>
+          <p:style>
+            <a:lnRef idx="2">
+              <a:schemeClr val="dk1">
+                <a:shade val="50000"/>
+              </a:schemeClr>
+            </a:lnRef>
+            <a:fillRef idx="1">
+              <a:schemeClr val="dk1"/>
+            </a:fillRef>
+            <a:effectRef idx="0">
+              <a:schemeClr val="dk1"/>
+            </a:effectRef>
+            <a:fontRef idx="minor">
+              <a:schemeClr val="lt1"/>
+            </a:fontRef>
+          </p:style>
+          <p:txBody>
+            <a:bodyPr rtlCol="0" anchor="ctr"/>
+            <a:lstStyle/>
+            <a:p>
+              <a:pPr algn="ctr"/>
+              <a:r>
+                <a:rPr lang="en-US" sz="1400" dirty="0" smtClean="0">
+                  <a:solidFill>
+                    <a:schemeClr val="tx1"/>
+                  </a:solidFill>
+                </a:rPr>
+                <a:t>Kinect Studio</a:t>
+              </a:r>
+              <a:endParaRPr lang="en-US" sz="1400" dirty="0">
+                <a:solidFill>
+                  <a:schemeClr val="tx1"/>
+                </a:solidFill>
+              </a:endParaRPr>
+            </a:p>
+          </p:txBody>
+        </p:sp>
+        <p:pic>
+          <p:nvPicPr>
+            <p:cNvPr id="130" name="図 129"/>
+            <p:cNvPicPr>
+              <a:picLocks noChangeAspect="1"/>
+            </p:cNvPicPr>
+            <p:nvPr/>
+          </p:nvPicPr>
+          <p:blipFill rotWithShape="1">
+            <a:blip r:embed="rId2" cstate="print">
+              <a:extLst>
+                <a:ext uri="{28A0092B-C50C-407E-A947-70E740481C1C}">
+                  <a14:useLocalDpi xmlns:a14="http://schemas.microsoft.com/office/drawing/2010/main" val="0"/>
+                </a:ext>
+              </a:extLst>
+            </a:blip>
+            <a:srcRect l="25441" r="28059"/>
+            <a:stretch/>
+          </p:blipFill>
+          <p:spPr>
+            <a:xfrm>
+              <a:off x="3009900" y="2420618"/>
+              <a:ext cx="472440" cy="711200"/>
+            </a:xfrm>
+            <a:prstGeom prst="rect">
+              <a:avLst/>
+            </a:prstGeom>
+            <a:solidFill>
+              <a:schemeClr val="tx1"/>
+            </a:solidFill>
+            <a:ln>
+              <a:solidFill>
+                <a:schemeClr val="tx1"/>
+              </a:solidFill>
+            </a:ln>
+            <a:effectLst/>
+          </p:spPr>
+        </p:pic>
+        <p:cxnSp>
+          <p:nvCxnSpPr>
+            <p:cNvPr id="126" name="直線矢印コネクタ 125"/>
+            <p:cNvCxnSpPr>
+              <a:stCxn id="130" idx="3"/>
+              <a:endCxn id="101" idx="1"/>
+            </p:cNvCxnSpPr>
+            <p:nvPr/>
+          </p:nvCxnSpPr>
+          <p:spPr>
+            <a:xfrm>
+              <a:off x="3482340" y="2776218"/>
+              <a:ext cx="533400" cy="919"/>
+            </a:xfrm>
+            <a:prstGeom prst="straightConnector1">
+              <a:avLst/>
+            </a:prstGeom>
+            <a:ln w="12700">
+              <a:solidFill>
+                <a:schemeClr val="tx1"/>
+              </a:solidFill>
+              <a:tailEnd type="triangle"/>
+            </a:ln>
+          </p:spPr>
+          <p:style>
+            <a:lnRef idx="1">
+              <a:schemeClr val="accent1"/>
+            </a:lnRef>
+            <a:fillRef idx="0">
+              <a:schemeClr val="accent1"/>
+            </a:fillRef>
+            <a:effectRef idx="0">
+              <a:schemeClr val="accent1"/>
+            </a:effectRef>
+            <a:fontRef idx="minor">
+              <a:schemeClr val="tx1"/>
+            </a:fontRef>
+          </p:style>
+        </p:cxnSp>
+        <p:cxnSp>
+          <p:nvCxnSpPr>
+            <p:cNvPr id="131" name="直線矢印コネクタ 130"/>
+            <p:cNvCxnSpPr>
+              <a:stCxn id="130" idx="2"/>
+              <a:endCxn id="125" idx="0"/>
+            </p:cNvCxnSpPr>
+            <p:nvPr/>
+          </p:nvCxnSpPr>
+          <p:spPr>
+            <a:xfrm>
+              <a:off x="3246120" y="3131818"/>
+              <a:ext cx="2866" cy="192337"/>
+            </a:xfrm>
+            <a:prstGeom prst="straightConnector1">
+              <a:avLst/>
+            </a:prstGeom>
+            <a:ln w="12700">
+              <a:solidFill>
+                <a:schemeClr val="tx1"/>
+              </a:solidFill>
+              <a:tailEnd type="triangle"/>
+            </a:ln>
+          </p:spPr>
+          <p:style>
+            <a:lnRef idx="1">
+              <a:schemeClr val="accent1"/>
+            </a:lnRef>
+            <a:fillRef idx="0">
+              <a:schemeClr val="accent1"/>
+            </a:fillRef>
+            <a:effectRef idx="0">
+              <a:schemeClr val="accent1"/>
+            </a:effectRef>
+            <a:fontRef idx="minor">
+              <a:schemeClr val="tx1"/>
+            </a:fontRef>
+          </p:style>
+        </p:cxnSp>
+        <p:cxnSp>
+          <p:nvCxnSpPr>
+            <p:cNvPr id="137" name="直線矢印コネクタ 136"/>
+            <p:cNvCxnSpPr>
+              <a:stCxn id="125" idx="3"/>
+              <a:endCxn id="124" idx="1"/>
+            </p:cNvCxnSpPr>
+            <p:nvPr/>
+          </p:nvCxnSpPr>
+          <p:spPr>
+            <a:xfrm>
+              <a:off x="3747152" y="3686458"/>
+              <a:ext cx="268588" cy="1"/>
+            </a:xfrm>
+            <a:prstGeom prst="straightConnector1">
+              <a:avLst/>
+            </a:prstGeom>
+            <a:ln w="12700">
+              <a:solidFill>
+                <a:schemeClr val="tx1"/>
+              </a:solidFill>
+              <a:prstDash val="sysDot"/>
+              <a:tailEnd type="triangle"/>
+            </a:ln>
+          </p:spPr>
+          <p:style>
+            <a:lnRef idx="1">
+              <a:schemeClr val="accent1"/>
+            </a:lnRef>
+            <a:fillRef idx="0">
+              <a:schemeClr val="accent1"/>
+            </a:fillRef>
+            <a:effectRef idx="0">
+              <a:schemeClr val="accent1"/>
+            </a:effectRef>
+            <a:fontRef idx="minor">
+              <a:schemeClr val="tx1"/>
+            </a:fontRef>
+          </p:style>
+        </p:cxnSp>
+        <p:cxnSp>
+          <p:nvCxnSpPr>
+            <p:cNvPr id="143" name="直線矢印コネクタ 142"/>
+            <p:cNvCxnSpPr>
+              <a:stCxn id="124" idx="0"/>
+              <a:endCxn id="101" idx="2"/>
+            </p:cNvCxnSpPr>
+            <p:nvPr/>
+          </p:nvCxnSpPr>
+          <p:spPr>
+            <a:xfrm flipV="1">
+              <a:off x="4513906" y="3139439"/>
+              <a:ext cx="0" cy="184717"/>
+            </a:xfrm>
+            <a:prstGeom prst="straightConnector1">
+              <a:avLst/>
+            </a:prstGeom>
+            <a:ln w="12700">
+              <a:solidFill>
+                <a:schemeClr val="tx1"/>
+              </a:solidFill>
+              <a:tailEnd type="triangle"/>
+            </a:ln>
+          </p:spPr>
+          <p:style>
+            <a:lnRef idx="1">
+              <a:schemeClr val="accent1"/>
+            </a:lnRef>
+            <a:fillRef idx="0">
+              <a:schemeClr val="accent1"/>
+            </a:fillRef>
+            <a:effectRef idx="0">
+              <a:schemeClr val="accent1"/>
+            </a:effectRef>
+            <a:fontRef idx="minor">
+              <a:schemeClr val="tx1"/>
+            </a:fontRef>
+          </p:style>
+        </p:cxnSp>
+      </p:grpSp>
+    </p:spTree>
+    <p:extLst>
+      <p:ext uri="{BB962C8B-B14F-4D97-AF65-F5344CB8AC3E}">
+        <p14:creationId xmlns:p14="http://schemas.microsoft.com/office/powerpoint/2010/main" val="2272480992"/>
       </p:ext>
     </p:extLst>
   </p:cSld>

</xml_diff>

<commit_message>
update thesis. start handout
</commit_message>
<xml_diff>
--- a/docs/Misc/Pictures.pptx
+++ b/docs/Misc/Pictures.pptx
@@ -8581,47 +8581,1957 @@
       </p:pic>
       <p:grpSp>
         <p:nvGrpSpPr>
-          <p:cNvPr id="56" name="グループ化 55"/>
+          <p:cNvPr id="130" name="グループ化 129"/>
           <p:cNvGrpSpPr/>
           <p:nvPr/>
         </p:nvGrpSpPr>
         <p:grpSpPr>
           <a:xfrm>
-            <a:off x="6590923" y="1401805"/>
-            <a:ext cx="3730027" cy="645306"/>
-            <a:chOff x="6590923" y="1401804"/>
-            <a:chExt cx="3730027" cy="752921"/>
+            <a:off x="5803271" y="588475"/>
+            <a:ext cx="3874883" cy="4771176"/>
+            <a:chOff x="5803271" y="588475"/>
+            <a:chExt cx="3874883" cy="4771176"/>
           </a:xfrm>
         </p:grpSpPr>
+        <p:grpSp>
+          <p:nvGrpSpPr>
+            <p:cNvPr id="127" name="グループ化 126"/>
+            <p:cNvGrpSpPr/>
+            <p:nvPr/>
+          </p:nvGrpSpPr>
+          <p:grpSpPr>
+            <a:xfrm>
+              <a:off x="5875698" y="669230"/>
+              <a:ext cx="3730028" cy="4613377"/>
+              <a:chOff x="6590922" y="1401805"/>
+              <a:chExt cx="3730028" cy="4613377"/>
+            </a:xfrm>
+          </p:grpSpPr>
+          <p:grpSp>
+            <p:nvGrpSpPr>
+              <p:cNvPr id="56" name="グループ化 55"/>
+              <p:cNvGrpSpPr/>
+              <p:nvPr/>
+            </p:nvGrpSpPr>
+            <p:grpSpPr>
+              <a:xfrm>
+                <a:off x="6590923" y="1401805"/>
+                <a:ext cx="3730027" cy="645306"/>
+                <a:chOff x="6590923" y="1401804"/>
+                <a:chExt cx="3730027" cy="752921"/>
+              </a:xfrm>
+            </p:grpSpPr>
+            <p:sp>
+              <p:nvSpPr>
+                <p:cNvPr id="8" name="正方形/長方形 7"/>
+                <p:cNvSpPr/>
+                <p:nvPr/>
+              </p:nvSpPr>
+              <p:spPr>
+                <a:xfrm>
+                  <a:off x="6590923" y="1401804"/>
+                  <a:ext cx="3730027" cy="752921"/>
+                </a:xfrm>
+                <a:prstGeom prst="rect">
+                  <a:avLst/>
+                </a:prstGeom>
+                <a:solidFill>
+                  <a:schemeClr val="bg1"/>
+                </a:solidFill>
+              </p:spPr>
+              <p:style>
+                <a:lnRef idx="2">
+                  <a:schemeClr val="dk1">
+                    <a:shade val="50000"/>
+                  </a:schemeClr>
+                </a:lnRef>
+                <a:fillRef idx="1">
+                  <a:schemeClr val="dk1"/>
+                </a:fillRef>
+                <a:effectRef idx="0">
+                  <a:schemeClr val="dk1"/>
+                </a:effectRef>
+                <a:fontRef idx="minor">
+                  <a:schemeClr val="lt1"/>
+                </a:fontRef>
+              </p:style>
+              <p:txBody>
+                <a:bodyPr rtlCol="0" anchor="ctr"/>
+                <a:lstStyle/>
+                <a:p>
+                  <a:pPr algn="ctr"/>
+                  <a:endParaRPr lang="en-US" dirty="0"/>
+                </a:p>
+              </p:txBody>
+            </p:sp>
+            <p:sp>
+              <p:nvSpPr>
+                <p:cNvPr id="40" name="正方形/長方形 39"/>
+                <p:cNvSpPr/>
+                <p:nvPr/>
+              </p:nvSpPr>
+              <p:spPr>
+                <a:xfrm>
+                  <a:off x="7672174" y="1487292"/>
+                  <a:ext cx="1126807" cy="571165"/>
+                </a:xfrm>
+                <a:prstGeom prst="rect">
+                  <a:avLst/>
+                </a:prstGeom>
+                <a:solidFill>
+                  <a:schemeClr val="bg1"/>
+                </a:solidFill>
+              </p:spPr>
+              <p:style>
+                <a:lnRef idx="2">
+                  <a:schemeClr val="dk1">
+                    <a:shade val="50000"/>
+                  </a:schemeClr>
+                </a:lnRef>
+                <a:fillRef idx="1">
+                  <a:schemeClr val="dk1"/>
+                </a:fillRef>
+                <a:effectRef idx="0">
+                  <a:schemeClr val="dk1"/>
+                </a:effectRef>
+                <a:fontRef idx="minor">
+                  <a:schemeClr val="lt1"/>
+                </a:fontRef>
+              </p:style>
+              <p:txBody>
+                <a:bodyPr rtlCol="0" anchor="ctr"/>
+                <a:lstStyle/>
+                <a:p>
+                  <a:pPr algn="ctr"/>
+                  <a:r>
+                    <a:rPr lang="en-US" sz="1400" dirty="0" smtClean="0">
+                      <a:solidFill>
+                        <a:schemeClr val="tx1"/>
+                      </a:solidFill>
+                    </a:rPr>
+                    <a:t>Behavior designer</a:t>
+                  </a:r>
+                  <a:endParaRPr lang="en-US" sz="1400" dirty="0">
+                    <a:solidFill>
+                      <a:schemeClr val="tx1"/>
+                    </a:solidFill>
+                  </a:endParaRPr>
+                </a:p>
+              </p:txBody>
+            </p:sp>
+            <p:sp>
+              <p:nvSpPr>
+                <p:cNvPr id="50" name="正方形/長方形 49"/>
+                <p:cNvSpPr/>
+                <p:nvPr/>
+              </p:nvSpPr>
+              <p:spPr>
+                <a:xfrm>
+                  <a:off x="8876847" y="1487292"/>
+                  <a:ext cx="1163226" cy="571165"/>
+                </a:xfrm>
+                <a:prstGeom prst="rect">
+                  <a:avLst/>
+                </a:prstGeom>
+                <a:solidFill>
+                  <a:schemeClr val="bg1"/>
+                </a:solidFill>
+              </p:spPr>
+              <p:style>
+                <a:lnRef idx="2">
+                  <a:schemeClr val="dk1">
+                    <a:shade val="50000"/>
+                  </a:schemeClr>
+                </a:lnRef>
+                <a:fillRef idx="1">
+                  <a:schemeClr val="dk1"/>
+                </a:fillRef>
+                <a:effectRef idx="0">
+                  <a:schemeClr val="dk1"/>
+                </a:effectRef>
+                <a:fontRef idx="minor">
+                  <a:schemeClr val="lt1"/>
+                </a:fontRef>
+              </p:style>
+              <p:txBody>
+                <a:bodyPr rtlCol="0" anchor="ctr"/>
+                <a:lstStyle/>
+                <a:p>
+                  <a:pPr algn="ctr"/>
+                  <a:r>
+                    <a:rPr lang="en-US" sz="1400" dirty="0" smtClean="0">
+                      <a:solidFill>
+                        <a:schemeClr val="tx1"/>
+                      </a:solidFill>
+                    </a:rPr>
+                    <a:t>Visualization</a:t>
+                  </a:r>
+                  <a:endParaRPr lang="en-US" sz="1400" dirty="0">
+                    <a:solidFill>
+                      <a:schemeClr val="tx1"/>
+                    </a:solidFill>
+                  </a:endParaRPr>
+                </a:p>
+              </p:txBody>
+            </p:sp>
+            <p:sp>
+              <p:nvSpPr>
+                <p:cNvPr id="51" name="テキスト ボックス 50"/>
+                <p:cNvSpPr txBox="1"/>
+                <p:nvPr/>
+              </p:nvSpPr>
+              <p:spPr>
+                <a:xfrm>
+                  <a:off x="6650228" y="1455098"/>
+                  <a:ext cx="836383" cy="523220"/>
+                </a:xfrm>
+                <a:prstGeom prst="rect">
+                  <a:avLst/>
+                </a:prstGeom>
+                <a:noFill/>
+              </p:spPr>
+              <p:txBody>
+                <a:bodyPr wrap="none" rtlCol="0">
+                  <a:spAutoFit/>
+                </a:bodyPr>
+                <a:lstStyle/>
+                <a:p>
+                  <a:r>
+                    <a:rPr lang="en-US" sz="1400" dirty="0" smtClean="0"/>
+                    <a:t>Web</a:t>
+                  </a:r>
+                </a:p>
+                <a:p>
+                  <a:r>
+                    <a:rPr lang="en-US" sz="1400" dirty="0" smtClean="0"/>
+                    <a:t>Interface</a:t>
+                  </a:r>
+                  <a:endParaRPr lang="en-US" sz="1400" dirty="0"/>
+                </a:p>
+              </p:txBody>
+            </p:sp>
+          </p:grpSp>
+          <p:cxnSp>
+            <p:nvCxnSpPr>
+              <p:cNvPr id="62" name="直線矢印コネクタ 61"/>
+              <p:cNvCxnSpPr>
+                <a:stCxn id="8" idx="2"/>
+                <a:endCxn id="52" idx="0"/>
+              </p:cNvCxnSpPr>
+              <p:nvPr/>
+            </p:nvCxnSpPr>
+            <p:spPr>
+              <a:xfrm>
+                <a:off x="8455937" y="2047111"/>
+                <a:ext cx="0" cy="179314"/>
+              </a:xfrm>
+              <a:prstGeom prst="straightConnector1">
+                <a:avLst/>
+              </a:prstGeom>
+              <a:ln>
+                <a:solidFill>
+                  <a:schemeClr val="tx1"/>
+                </a:solidFill>
+                <a:headEnd type="stealth"/>
+                <a:tailEnd type="triangle"/>
+              </a:ln>
+            </p:spPr>
+            <p:style>
+              <a:lnRef idx="1">
+                <a:schemeClr val="accent1"/>
+              </a:lnRef>
+              <a:fillRef idx="0">
+                <a:schemeClr val="accent1"/>
+              </a:fillRef>
+              <a:effectRef idx="0">
+                <a:schemeClr val="accent1"/>
+              </a:effectRef>
+              <a:fontRef idx="minor">
+                <a:schemeClr val="tx1"/>
+              </a:fontRef>
+            </p:style>
+          </p:cxnSp>
+          <p:sp>
+            <p:nvSpPr>
+              <p:cNvPr id="63" name="テキスト ボックス 62"/>
+              <p:cNvSpPr txBox="1"/>
+              <p:nvPr/>
+            </p:nvSpPr>
+            <p:spPr>
+              <a:xfrm>
+                <a:off x="8492148" y="2000337"/>
+                <a:ext cx="568617" cy="307777"/>
+              </a:xfrm>
+              <a:prstGeom prst="rect">
+                <a:avLst/>
+              </a:prstGeom>
+              <a:noFill/>
+            </p:spPr>
+            <p:txBody>
+              <a:bodyPr wrap="none" rtlCol="0">
+                <a:spAutoFit/>
+              </a:bodyPr>
+              <a:lstStyle/>
+              <a:p>
+                <a:r>
+                  <a:rPr lang="en-US" sz="1400" dirty="0" smtClean="0"/>
+                  <a:t>HTTP</a:t>
+                </a:r>
+                <a:endParaRPr lang="en-US" sz="1400" dirty="0"/>
+              </a:p>
+            </p:txBody>
+          </p:sp>
+          <p:grpSp>
+            <p:nvGrpSpPr>
+              <p:cNvPr id="79" name="グループ化 78"/>
+              <p:cNvGrpSpPr/>
+              <p:nvPr/>
+            </p:nvGrpSpPr>
+            <p:grpSpPr>
+              <a:xfrm>
+                <a:off x="6590923" y="2226425"/>
+                <a:ext cx="3730027" cy="1575799"/>
+                <a:chOff x="6590923" y="2226425"/>
+                <a:chExt cx="3730027" cy="1575799"/>
+              </a:xfrm>
+            </p:grpSpPr>
+            <p:sp>
+              <p:nvSpPr>
+                <p:cNvPr id="52" name="正方形/長方形 51"/>
+                <p:cNvSpPr/>
+                <p:nvPr/>
+              </p:nvSpPr>
+              <p:spPr>
+                <a:xfrm>
+                  <a:off x="6590923" y="2226425"/>
+                  <a:ext cx="3730027" cy="1557924"/>
+                </a:xfrm>
+                <a:prstGeom prst="rect">
+                  <a:avLst/>
+                </a:prstGeom>
+                <a:solidFill>
+                  <a:schemeClr val="bg1"/>
+                </a:solidFill>
+              </p:spPr>
+              <p:style>
+                <a:lnRef idx="2">
+                  <a:schemeClr val="dk1">
+                    <a:shade val="50000"/>
+                  </a:schemeClr>
+                </a:lnRef>
+                <a:fillRef idx="1">
+                  <a:schemeClr val="dk1"/>
+                </a:fillRef>
+                <a:effectRef idx="0">
+                  <a:schemeClr val="dk1"/>
+                </a:effectRef>
+                <a:fontRef idx="minor">
+                  <a:schemeClr val="lt1"/>
+                </a:fontRef>
+              </p:style>
+              <p:txBody>
+                <a:bodyPr rtlCol="0" anchor="ctr"/>
+                <a:lstStyle/>
+                <a:p>
+                  <a:pPr algn="ctr"/>
+                  <a:endParaRPr lang="en-US" dirty="0"/>
+                </a:p>
+              </p:txBody>
+            </p:sp>
+            <p:sp>
+              <p:nvSpPr>
+                <p:cNvPr id="53" name="正方形/長方形 52"/>
+                <p:cNvSpPr/>
+                <p:nvPr/>
+              </p:nvSpPr>
+              <p:spPr>
+                <a:xfrm>
+                  <a:off x="8006308" y="2333540"/>
+                  <a:ext cx="1126807" cy="454927"/>
+                </a:xfrm>
+                <a:prstGeom prst="rect">
+                  <a:avLst/>
+                </a:prstGeom>
+                <a:solidFill>
+                  <a:schemeClr val="bg1"/>
+                </a:solidFill>
+              </p:spPr>
+              <p:style>
+                <a:lnRef idx="2">
+                  <a:schemeClr val="dk1">
+                    <a:shade val="50000"/>
+                  </a:schemeClr>
+                </a:lnRef>
+                <a:fillRef idx="1">
+                  <a:schemeClr val="dk1"/>
+                </a:fillRef>
+                <a:effectRef idx="0">
+                  <a:schemeClr val="dk1"/>
+                </a:effectRef>
+                <a:fontRef idx="minor">
+                  <a:schemeClr val="lt1"/>
+                </a:fontRef>
+              </p:style>
+              <p:txBody>
+                <a:bodyPr rtlCol="0" anchor="ctr"/>
+                <a:lstStyle/>
+                <a:p>
+                  <a:pPr algn="ctr"/>
+                  <a:r>
+                    <a:rPr lang="en-US" sz="1400" dirty="0" smtClean="0">
+                      <a:solidFill>
+                        <a:schemeClr val="tx1"/>
+                      </a:solidFill>
+                    </a:rPr>
+                    <a:t>Application</a:t>
+                  </a:r>
+                  <a:r>
+                    <a:rPr lang="en-US" sz="1400" dirty="0">
+                      <a:solidFill>
+                        <a:schemeClr val="tx1"/>
+                      </a:solidFill>
+                    </a:rPr>
+                    <a:t> </a:t>
+                  </a:r>
+                  <a:r>
+                    <a:rPr lang="en-US" sz="1400" dirty="0" smtClean="0">
+                      <a:solidFill>
+                        <a:schemeClr val="tx1"/>
+                      </a:solidFill>
+                    </a:rPr>
+                    <a:t>Context</a:t>
+                  </a:r>
+                  <a:endParaRPr lang="en-US" sz="1400" dirty="0" smtClean="0">
+                    <a:solidFill>
+                      <a:schemeClr val="tx1"/>
+                    </a:solidFill>
+                  </a:endParaRPr>
+                </a:p>
+              </p:txBody>
+            </p:sp>
+            <p:sp>
+              <p:nvSpPr>
+                <p:cNvPr id="54" name="正方形/長方形 53"/>
+                <p:cNvSpPr/>
+                <p:nvPr/>
+              </p:nvSpPr>
+              <p:spPr>
+                <a:xfrm>
+                  <a:off x="9317744" y="2333540"/>
+                  <a:ext cx="941025" cy="454927"/>
+                </a:xfrm>
+                <a:prstGeom prst="rect">
+                  <a:avLst/>
+                </a:prstGeom>
+                <a:solidFill>
+                  <a:schemeClr val="bg1"/>
+                </a:solidFill>
+              </p:spPr>
+              <p:style>
+                <a:lnRef idx="2">
+                  <a:schemeClr val="dk1">
+                    <a:shade val="50000"/>
+                  </a:schemeClr>
+                </a:lnRef>
+                <a:fillRef idx="1">
+                  <a:schemeClr val="dk1"/>
+                </a:fillRef>
+                <a:effectRef idx="0">
+                  <a:schemeClr val="dk1"/>
+                </a:effectRef>
+                <a:fontRef idx="minor">
+                  <a:schemeClr val="lt1"/>
+                </a:fontRef>
+              </p:style>
+              <p:txBody>
+                <a:bodyPr rtlCol="0" anchor="ctr"/>
+                <a:lstStyle/>
+                <a:p>
+                  <a:pPr algn="ctr"/>
+                  <a:r>
+                    <a:rPr lang="en-US" sz="1400" dirty="0" smtClean="0">
+                      <a:solidFill>
+                        <a:schemeClr val="tx1"/>
+                      </a:solidFill>
+                    </a:rPr>
+                    <a:t>Parameter Server</a:t>
+                  </a:r>
+                  <a:endParaRPr lang="en-US" sz="1400" dirty="0">
+                    <a:solidFill>
+                      <a:schemeClr val="tx1"/>
+                    </a:solidFill>
+                  </a:endParaRPr>
+                </a:p>
+              </p:txBody>
+            </p:sp>
+            <p:sp>
+              <p:nvSpPr>
+                <p:cNvPr id="57" name="正方形/長方形 56"/>
+                <p:cNvSpPr/>
+                <p:nvPr/>
+              </p:nvSpPr>
+              <p:spPr>
+                <a:xfrm>
+                  <a:off x="9397498" y="3029151"/>
+                  <a:ext cx="859853" cy="454927"/>
+                </a:xfrm>
+                <a:prstGeom prst="rect">
+                  <a:avLst/>
+                </a:prstGeom>
+                <a:solidFill>
+                  <a:schemeClr val="bg2"/>
+                </a:solidFill>
+              </p:spPr>
+              <p:style>
+                <a:lnRef idx="2">
+                  <a:schemeClr val="dk1">
+                    <a:shade val="50000"/>
+                  </a:schemeClr>
+                </a:lnRef>
+                <a:fillRef idx="1">
+                  <a:schemeClr val="dk1"/>
+                </a:fillRef>
+                <a:effectRef idx="0">
+                  <a:schemeClr val="dk1"/>
+                </a:effectRef>
+                <a:fontRef idx="minor">
+                  <a:schemeClr val="lt1"/>
+                </a:fontRef>
+              </p:style>
+              <p:txBody>
+                <a:bodyPr rtlCol="0" anchor="ctr"/>
+                <a:lstStyle/>
+                <a:p>
+                  <a:pPr algn="ctr"/>
+                  <a:r>
+                    <a:rPr lang="en-US" sz="1400" dirty="0" smtClean="0">
+                      <a:solidFill>
+                        <a:schemeClr val="tx1"/>
+                      </a:solidFill>
+                    </a:rPr>
+                    <a:t>Behavior program</a:t>
+                  </a:r>
+                  <a:endParaRPr lang="en-US" sz="1400" dirty="0">
+                    <a:solidFill>
+                      <a:schemeClr val="tx1"/>
+                    </a:solidFill>
+                  </a:endParaRPr>
+                </a:p>
+              </p:txBody>
+            </p:sp>
+            <p:sp>
+              <p:nvSpPr>
+                <p:cNvPr id="58" name="正方形/長方形 57"/>
+                <p:cNvSpPr/>
+                <p:nvPr/>
+              </p:nvSpPr>
+              <p:spPr>
+                <a:xfrm>
+                  <a:off x="7816184" y="3029151"/>
+                  <a:ext cx="1437962" cy="454927"/>
+                </a:xfrm>
+                <a:prstGeom prst="rect">
+                  <a:avLst/>
+                </a:prstGeom>
+                <a:solidFill>
+                  <a:schemeClr val="bg1"/>
+                </a:solidFill>
+              </p:spPr>
+              <p:style>
+                <a:lnRef idx="2">
+                  <a:schemeClr val="dk1">
+                    <a:shade val="50000"/>
+                  </a:schemeClr>
+                </a:lnRef>
+                <a:fillRef idx="1">
+                  <a:schemeClr val="dk1"/>
+                </a:fillRef>
+                <a:effectRef idx="0">
+                  <a:schemeClr val="dk1"/>
+                </a:effectRef>
+                <a:fontRef idx="minor">
+                  <a:schemeClr val="lt1"/>
+                </a:fontRef>
+              </p:style>
+              <p:txBody>
+                <a:bodyPr rtlCol="0" anchor="ctr"/>
+                <a:lstStyle/>
+                <a:p>
+                  <a:pPr algn="ctr"/>
+                  <a:r>
+                    <a:rPr lang="en-US" sz="1400" dirty="0" smtClean="0">
+                      <a:solidFill>
+                        <a:schemeClr val="tx1"/>
+                      </a:solidFill>
+                    </a:rPr>
+                    <a:t>Behavior execution engine</a:t>
+                  </a:r>
+                  <a:endParaRPr lang="en-US" sz="1400" dirty="0">
+                    <a:solidFill>
+                      <a:schemeClr val="tx1"/>
+                    </a:solidFill>
+                  </a:endParaRPr>
+                </a:p>
+              </p:txBody>
+            </p:sp>
+            <p:sp>
+              <p:nvSpPr>
+                <p:cNvPr id="59" name="正方形/長方形 58"/>
+                <p:cNvSpPr/>
+                <p:nvPr/>
+              </p:nvSpPr>
+              <p:spPr>
+                <a:xfrm>
+                  <a:off x="6650228" y="3034440"/>
+                  <a:ext cx="1088265" cy="454927"/>
+                </a:xfrm>
+                <a:prstGeom prst="rect">
+                  <a:avLst/>
+                </a:prstGeom>
+                <a:solidFill>
+                  <a:schemeClr val="bg1"/>
+                </a:solidFill>
+              </p:spPr>
+              <p:style>
+                <a:lnRef idx="2">
+                  <a:schemeClr val="dk1">
+                    <a:shade val="50000"/>
+                  </a:schemeClr>
+                </a:lnRef>
+                <a:fillRef idx="1">
+                  <a:schemeClr val="dk1"/>
+                </a:fillRef>
+                <a:effectRef idx="0">
+                  <a:schemeClr val="dk1"/>
+                </a:effectRef>
+                <a:fontRef idx="minor">
+                  <a:schemeClr val="lt1"/>
+                </a:fontRef>
+              </p:style>
+              <p:txBody>
+                <a:bodyPr rtlCol="0" anchor="ctr"/>
+                <a:lstStyle/>
+                <a:p>
+                  <a:pPr algn="ctr"/>
+                  <a:r>
+                    <a:rPr lang="en-US" sz="1400" dirty="0" smtClean="0">
+                      <a:solidFill>
+                        <a:schemeClr val="tx1"/>
+                      </a:solidFill>
+                    </a:rPr>
+                    <a:t>Contex</a:t>
+                  </a:r>
+                  <a:r>
+                    <a:rPr lang="en-US" sz="1400" dirty="0" smtClean="0">
+                      <a:solidFill>
+                        <a:schemeClr val="tx1"/>
+                      </a:solidFill>
+                    </a:rPr>
+                    <a:t>t orchestrator</a:t>
+                  </a:r>
+                  <a:endParaRPr lang="en-US" sz="1400" dirty="0">
+                    <a:solidFill>
+                      <a:schemeClr val="tx1"/>
+                    </a:solidFill>
+                  </a:endParaRPr>
+                </a:p>
+              </p:txBody>
+            </p:sp>
+            <p:sp>
+              <p:nvSpPr>
+                <p:cNvPr id="60" name="正方形/長方形 59"/>
+                <p:cNvSpPr/>
+                <p:nvPr/>
+              </p:nvSpPr>
+              <p:spPr>
+                <a:xfrm>
+                  <a:off x="6655735" y="2322814"/>
+                  <a:ext cx="1165945" cy="465653"/>
+                </a:xfrm>
+                <a:prstGeom prst="rect">
+                  <a:avLst/>
+                </a:prstGeom>
+                <a:solidFill>
+                  <a:schemeClr val="bg1"/>
+                </a:solidFill>
+              </p:spPr>
+              <p:style>
+                <a:lnRef idx="2">
+                  <a:schemeClr val="dk1">
+                    <a:shade val="50000"/>
+                  </a:schemeClr>
+                </a:lnRef>
+                <a:fillRef idx="1">
+                  <a:schemeClr val="dk1"/>
+                </a:fillRef>
+                <a:effectRef idx="0">
+                  <a:schemeClr val="dk1"/>
+                </a:effectRef>
+                <a:fontRef idx="minor">
+                  <a:schemeClr val="lt1"/>
+                </a:fontRef>
+              </p:style>
+              <p:txBody>
+                <a:bodyPr rtlCol="0" anchor="ctr"/>
+                <a:lstStyle/>
+                <a:p>
+                  <a:pPr algn="ctr"/>
+                  <a:r>
+                    <a:rPr lang="en-US" sz="1400" dirty="0" smtClean="0">
+                      <a:solidFill>
+                        <a:schemeClr val="tx1"/>
+                      </a:solidFill>
+                    </a:rPr>
+                    <a:t>Embedded web server</a:t>
+                  </a:r>
+                  <a:endParaRPr lang="en-US" sz="1400" dirty="0">
+                    <a:solidFill>
+                      <a:schemeClr val="tx1"/>
+                    </a:solidFill>
+                  </a:endParaRPr>
+                </a:p>
+              </p:txBody>
+            </p:sp>
+            <p:sp>
+              <p:nvSpPr>
+                <p:cNvPr id="64" name="テキスト ボックス 63"/>
+                <p:cNvSpPr txBox="1"/>
+                <p:nvPr/>
+              </p:nvSpPr>
+              <p:spPr>
+                <a:xfrm>
+                  <a:off x="7554825" y="3494447"/>
+                  <a:ext cx="1960921" cy="307777"/>
+                </a:xfrm>
+                <a:prstGeom prst="rect">
+                  <a:avLst/>
+                </a:prstGeom>
+                <a:noFill/>
+              </p:spPr>
+              <p:txBody>
+                <a:bodyPr wrap="none" rtlCol="0">
+                  <a:spAutoFit/>
+                </a:bodyPr>
+                <a:lstStyle/>
+                <a:p>
+                  <a:r>
+                    <a:rPr lang="en-US" sz="1400" dirty="0" smtClean="0"/>
+                    <a:t>Application components</a:t>
+                  </a:r>
+                  <a:endParaRPr lang="en-US" sz="1400" dirty="0"/>
+                </a:p>
+              </p:txBody>
+            </p:sp>
+            <p:cxnSp>
+              <p:nvCxnSpPr>
+                <p:cNvPr id="66" name="直線矢印コネクタ 65"/>
+                <p:cNvCxnSpPr>
+                  <a:stCxn id="54" idx="1"/>
+                  <a:endCxn id="53" idx="3"/>
+                </p:cNvCxnSpPr>
+                <p:nvPr/>
+              </p:nvCxnSpPr>
+              <p:spPr>
+                <a:xfrm flipH="1">
+                  <a:off x="9133115" y="2561004"/>
+                  <a:ext cx="184629" cy="0"/>
+                </a:xfrm>
+                <a:prstGeom prst="straightConnector1">
+                  <a:avLst/>
+                </a:prstGeom>
+                <a:ln>
+                  <a:solidFill>
+                    <a:schemeClr val="tx1"/>
+                  </a:solidFill>
+                  <a:headEnd type="stealth"/>
+                  <a:tailEnd type="triangle"/>
+                </a:ln>
+              </p:spPr>
+              <p:style>
+                <a:lnRef idx="1">
+                  <a:schemeClr val="accent1"/>
+                </a:lnRef>
+                <a:fillRef idx="0">
+                  <a:schemeClr val="accent1"/>
+                </a:fillRef>
+                <a:effectRef idx="0">
+                  <a:schemeClr val="accent1"/>
+                </a:effectRef>
+                <a:fontRef idx="minor">
+                  <a:schemeClr val="tx1"/>
+                </a:fontRef>
+              </p:style>
+            </p:cxnSp>
+            <p:cxnSp>
+              <p:nvCxnSpPr>
+                <p:cNvPr id="70" name="直線矢印コネクタ 69"/>
+                <p:cNvCxnSpPr>
+                  <a:stCxn id="53" idx="1"/>
+                  <a:endCxn id="60" idx="3"/>
+                </p:cNvCxnSpPr>
+                <p:nvPr/>
+              </p:nvCxnSpPr>
+              <p:spPr>
+                <a:xfrm flipH="1" flipV="1">
+                  <a:off x="7821680" y="2555641"/>
+                  <a:ext cx="184628" cy="5363"/>
+                </a:xfrm>
+                <a:prstGeom prst="straightConnector1">
+                  <a:avLst/>
+                </a:prstGeom>
+                <a:ln>
+                  <a:solidFill>
+                    <a:schemeClr val="tx1"/>
+                  </a:solidFill>
+                  <a:headEnd type="stealth"/>
+                  <a:tailEnd type="triangle"/>
+                </a:ln>
+              </p:spPr>
+              <p:style>
+                <a:lnRef idx="1">
+                  <a:schemeClr val="accent1"/>
+                </a:lnRef>
+                <a:fillRef idx="0">
+                  <a:schemeClr val="accent1"/>
+                </a:fillRef>
+                <a:effectRef idx="0">
+                  <a:schemeClr val="accent1"/>
+                </a:effectRef>
+                <a:fontRef idx="minor">
+                  <a:schemeClr val="tx1"/>
+                </a:fontRef>
+              </p:style>
+            </p:cxnSp>
+            <p:cxnSp>
+              <p:nvCxnSpPr>
+                <p:cNvPr id="75" name="カギ線コネクタ 74"/>
+                <p:cNvCxnSpPr>
+                  <a:stCxn id="59" idx="0"/>
+                  <a:endCxn id="53" idx="2"/>
+                </p:cNvCxnSpPr>
+                <p:nvPr/>
+              </p:nvCxnSpPr>
+              <p:spPr>
+                <a:xfrm rot="5400000" flipH="1" flipV="1">
+                  <a:off x="7759050" y="2223779"/>
+                  <a:ext cx="245973" cy="1375351"/>
+                </a:xfrm>
+                <a:prstGeom prst="bentConnector3">
+                  <a:avLst/>
+                </a:prstGeom>
+                <a:ln>
+                  <a:solidFill>
+                    <a:schemeClr val="tx1"/>
+                  </a:solidFill>
+                  <a:tailEnd type="triangle"/>
+                </a:ln>
+              </p:spPr>
+              <p:style>
+                <a:lnRef idx="1">
+                  <a:schemeClr val="accent1"/>
+                </a:lnRef>
+                <a:fillRef idx="0">
+                  <a:schemeClr val="accent1"/>
+                </a:fillRef>
+                <a:effectRef idx="0">
+                  <a:schemeClr val="accent1"/>
+                </a:effectRef>
+                <a:fontRef idx="minor">
+                  <a:schemeClr val="tx1"/>
+                </a:fontRef>
+              </p:style>
+            </p:cxnSp>
+            <p:cxnSp>
+              <p:nvCxnSpPr>
+                <p:cNvPr id="78" name="直線矢印コネクタ 77"/>
+                <p:cNvCxnSpPr>
+                  <a:stCxn id="58" idx="3"/>
+                  <a:endCxn id="57" idx="1"/>
+                </p:cNvCxnSpPr>
+                <p:nvPr/>
+              </p:nvCxnSpPr>
+              <p:spPr>
+                <a:xfrm>
+                  <a:off x="9254146" y="3256615"/>
+                  <a:ext cx="143352" cy="0"/>
+                </a:xfrm>
+                <a:prstGeom prst="straightConnector1">
+                  <a:avLst/>
+                </a:prstGeom>
+                <a:ln>
+                  <a:solidFill>
+                    <a:schemeClr val="tx1"/>
+                  </a:solidFill>
+                  <a:tailEnd type="triangle"/>
+                </a:ln>
+              </p:spPr>
+              <p:style>
+                <a:lnRef idx="1">
+                  <a:schemeClr val="accent1"/>
+                </a:lnRef>
+                <a:fillRef idx="0">
+                  <a:schemeClr val="accent1"/>
+                </a:fillRef>
+                <a:effectRef idx="0">
+                  <a:schemeClr val="accent1"/>
+                </a:effectRef>
+                <a:fontRef idx="minor">
+                  <a:schemeClr val="tx1"/>
+                </a:fontRef>
+              </p:style>
+            </p:cxnSp>
+          </p:grpSp>
+          <p:grpSp>
+            <p:nvGrpSpPr>
+              <p:cNvPr id="114" name="グループ化 113"/>
+              <p:cNvGrpSpPr/>
+              <p:nvPr/>
+            </p:nvGrpSpPr>
+            <p:grpSpPr>
+              <a:xfrm>
+                <a:off x="6590922" y="3997467"/>
+                <a:ext cx="3730027" cy="1208346"/>
+                <a:chOff x="6590922" y="3997467"/>
+                <a:chExt cx="3730027" cy="1208346"/>
+              </a:xfrm>
+            </p:grpSpPr>
+            <p:sp>
+              <p:nvSpPr>
+                <p:cNvPr id="81" name="正方形/長方形 80"/>
+                <p:cNvSpPr/>
+                <p:nvPr/>
+              </p:nvSpPr>
+              <p:spPr>
+                <a:xfrm>
+                  <a:off x="6590922" y="3997467"/>
+                  <a:ext cx="3730027" cy="1208346"/>
+                </a:xfrm>
+                <a:prstGeom prst="rect">
+                  <a:avLst/>
+                </a:prstGeom>
+                <a:solidFill>
+                  <a:schemeClr val="bg1"/>
+                </a:solidFill>
+              </p:spPr>
+              <p:style>
+                <a:lnRef idx="2">
+                  <a:schemeClr val="dk1">
+                    <a:shade val="50000"/>
+                  </a:schemeClr>
+                </a:lnRef>
+                <a:fillRef idx="1">
+                  <a:schemeClr val="dk1"/>
+                </a:fillRef>
+                <a:effectRef idx="0">
+                  <a:schemeClr val="dk1"/>
+                </a:effectRef>
+                <a:fontRef idx="minor">
+                  <a:schemeClr val="lt1"/>
+                </a:fontRef>
+              </p:style>
+              <p:txBody>
+                <a:bodyPr rtlCol="0" anchor="ctr"/>
+                <a:lstStyle/>
+                <a:p>
+                  <a:pPr algn="ctr"/>
+                  <a:endParaRPr lang="en-US" dirty="0"/>
+                </a:p>
+              </p:txBody>
+            </p:sp>
+            <p:sp>
+              <p:nvSpPr>
+                <p:cNvPr id="84" name="テキスト ボックス 83"/>
+                <p:cNvSpPr txBox="1"/>
+                <p:nvPr/>
+              </p:nvSpPr>
+              <p:spPr>
+                <a:xfrm>
+                  <a:off x="6685276" y="4779877"/>
+                  <a:ext cx="649537" cy="307777"/>
+                </a:xfrm>
+                <a:prstGeom prst="rect">
+                  <a:avLst/>
+                </a:prstGeom>
+                <a:noFill/>
+              </p:spPr>
+              <p:txBody>
+                <a:bodyPr wrap="none" rtlCol="0">
+                  <a:spAutoFit/>
+                </a:bodyPr>
+                <a:lstStyle/>
+                <a:p>
+                  <a:r>
+                    <a:rPr lang="en-US" sz="1400" dirty="0" smtClean="0"/>
+                    <a:t>Nodes</a:t>
+                  </a:r>
+                  <a:endParaRPr lang="en-US" sz="1400" dirty="0"/>
+                </a:p>
+              </p:txBody>
+            </p:sp>
+            <p:grpSp>
+              <p:nvGrpSpPr>
+                <p:cNvPr id="92" name="グループ化 91"/>
+                <p:cNvGrpSpPr/>
+                <p:nvPr/>
+              </p:nvGrpSpPr>
+              <p:grpSpPr>
+                <a:xfrm>
+                  <a:off x="6776870" y="4091612"/>
+                  <a:ext cx="1096613" cy="558922"/>
+                  <a:chOff x="6785920" y="3973923"/>
+                  <a:chExt cx="1096613" cy="558922"/>
+                </a:xfrm>
+              </p:grpSpPr>
+              <p:sp>
+                <p:nvSpPr>
+                  <p:cNvPr id="87" name="正方形/長方形 86"/>
+                  <p:cNvSpPr/>
+                  <p:nvPr/>
+                </p:nvSpPr>
+                <p:spPr>
+                  <a:xfrm>
+                    <a:off x="6849823" y="4043317"/>
+                    <a:ext cx="1032710" cy="489528"/>
+                  </a:xfrm>
+                  <a:prstGeom prst="rect">
+                    <a:avLst/>
+                  </a:prstGeom>
+                  <a:solidFill>
+                    <a:schemeClr val="bg1"/>
+                  </a:solidFill>
+                </p:spPr>
+                <p:style>
+                  <a:lnRef idx="2">
+                    <a:schemeClr val="dk1">
+                      <a:shade val="50000"/>
+                    </a:schemeClr>
+                  </a:lnRef>
+                  <a:fillRef idx="1">
+                    <a:schemeClr val="dk1"/>
+                  </a:fillRef>
+                  <a:effectRef idx="0">
+                    <a:schemeClr val="dk1"/>
+                  </a:effectRef>
+                  <a:fontRef idx="minor">
+                    <a:schemeClr val="lt1"/>
+                  </a:fontRef>
+                </p:style>
+                <p:txBody>
+                  <a:bodyPr rtlCol="0" anchor="ctr"/>
+                  <a:lstStyle/>
+                  <a:p>
+                    <a:pPr algn="ctr"/>
+                    <a:endParaRPr lang="en-US" sz="1400" dirty="0">
+                      <a:solidFill>
+                        <a:schemeClr val="tx1"/>
+                      </a:solidFill>
+                    </a:endParaRPr>
+                  </a:p>
+                </p:txBody>
+              </p:sp>
+              <p:sp>
+                <p:nvSpPr>
+                  <p:cNvPr id="85" name="正方形/長方形 84"/>
+                  <p:cNvSpPr/>
+                  <p:nvPr/>
+                </p:nvSpPr>
+                <p:spPr>
+                  <a:xfrm>
+                    <a:off x="6785920" y="3973923"/>
+                    <a:ext cx="1032710" cy="489528"/>
+                  </a:xfrm>
+                  <a:prstGeom prst="rect">
+                    <a:avLst/>
+                  </a:prstGeom>
+                  <a:solidFill>
+                    <a:schemeClr val="bg1"/>
+                  </a:solidFill>
+                </p:spPr>
+                <p:style>
+                  <a:lnRef idx="2">
+                    <a:schemeClr val="dk1">
+                      <a:shade val="50000"/>
+                    </a:schemeClr>
+                  </a:lnRef>
+                  <a:fillRef idx="1">
+                    <a:schemeClr val="dk1"/>
+                  </a:fillRef>
+                  <a:effectRef idx="0">
+                    <a:schemeClr val="dk1"/>
+                  </a:effectRef>
+                  <a:fontRef idx="minor">
+                    <a:schemeClr val="lt1"/>
+                  </a:fontRef>
+                </p:style>
+                <p:txBody>
+                  <a:bodyPr rtlCol="0" anchor="ctr"/>
+                  <a:lstStyle/>
+                  <a:p>
+                    <a:pPr algn="ctr"/>
+                    <a:r>
+                      <a:rPr lang="en-US" sz="1400" dirty="0" smtClean="0">
+                        <a:solidFill>
+                          <a:schemeClr val="tx1"/>
+                        </a:solidFill>
+                      </a:rPr>
+                      <a:t>Motion recognition</a:t>
+                    </a:r>
+                    <a:endParaRPr lang="en-US" sz="1400" dirty="0">
+                      <a:solidFill>
+                        <a:schemeClr val="tx1"/>
+                      </a:solidFill>
+                    </a:endParaRPr>
+                  </a:p>
+                </p:txBody>
+              </p:sp>
+            </p:grpSp>
+            <p:grpSp>
+              <p:nvGrpSpPr>
+                <p:cNvPr id="91" name="グループ化 90"/>
+                <p:cNvGrpSpPr/>
+                <p:nvPr/>
+              </p:nvGrpSpPr>
+              <p:grpSpPr>
+                <a:xfrm>
+                  <a:off x="7955634" y="4091612"/>
+                  <a:ext cx="1096007" cy="560364"/>
+                  <a:chOff x="7964684" y="3973923"/>
+                  <a:chExt cx="1096007" cy="560364"/>
+                </a:xfrm>
+              </p:grpSpPr>
+              <p:sp>
+                <p:nvSpPr>
+                  <p:cNvPr id="88" name="正方形/長方形 87"/>
+                  <p:cNvSpPr/>
+                  <p:nvPr/>
+                </p:nvSpPr>
+                <p:spPr>
+                  <a:xfrm>
+                    <a:off x="8027981" y="4044759"/>
+                    <a:ext cx="1032710" cy="489528"/>
+                  </a:xfrm>
+                  <a:prstGeom prst="rect">
+                    <a:avLst/>
+                  </a:prstGeom>
+                  <a:solidFill>
+                    <a:schemeClr val="bg1"/>
+                  </a:solidFill>
+                </p:spPr>
+                <p:style>
+                  <a:lnRef idx="2">
+                    <a:schemeClr val="dk1">
+                      <a:shade val="50000"/>
+                    </a:schemeClr>
+                  </a:lnRef>
+                  <a:fillRef idx="1">
+                    <a:schemeClr val="dk1"/>
+                  </a:fillRef>
+                  <a:effectRef idx="0">
+                    <a:schemeClr val="dk1"/>
+                  </a:effectRef>
+                  <a:fontRef idx="minor">
+                    <a:schemeClr val="lt1"/>
+                  </a:fontRef>
+                </p:style>
+                <p:txBody>
+                  <a:bodyPr rtlCol="0" anchor="ctr"/>
+                  <a:lstStyle/>
+                  <a:p>
+                    <a:pPr algn="ctr"/>
+                    <a:endParaRPr lang="en-US" sz="1400" dirty="0">
+                      <a:solidFill>
+                        <a:schemeClr val="tx1"/>
+                      </a:solidFill>
+                    </a:endParaRPr>
+                  </a:p>
+                </p:txBody>
+              </p:sp>
+              <p:sp>
+                <p:nvSpPr>
+                  <p:cNvPr id="86" name="正方形/長方形 85"/>
+                  <p:cNvSpPr/>
+                  <p:nvPr/>
+                </p:nvSpPr>
+                <p:spPr>
+                  <a:xfrm>
+                    <a:off x="7964684" y="3973923"/>
+                    <a:ext cx="1032710" cy="489528"/>
+                  </a:xfrm>
+                  <a:prstGeom prst="rect">
+                    <a:avLst/>
+                  </a:prstGeom>
+                  <a:solidFill>
+                    <a:schemeClr val="bg1"/>
+                  </a:solidFill>
+                </p:spPr>
+                <p:style>
+                  <a:lnRef idx="2">
+                    <a:schemeClr val="dk1">
+                      <a:shade val="50000"/>
+                    </a:schemeClr>
+                  </a:lnRef>
+                  <a:fillRef idx="1">
+                    <a:schemeClr val="dk1"/>
+                  </a:fillRef>
+                  <a:effectRef idx="0">
+                    <a:schemeClr val="dk1"/>
+                  </a:effectRef>
+                  <a:fontRef idx="minor">
+                    <a:schemeClr val="lt1"/>
+                  </a:fontRef>
+                </p:style>
+                <p:txBody>
+                  <a:bodyPr rtlCol="0" anchor="ctr"/>
+                  <a:lstStyle/>
+                  <a:p>
+                    <a:pPr algn="ctr"/>
+                    <a:r>
+                      <a:rPr lang="en-US" sz="1400" dirty="0" smtClean="0">
+                        <a:solidFill>
+                          <a:schemeClr val="tx1"/>
+                        </a:solidFill>
+                      </a:rPr>
+                      <a:t>Speech recognition</a:t>
+                    </a:r>
+                    <a:endParaRPr lang="en-US" sz="1400" dirty="0">
+                      <a:solidFill>
+                        <a:schemeClr val="tx1"/>
+                      </a:solidFill>
+                    </a:endParaRPr>
+                  </a:p>
+                </p:txBody>
+              </p:sp>
+            </p:grpSp>
+            <p:grpSp>
+              <p:nvGrpSpPr>
+                <p:cNvPr id="90" name="グループ化 89"/>
+                <p:cNvGrpSpPr/>
+                <p:nvPr/>
+              </p:nvGrpSpPr>
+              <p:grpSpPr>
+                <a:xfrm>
+                  <a:off x="9133792" y="4091612"/>
+                  <a:ext cx="951312" cy="557645"/>
+                  <a:chOff x="9289351" y="3973923"/>
+                  <a:chExt cx="951312" cy="557645"/>
+                </a:xfrm>
+              </p:grpSpPr>
+              <p:sp>
+                <p:nvSpPr>
+                  <p:cNvPr id="89" name="正方形/長方形 88"/>
+                  <p:cNvSpPr/>
+                  <p:nvPr/>
+                </p:nvSpPr>
+                <p:spPr>
+                  <a:xfrm>
+                    <a:off x="9352648" y="4042040"/>
+                    <a:ext cx="888015" cy="489528"/>
+                  </a:xfrm>
+                  <a:prstGeom prst="rect">
+                    <a:avLst/>
+                  </a:prstGeom>
+                  <a:solidFill>
+                    <a:schemeClr val="bg1"/>
+                  </a:solidFill>
+                </p:spPr>
+                <p:style>
+                  <a:lnRef idx="2">
+                    <a:schemeClr val="dk1">
+                      <a:shade val="50000"/>
+                    </a:schemeClr>
+                  </a:lnRef>
+                  <a:fillRef idx="1">
+                    <a:schemeClr val="dk1"/>
+                  </a:fillRef>
+                  <a:effectRef idx="0">
+                    <a:schemeClr val="dk1"/>
+                  </a:effectRef>
+                  <a:fontRef idx="minor">
+                    <a:schemeClr val="lt1"/>
+                  </a:fontRef>
+                </p:style>
+                <p:txBody>
+                  <a:bodyPr rtlCol="0" anchor="ctr"/>
+                  <a:lstStyle/>
+                  <a:p>
+                    <a:pPr algn="ctr"/>
+                    <a:endParaRPr lang="en-US" sz="1400" dirty="0">
+                      <a:solidFill>
+                        <a:schemeClr val="tx1"/>
+                      </a:solidFill>
+                    </a:endParaRPr>
+                  </a:p>
+                </p:txBody>
+              </p:sp>
+              <p:sp>
+                <p:nvSpPr>
+                  <p:cNvPr id="83" name="正方形/長方形 82"/>
+                  <p:cNvSpPr/>
+                  <p:nvPr/>
+                </p:nvSpPr>
+                <p:spPr>
+                  <a:xfrm>
+                    <a:off x="9289351" y="3973923"/>
+                    <a:ext cx="882790" cy="489528"/>
+                  </a:xfrm>
+                  <a:prstGeom prst="rect">
+                    <a:avLst/>
+                  </a:prstGeom>
+                  <a:solidFill>
+                    <a:schemeClr val="bg1"/>
+                  </a:solidFill>
+                </p:spPr>
+                <p:style>
+                  <a:lnRef idx="2">
+                    <a:schemeClr val="dk1">
+                      <a:shade val="50000"/>
+                    </a:schemeClr>
+                  </a:lnRef>
+                  <a:fillRef idx="1">
+                    <a:schemeClr val="dk1"/>
+                  </a:fillRef>
+                  <a:effectRef idx="0">
+                    <a:schemeClr val="dk1"/>
+                  </a:effectRef>
+                  <a:fontRef idx="minor">
+                    <a:schemeClr val="lt1"/>
+                  </a:fontRef>
+                </p:style>
+                <p:txBody>
+                  <a:bodyPr rtlCol="0" anchor="ctr"/>
+                  <a:lstStyle/>
+                  <a:p>
+                    <a:pPr algn="ctr"/>
+                    <a:r>
+                      <a:rPr lang="en-US" sz="1400" dirty="0" smtClean="0">
+                        <a:solidFill>
+                          <a:schemeClr val="tx1"/>
+                        </a:solidFill>
+                      </a:rPr>
+                      <a:t>Robot interface</a:t>
+                    </a:r>
+                    <a:endParaRPr lang="en-US" sz="1400" dirty="0">
+                      <a:solidFill>
+                        <a:schemeClr val="tx1"/>
+                      </a:solidFill>
+                    </a:endParaRPr>
+                  </a:p>
+                </p:txBody>
+              </p:sp>
+            </p:grpSp>
+            <p:grpSp>
+              <p:nvGrpSpPr>
+                <p:cNvPr id="94" name="グループ化 93"/>
+                <p:cNvGrpSpPr/>
+                <p:nvPr/>
+              </p:nvGrpSpPr>
+              <p:grpSpPr>
+                <a:xfrm>
+                  <a:off x="7960054" y="4725878"/>
+                  <a:ext cx="1109092" cy="421354"/>
+                  <a:chOff x="8621654" y="5373240"/>
+                  <a:chExt cx="1109092" cy="421354"/>
+                </a:xfrm>
+              </p:grpSpPr>
+              <p:sp>
+                <p:nvSpPr>
+                  <p:cNvPr id="82" name="正方形/長方形 81"/>
+                  <p:cNvSpPr/>
+                  <p:nvPr/>
+                </p:nvSpPr>
+                <p:spPr>
+                  <a:xfrm>
+                    <a:off x="8670259" y="5441358"/>
+                    <a:ext cx="1060487" cy="353236"/>
+                  </a:xfrm>
+                  <a:prstGeom prst="rect">
+                    <a:avLst/>
+                  </a:prstGeom>
+                  <a:solidFill>
+                    <a:schemeClr val="bg1"/>
+                  </a:solidFill>
+                </p:spPr>
+                <p:style>
+                  <a:lnRef idx="2">
+                    <a:schemeClr val="dk1">
+                      <a:shade val="50000"/>
+                    </a:schemeClr>
+                  </a:lnRef>
+                  <a:fillRef idx="1">
+                    <a:schemeClr val="dk1"/>
+                  </a:fillRef>
+                  <a:effectRef idx="0">
+                    <a:schemeClr val="dk1"/>
+                  </a:effectRef>
+                  <a:fontRef idx="minor">
+                    <a:schemeClr val="lt1"/>
+                  </a:fontRef>
+                </p:style>
+                <p:txBody>
+                  <a:bodyPr rtlCol="0" anchor="ctr"/>
+                  <a:lstStyle/>
+                  <a:p>
+                    <a:pPr algn="ctr"/>
+                    <a:endParaRPr lang="en-US" sz="1400" dirty="0">
+                      <a:solidFill>
+                        <a:schemeClr val="tx1"/>
+                      </a:solidFill>
+                    </a:endParaRPr>
+                  </a:p>
+                </p:txBody>
+              </p:sp>
+              <p:sp>
+                <p:nvSpPr>
+                  <p:cNvPr id="93" name="正方形/長方形 92"/>
+                  <p:cNvSpPr/>
+                  <p:nvPr/>
+                </p:nvSpPr>
+                <p:spPr>
+                  <a:xfrm>
+                    <a:off x="8621654" y="5373240"/>
+                    <a:ext cx="1060487" cy="353236"/>
+                  </a:xfrm>
+                  <a:prstGeom prst="rect">
+                    <a:avLst/>
+                  </a:prstGeom>
+                  <a:solidFill>
+                    <a:schemeClr val="bg1"/>
+                  </a:solidFill>
+                </p:spPr>
+                <p:style>
+                  <a:lnRef idx="2">
+                    <a:schemeClr val="dk1">
+                      <a:shade val="50000"/>
+                    </a:schemeClr>
+                  </a:lnRef>
+                  <a:fillRef idx="1">
+                    <a:schemeClr val="dk1"/>
+                  </a:fillRef>
+                  <a:effectRef idx="0">
+                    <a:schemeClr val="dk1"/>
+                  </a:effectRef>
+                  <a:fontRef idx="minor">
+                    <a:schemeClr val="lt1"/>
+                  </a:fontRef>
+                </p:style>
+                <p:txBody>
+                  <a:bodyPr rtlCol="0" anchor="ctr"/>
+                  <a:lstStyle/>
+                  <a:p>
+                    <a:pPr algn="ctr"/>
+                    <a:r>
+                      <a:rPr lang="en-US" sz="1400" dirty="0" smtClean="0">
+                        <a:solidFill>
+                          <a:schemeClr val="tx1"/>
+                        </a:solidFill>
+                      </a:rPr>
+                      <a:t>Localization</a:t>
+                    </a:r>
+                    <a:endParaRPr lang="en-US" sz="1400" dirty="0">
+                      <a:solidFill>
+                        <a:schemeClr val="tx1"/>
+                      </a:solidFill>
+                    </a:endParaRPr>
+                  </a:p>
+                </p:txBody>
+              </p:sp>
+            </p:grpSp>
+          </p:grpSp>
+          <p:cxnSp>
+            <p:nvCxnSpPr>
+              <p:cNvPr id="105" name="直線矢印コネクタ 104"/>
+              <p:cNvCxnSpPr>
+                <a:stCxn id="52" idx="2"/>
+                <a:endCxn id="81" idx="0"/>
+              </p:cNvCxnSpPr>
+              <p:nvPr/>
+            </p:nvCxnSpPr>
+            <p:spPr>
+              <a:xfrm flipH="1">
+                <a:off x="8455936" y="3784349"/>
+                <a:ext cx="1" cy="213118"/>
+              </a:xfrm>
+              <a:prstGeom prst="straightConnector1">
+                <a:avLst/>
+              </a:prstGeom>
+              <a:ln>
+                <a:solidFill>
+                  <a:schemeClr val="tx1"/>
+                </a:solidFill>
+                <a:headEnd type="stealth"/>
+                <a:tailEnd type="triangle"/>
+              </a:ln>
+            </p:spPr>
+            <p:style>
+              <a:lnRef idx="1">
+                <a:schemeClr val="accent1"/>
+              </a:lnRef>
+              <a:fillRef idx="0">
+                <a:schemeClr val="accent1"/>
+              </a:fillRef>
+              <a:effectRef idx="0">
+                <a:schemeClr val="accent1"/>
+              </a:effectRef>
+              <a:fontRef idx="minor">
+                <a:schemeClr val="tx1"/>
+              </a:fontRef>
+            </p:style>
+          </p:cxnSp>
+          <p:sp>
+            <p:nvSpPr>
+              <p:cNvPr id="106" name="テキスト ボックス 105"/>
+              <p:cNvSpPr txBox="1"/>
+              <p:nvPr/>
+            </p:nvSpPr>
+            <p:spPr>
+              <a:xfrm>
+                <a:off x="8478163" y="3757049"/>
+                <a:ext cx="655629" cy="307777"/>
+              </a:xfrm>
+              <a:prstGeom prst="rect">
+                <a:avLst/>
+              </a:prstGeom>
+              <a:noFill/>
+            </p:spPr>
+            <p:txBody>
+              <a:bodyPr wrap="none" rtlCol="0">
+                <a:spAutoFit/>
+              </a:bodyPr>
+              <a:lstStyle/>
+              <a:p>
+                <a:r>
+                  <a:rPr lang="en-US" sz="1400" dirty="0" smtClean="0"/>
+                  <a:t>TCP/IP</a:t>
+                </a:r>
+                <a:endParaRPr lang="en-US" sz="1400" dirty="0"/>
+              </a:p>
+            </p:txBody>
+          </p:sp>
+          <p:cxnSp>
+            <p:nvCxnSpPr>
+              <p:cNvPr id="115" name="直線矢印コネクタ 114"/>
+              <p:cNvCxnSpPr>
+                <a:stCxn id="81" idx="2"/>
+                <a:endCxn id="98" idx="0"/>
+              </p:cNvCxnSpPr>
+              <p:nvPr/>
+            </p:nvCxnSpPr>
+            <p:spPr>
+              <a:xfrm>
+                <a:off x="8455936" y="5205813"/>
+                <a:ext cx="0" cy="206355"/>
+              </a:xfrm>
+              <a:prstGeom prst="straightConnector1">
+                <a:avLst/>
+              </a:prstGeom>
+              <a:ln>
+                <a:solidFill>
+                  <a:schemeClr val="tx1"/>
+                </a:solidFill>
+                <a:headEnd type="stealth"/>
+                <a:tailEnd type="triangle"/>
+              </a:ln>
+            </p:spPr>
+            <p:style>
+              <a:lnRef idx="1">
+                <a:schemeClr val="accent1"/>
+              </a:lnRef>
+              <a:fillRef idx="0">
+                <a:schemeClr val="accent1"/>
+              </a:fillRef>
+              <a:effectRef idx="0">
+                <a:schemeClr val="accent1"/>
+              </a:effectRef>
+              <a:fontRef idx="minor">
+                <a:schemeClr val="tx1"/>
+              </a:fontRef>
+            </p:style>
+          </p:cxnSp>
+          <p:sp>
+            <p:nvSpPr>
+              <p:cNvPr id="116" name="テキスト ボックス 115"/>
+              <p:cNvSpPr txBox="1"/>
+              <p:nvPr/>
+            </p:nvSpPr>
+            <p:spPr>
+              <a:xfrm>
+                <a:off x="8459380" y="5166785"/>
+                <a:ext cx="655629" cy="307777"/>
+              </a:xfrm>
+              <a:prstGeom prst="rect">
+                <a:avLst/>
+              </a:prstGeom>
+              <a:noFill/>
+            </p:spPr>
+            <p:txBody>
+              <a:bodyPr wrap="none" rtlCol="0">
+                <a:spAutoFit/>
+              </a:bodyPr>
+              <a:lstStyle/>
+              <a:p>
+                <a:r>
+                  <a:rPr lang="en-US" sz="1400" dirty="0" smtClean="0"/>
+                  <a:t>TCP/IP</a:t>
+                </a:r>
+                <a:endParaRPr lang="en-US" sz="1400" dirty="0"/>
+              </a:p>
+            </p:txBody>
+          </p:sp>
+          <p:grpSp>
+            <p:nvGrpSpPr>
+              <p:cNvPr id="126" name="グループ化 125"/>
+              <p:cNvGrpSpPr/>
+              <p:nvPr/>
+            </p:nvGrpSpPr>
+            <p:grpSpPr>
+              <a:xfrm>
+                <a:off x="6590922" y="5412168"/>
+                <a:ext cx="3730027" cy="603014"/>
+                <a:chOff x="6590922" y="5412168"/>
+                <a:chExt cx="3730027" cy="603014"/>
+              </a:xfrm>
+            </p:grpSpPr>
+            <p:sp>
+              <p:nvSpPr>
+                <p:cNvPr id="98" name="正方形/長方形 97"/>
+                <p:cNvSpPr/>
+                <p:nvPr/>
+              </p:nvSpPr>
+              <p:spPr>
+                <a:xfrm>
+                  <a:off x="6590922" y="5412168"/>
+                  <a:ext cx="3730027" cy="603014"/>
+                </a:xfrm>
+                <a:prstGeom prst="rect">
+                  <a:avLst/>
+                </a:prstGeom>
+                <a:solidFill>
+                  <a:schemeClr val="bg1"/>
+                </a:solidFill>
+              </p:spPr>
+              <p:style>
+                <a:lnRef idx="2">
+                  <a:schemeClr val="dk1">
+                    <a:shade val="50000"/>
+                  </a:schemeClr>
+                </a:lnRef>
+                <a:fillRef idx="1">
+                  <a:schemeClr val="dk1"/>
+                </a:fillRef>
+                <a:effectRef idx="0">
+                  <a:schemeClr val="dk1"/>
+                </a:effectRef>
+                <a:fontRef idx="minor">
+                  <a:schemeClr val="lt1"/>
+                </a:fontRef>
+              </p:style>
+              <p:txBody>
+                <a:bodyPr rtlCol="0" anchor="ctr"/>
+                <a:lstStyle/>
+                <a:p>
+                  <a:pPr algn="ctr"/>
+                  <a:endParaRPr lang="en-US" dirty="0"/>
+                </a:p>
+              </p:txBody>
+            </p:sp>
+            <p:grpSp>
+              <p:nvGrpSpPr>
+                <p:cNvPr id="102" name="グループ化 101"/>
+                <p:cNvGrpSpPr/>
+                <p:nvPr/>
+              </p:nvGrpSpPr>
+              <p:grpSpPr>
+                <a:xfrm>
+                  <a:off x="7648380" y="5508062"/>
+                  <a:ext cx="1109092" cy="421354"/>
+                  <a:chOff x="8621654" y="5373240"/>
+                  <a:chExt cx="1109092" cy="421354"/>
+                </a:xfrm>
+              </p:grpSpPr>
+              <p:sp>
+                <p:nvSpPr>
+                  <p:cNvPr id="103" name="正方形/長方形 102"/>
+                  <p:cNvSpPr/>
+                  <p:nvPr/>
+                </p:nvSpPr>
+                <p:spPr>
+                  <a:xfrm>
+                    <a:off x="8670259" y="5441358"/>
+                    <a:ext cx="1060487" cy="353236"/>
+                  </a:xfrm>
+                  <a:prstGeom prst="rect">
+                    <a:avLst/>
+                  </a:prstGeom>
+                  <a:solidFill>
+                    <a:schemeClr val="bg1"/>
+                  </a:solidFill>
+                </p:spPr>
+                <p:style>
+                  <a:lnRef idx="2">
+                    <a:schemeClr val="dk1">
+                      <a:shade val="50000"/>
+                    </a:schemeClr>
+                  </a:lnRef>
+                  <a:fillRef idx="1">
+                    <a:schemeClr val="dk1"/>
+                  </a:fillRef>
+                  <a:effectRef idx="0">
+                    <a:schemeClr val="dk1"/>
+                  </a:effectRef>
+                  <a:fontRef idx="minor">
+                    <a:schemeClr val="lt1"/>
+                  </a:fontRef>
+                </p:style>
+                <p:txBody>
+                  <a:bodyPr rtlCol="0" anchor="ctr"/>
+                  <a:lstStyle/>
+                  <a:p>
+                    <a:pPr algn="ctr"/>
+                    <a:endParaRPr lang="en-US" sz="1400" dirty="0">
+                      <a:solidFill>
+                        <a:schemeClr val="tx1"/>
+                      </a:solidFill>
+                    </a:endParaRPr>
+                  </a:p>
+                </p:txBody>
+              </p:sp>
+              <p:sp>
+                <p:nvSpPr>
+                  <p:cNvPr id="104" name="正方形/長方形 103"/>
+                  <p:cNvSpPr/>
+                  <p:nvPr/>
+                </p:nvSpPr>
+                <p:spPr>
+                  <a:xfrm>
+                    <a:off x="8621654" y="5373240"/>
+                    <a:ext cx="1060487" cy="353236"/>
+                  </a:xfrm>
+                  <a:prstGeom prst="rect">
+                    <a:avLst/>
+                  </a:prstGeom>
+                  <a:solidFill>
+                    <a:schemeClr val="bg1"/>
+                  </a:solidFill>
+                </p:spPr>
+                <p:style>
+                  <a:lnRef idx="2">
+                    <a:schemeClr val="dk1">
+                      <a:shade val="50000"/>
+                    </a:schemeClr>
+                  </a:lnRef>
+                  <a:fillRef idx="1">
+                    <a:schemeClr val="dk1"/>
+                  </a:fillRef>
+                  <a:effectRef idx="0">
+                    <a:schemeClr val="dk1"/>
+                  </a:effectRef>
+                  <a:fontRef idx="minor">
+                    <a:schemeClr val="lt1"/>
+                  </a:fontRef>
+                </p:style>
+                <p:txBody>
+                  <a:bodyPr rtlCol="0" anchor="ctr"/>
+                  <a:lstStyle/>
+                  <a:p>
+                    <a:pPr algn="ctr"/>
+                    <a:r>
+                      <a:rPr lang="en-US" sz="1400" dirty="0" smtClean="0">
+                        <a:solidFill>
+                          <a:schemeClr val="tx1"/>
+                        </a:solidFill>
+                      </a:rPr>
+                      <a:t>Sensor</a:t>
+                    </a:r>
+                    <a:endParaRPr lang="en-US" sz="1400" dirty="0">
+                      <a:solidFill>
+                        <a:schemeClr val="tx1"/>
+                      </a:solidFill>
+                    </a:endParaRPr>
+                  </a:p>
+                </p:txBody>
+              </p:sp>
+            </p:grpSp>
+            <p:grpSp>
+              <p:nvGrpSpPr>
+                <p:cNvPr id="122" name="グループ化 121"/>
+                <p:cNvGrpSpPr/>
+                <p:nvPr/>
+              </p:nvGrpSpPr>
+              <p:grpSpPr>
+                <a:xfrm>
+                  <a:off x="8953713" y="5508062"/>
+                  <a:ext cx="1109092" cy="421354"/>
+                  <a:chOff x="8621654" y="5373240"/>
+                  <a:chExt cx="1109092" cy="421354"/>
+                </a:xfrm>
+              </p:grpSpPr>
+              <p:sp>
+                <p:nvSpPr>
+                  <p:cNvPr id="123" name="正方形/長方形 122"/>
+                  <p:cNvSpPr/>
+                  <p:nvPr/>
+                </p:nvSpPr>
+                <p:spPr>
+                  <a:xfrm>
+                    <a:off x="8670259" y="5441358"/>
+                    <a:ext cx="1060487" cy="353236"/>
+                  </a:xfrm>
+                  <a:prstGeom prst="rect">
+                    <a:avLst/>
+                  </a:prstGeom>
+                  <a:solidFill>
+                    <a:schemeClr val="bg1"/>
+                  </a:solidFill>
+                </p:spPr>
+                <p:style>
+                  <a:lnRef idx="2">
+                    <a:schemeClr val="dk1">
+                      <a:shade val="50000"/>
+                    </a:schemeClr>
+                  </a:lnRef>
+                  <a:fillRef idx="1">
+                    <a:schemeClr val="dk1"/>
+                  </a:fillRef>
+                  <a:effectRef idx="0">
+                    <a:schemeClr val="dk1"/>
+                  </a:effectRef>
+                  <a:fontRef idx="minor">
+                    <a:schemeClr val="lt1"/>
+                  </a:fontRef>
+                </p:style>
+                <p:txBody>
+                  <a:bodyPr rtlCol="0" anchor="ctr"/>
+                  <a:lstStyle/>
+                  <a:p>
+                    <a:pPr algn="ctr"/>
+                    <a:endParaRPr lang="en-US" sz="1400" dirty="0">
+                      <a:solidFill>
+                        <a:schemeClr val="tx1"/>
+                      </a:solidFill>
+                    </a:endParaRPr>
+                  </a:p>
+                </p:txBody>
+              </p:sp>
+              <p:sp>
+                <p:nvSpPr>
+                  <p:cNvPr id="124" name="正方形/長方形 123"/>
+                  <p:cNvSpPr/>
+                  <p:nvPr/>
+                </p:nvSpPr>
+                <p:spPr>
+                  <a:xfrm>
+                    <a:off x="8621654" y="5373240"/>
+                    <a:ext cx="1060487" cy="353236"/>
+                  </a:xfrm>
+                  <a:prstGeom prst="rect">
+                    <a:avLst/>
+                  </a:prstGeom>
+                  <a:solidFill>
+                    <a:schemeClr val="bg1"/>
+                  </a:solidFill>
+                </p:spPr>
+                <p:style>
+                  <a:lnRef idx="2">
+                    <a:schemeClr val="dk1">
+                      <a:shade val="50000"/>
+                    </a:schemeClr>
+                  </a:lnRef>
+                  <a:fillRef idx="1">
+                    <a:schemeClr val="dk1"/>
+                  </a:fillRef>
+                  <a:effectRef idx="0">
+                    <a:schemeClr val="dk1"/>
+                  </a:effectRef>
+                  <a:fontRef idx="minor">
+                    <a:schemeClr val="lt1"/>
+                  </a:fontRef>
+                </p:style>
+                <p:txBody>
+                  <a:bodyPr rtlCol="0" anchor="ctr"/>
+                  <a:lstStyle/>
+                  <a:p>
+                    <a:pPr algn="ctr"/>
+                    <a:r>
+                      <a:rPr lang="en-US" sz="1400" dirty="0" smtClean="0">
+                        <a:solidFill>
+                          <a:schemeClr val="tx1"/>
+                        </a:solidFill>
+                      </a:rPr>
+                      <a:t>Robot</a:t>
+                    </a:r>
+                    <a:endParaRPr lang="en-US" sz="1400" dirty="0">
+                      <a:solidFill>
+                        <a:schemeClr val="tx1"/>
+                      </a:solidFill>
+                    </a:endParaRPr>
+                  </a:p>
+                </p:txBody>
+              </p:sp>
+            </p:grpSp>
+            <p:sp>
+              <p:nvSpPr>
+                <p:cNvPr id="125" name="テキスト ボックス 124"/>
+                <p:cNvSpPr txBox="1"/>
+                <p:nvPr/>
+              </p:nvSpPr>
+              <p:spPr>
+                <a:xfrm>
+                  <a:off x="6685275" y="5621639"/>
+                  <a:ext cx="900824" cy="307777"/>
+                </a:xfrm>
+                <a:prstGeom prst="rect">
+                  <a:avLst/>
+                </a:prstGeom>
+                <a:noFill/>
+              </p:spPr>
+              <p:txBody>
+                <a:bodyPr wrap="none" rtlCol="0">
+                  <a:spAutoFit/>
+                </a:bodyPr>
+                <a:lstStyle/>
+                <a:p>
+                  <a:r>
+                    <a:rPr lang="en-US" sz="1400" dirty="0" smtClean="0"/>
+                    <a:t>Hardware</a:t>
+                  </a:r>
+                  <a:endParaRPr lang="en-US" sz="1400" dirty="0"/>
+                </a:p>
+              </p:txBody>
+            </p:sp>
+          </p:grpSp>
+        </p:grpSp>
         <p:sp>
           <p:nvSpPr>
-            <p:cNvPr id="8" name="正方形/長方形 7"/>
+            <p:cNvPr id="129" name="正方形/長方形 128"/>
             <p:cNvSpPr/>
             <p:nvPr/>
           </p:nvSpPr>
           <p:spPr>
             <a:xfrm>
-              <a:off x="6590923" y="1401804"/>
-              <a:ext cx="3730027" cy="752921"/>
+              <a:off x="5803271" y="588475"/>
+              <a:ext cx="3874883" cy="4771176"/>
             </a:xfrm>
             <a:prstGeom prst="rect">
               <a:avLst/>
             </a:prstGeom>
-            <a:solidFill>
-              <a:schemeClr val="bg1"/>
-            </a:solidFill>
+            <a:noFill/>
+            <a:ln>
+              <a:solidFill>
+                <a:schemeClr val="tx1"/>
+              </a:solidFill>
+            </a:ln>
           </p:spPr>
           <p:style>
             <a:lnRef idx="2">
-              <a:schemeClr val="dk1">
+              <a:schemeClr val="accent1">
                 <a:shade val="50000"/>
               </a:schemeClr>
             </a:lnRef>
             <a:fillRef idx="1">
-              <a:schemeClr val="dk1"/>
+              <a:schemeClr val="accent1"/>
             </a:fillRef>
             <a:effectRef idx="0">
-              <a:schemeClr val="dk1"/>
+              <a:schemeClr val="accent1"/>
             </a:effectRef>
             <a:fontRef idx="minor">
               <a:schemeClr val="lt1"/>
@@ -8632,1140 +10542,11 @@
             <a:lstStyle/>
             <a:p>
               <a:pPr algn="ctr"/>
-              <a:endParaRPr lang="en-US" dirty="0"/>
-            </a:p>
-          </p:txBody>
-        </p:sp>
-        <p:sp>
-          <p:nvSpPr>
-            <p:cNvPr id="40" name="正方形/長方形 39"/>
-            <p:cNvSpPr/>
-            <p:nvPr/>
-          </p:nvSpPr>
-          <p:spPr>
-            <a:xfrm>
-              <a:off x="7672174" y="1487292"/>
-              <a:ext cx="1126807" cy="571165"/>
-            </a:xfrm>
-            <a:prstGeom prst="rect">
-              <a:avLst/>
-            </a:prstGeom>
-            <a:solidFill>
-              <a:schemeClr val="bg1"/>
-            </a:solidFill>
-          </p:spPr>
-          <p:style>
-            <a:lnRef idx="2">
-              <a:schemeClr val="dk1">
-                <a:shade val="50000"/>
-              </a:schemeClr>
-            </a:lnRef>
-            <a:fillRef idx="1">
-              <a:schemeClr val="dk1"/>
-            </a:fillRef>
-            <a:effectRef idx="0">
-              <a:schemeClr val="dk1"/>
-            </a:effectRef>
-            <a:fontRef idx="minor">
-              <a:schemeClr val="lt1"/>
-            </a:fontRef>
-          </p:style>
-          <p:txBody>
-            <a:bodyPr rtlCol="0" anchor="ctr"/>
-            <a:lstStyle/>
-            <a:p>
-              <a:pPr algn="ctr"/>
-              <a:r>
-                <a:rPr lang="en-US" sz="1400" dirty="0" smtClean="0">
-                  <a:solidFill>
-                    <a:schemeClr val="tx1"/>
-                  </a:solidFill>
-                </a:rPr>
-                <a:t>Behavior designer</a:t>
-              </a:r>
-              <a:endParaRPr lang="en-US" sz="1400" dirty="0">
-                <a:solidFill>
-                  <a:schemeClr val="tx1"/>
-                </a:solidFill>
-              </a:endParaRPr>
-            </a:p>
-          </p:txBody>
-        </p:sp>
-        <p:sp>
-          <p:nvSpPr>
-            <p:cNvPr id="50" name="正方形/長方形 49"/>
-            <p:cNvSpPr/>
-            <p:nvPr/>
-          </p:nvSpPr>
-          <p:spPr>
-            <a:xfrm>
-              <a:off x="8876847" y="1487292"/>
-              <a:ext cx="1163226" cy="571165"/>
-            </a:xfrm>
-            <a:prstGeom prst="rect">
-              <a:avLst/>
-            </a:prstGeom>
-            <a:solidFill>
-              <a:schemeClr val="bg1"/>
-            </a:solidFill>
-          </p:spPr>
-          <p:style>
-            <a:lnRef idx="2">
-              <a:schemeClr val="dk1">
-                <a:shade val="50000"/>
-              </a:schemeClr>
-            </a:lnRef>
-            <a:fillRef idx="1">
-              <a:schemeClr val="dk1"/>
-            </a:fillRef>
-            <a:effectRef idx="0">
-              <a:schemeClr val="dk1"/>
-            </a:effectRef>
-            <a:fontRef idx="minor">
-              <a:schemeClr val="lt1"/>
-            </a:fontRef>
-          </p:style>
-          <p:txBody>
-            <a:bodyPr rtlCol="0" anchor="ctr"/>
-            <a:lstStyle/>
-            <a:p>
-              <a:pPr algn="ctr"/>
-              <a:r>
-                <a:rPr lang="en-US" sz="1400" dirty="0" smtClean="0">
-                  <a:solidFill>
-                    <a:schemeClr val="tx1"/>
-                  </a:solidFill>
-                </a:rPr>
-                <a:t>Visualization</a:t>
-              </a:r>
-              <a:endParaRPr lang="en-US" sz="1400" dirty="0">
-                <a:solidFill>
-                  <a:schemeClr val="tx1"/>
-                </a:solidFill>
-              </a:endParaRPr>
-            </a:p>
-          </p:txBody>
-        </p:sp>
-        <p:sp>
-          <p:nvSpPr>
-            <p:cNvPr id="51" name="テキスト ボックス 50"/>
-            <p:cNvSpPr txBox="1"/>
-            <p:nvPr/>
-          </p:nvSpPr>
-          <p:spPr>
-            <a:xfrm>
-              <a:off x="6650228" y="1455098"/>
-              <a:ext cx="836383" cy="523220"/>
-            </a:xfrm>
-            <a:prstGeom prst="rect">
-              <a:avLst/>
-            </a:prstGeom>
-            <a:noFill/>
-          </p:spPr>
-          <p:txBody>
-            <a:bodyPr wrap="none" rtlCol="0">
-              <a:spAutoFit/>
-            </a:bodyPr>
-            <a:lstStyle/>
-            <a:p>
-              <a:r>
-                <a:rPr lang="en-US" sz="1400" dirty="0" smtClean="0"/>
-                <a:t>Web</a:t>
-              </a:r>
-            </a:p>
-            <a:p>
-              <a:r>
-                <a:rPr lang="en-US" sz="1400" dirty="0" smtClean="0"/>
-                <a:t>Interface</a:t>
-              </a:r>
-              <a:endParaRPr lang="en-US" sz="1400" dirty="0"/>
+              <a:endParaRPr lang="en-US"/>
             </a:p>
           </p:txBody>
         </p:sp>
       </p:grpSp>
-      <p:cxnSp>
-        <p:nvCxnSpPr>
-          <p:cNvPr id="62" name="直線矢印コネクタ 61"/>
-          <p:cNvCxnSpPr>
-            <a:stCxn id="8" idx="2"/>
-            <a:endCxn id="52" idx="0"/>
-          </p:cNvCxnSpPr>
-          <p:nvPr/>
-        </p:nvCxnSpPr>
-        <p:spPr>
-          <a:xfrm>
-            <a:off x="8455937" y="2047111"/>
-            <a:ext cx="0" cy="179314"/>
-          </a:xfrm>
-          <a:prstGeom prst="straightConnector1">
-            <a:avLst/>
-          </a:prstGeom>
-          <a:ln>
-            <a:solidFill>
-              <a:schemeClr val="tx1"/>
-            </a:solidFill>
-            <a:headEnd type="stealth"/>
-            <a:tailEnd type="triangle"/>
-          </a:ln>
-        </p:spPr>
-        <p:style>
-          <a:lnRef idx="1">
-            <a:schemeClr val="accent1"/>
-          </a:lnRef>
-          <a:fillRef idx="0">
-            <a:schemeClr val="accent1"/>
-          </a:fillRef>
-          <a:effectRef idx="0">
-            <a:schemeClr val="accent1"/>
-          </a:effectRef>
-          <a:fontRef idx="minor">
-            <a:schemeClr val="tx1"/>
-          </a:fontRef>
-        </p:style>
-      </p:cxnSp>
-      <p:sp>
-        <p:nvSpPr>
-          <p:cNvPr id="63" name="テキスト ボックス 62"/>
-          <p:cNvSpPr txBox="1"/>
-          <p:nvPr/>
-        </p:nvSpPr>
-        <p:spPr>
-          <a:xfrm>
-            <a:off x="8492148" y="2000337"/>
-            <a:ext cx="568617" cy="307777"/>
-          </a:xfrm>
-          <a:prstGeom prst="rect">
-            <a:avLst/>
-          </a:prstGeom>
-          <a:noFill/>
-        </p:spPr>
-        <p:txBody>
-          <a:bodyPr wrap="none" rtlCol="0">
-            <a:spAutoFit/>
-          </a:bodyPr>
-          <a:lstStyle/>
-          <a:p>
-            <a:r>
-              <a:rPr lang="en-US" sz="1400" dirty="0" smtClean="0"/>
-              <a:t>HTTP</a:t>
-            </a:r>
-            <a:endParaRPr lang="en-US" sz="1400" dirty="0"/>
-          </a:p>
-        </p:txBody>
-      </p:sp>
-      <p:grpSp>
-        <p:nvGrpSpPr>
-          <p:cNvPr id="79" name="グループ化 78"/>
-          <p:cNvGrpSpPr/>
-          <p:nvPr/>
-        </p:nvGrpSpPr>
-        <p:grpSpPr>
-          <a:xfrm>
-            <a:off x="6590923" y="2226425"/>
-            <a:ext cx="3730027" cy="1584919"/>
-            <a:chOff x="6590923" y="2226425"/>
-            <a:chExt cx="3730027" cy="1584919"/>
-          </a:xfrm>
-        </p:grpSpPr>
-        <p:sp>
-          <p:nvSpPr>
-            <p:cNvPr id="52" name="正方形/長方形 51"/>
-            <p:cNvSpPr/>
-            <p:nvPr/>
-          </p:nvSpPr>
-          <p:spPr>
-            <a:xfrm>
-              <a:off x="6590923" y="2226425"/>
-              <a:ext cx="3730027" cy="1557924"/>
-            </a:xfrm>
-            <a:prstGeom prst="rect">
-              <a:avLst/>
-            </a:prstGeom>
-            <a:solidFill>
-              <a:schemeClr val="bg1"/>
-            </a:solidFill>
-          </p:spPr>
-          <p:style>
-            <a:lnRef idx="2">
-              <a:schemeClr val="dk1">
-                <a:shade val="50000"/>
-              </a:schemeClr>
-            </a:lnRef>
-            <a:fillRef idx="1">
-              <a:schemeClr val="dk1"/>
-            </a:fillRef>
-            <a:effectRef idx="0">
-              <a:schemeClr val="dk1"/>
-            </a:effectRef>
-            <a:fontRef idx="minor">
-              <a:schemeClr val="lt1"/>
-            </a:fontRef>
-          </p:style>
-          <p:txBody>
-            <a:bodyPr rtlCol="0" anchor="ctr"/>
-            <a:lstStyle/>
-            <a:p>
-              <a:pPr algn="ctr"/>
-              <a:endParaRPr lang="en-US" dirty="0"/>
-            </a:p>
-          </p:txBody>
-        </p:sp>
-        <p:sp>
-          <p:nvSpPr>
-            <p:cNvPr id="53" name="正方形/長方形 52"/>
-            <p:cNvSpPr/>
-            <p:nvPr/>
-          </p:nvSpPr>
-          <p:spPr>
-            <a:xfrm>
-              <a:off x="7988202" y="2333540"/>
-              <a:ext cx="1126807" cy="454927"/>
-            </a:xfrm>
-            <a:prstGeom prst="rect">
-              <a:avLst/>
-            </a:prstGeom>
-            <a:solidFill>
-              <a:schemeClr val="bg1"/>
-            </a:solidFill>
-          </p:spPr>
-          <p:style>
-            <a:lnRef idx="2">
-              <a:schemeClr val="dk1">
-                <a:shade val="50000"/>
-              </a:schemeClr>
-            </a:lnRef>
-            <a:fillRef idx="1">
-              <a:schemeClr val="dk1"/>
-            </a:fillRef>
-            <a:effectRef idx="0">
-              <a:schemeClr val="dk1"/>
-            </a:effectRef>
-            <a:fontRef idx="minor">
-              <a:schemeClr val="lt1"/>
-            </a:fontRef>
-          </p:style>
-          <p:txBody>
-            <a:bodyPr rtlCol="0" anchor="ctr"/>
-            <a:lstStyle/>
-            <a:p>
-              <a:pPr algn="ctr"/>
-              <a:r>
-                <a:rPr lang="en-US" sz="1400" dirty="0" smtClean="0">
-                  <a:solidFill>
-                    <a:schemeClr val="tx1"/>
-                  </a:solidFill>
-                </a:rPr>
-                <a:t>Application</a:t>
-              </a:r>
-              <a:r>
-                <a:rPr lang="en-US" sz="1400" dirty="0">
-                  <a:solidFill>
-                    <a:schemeClr val="tx1"/>
-                  </a:solidFill>
-                </a:rPr>
-                <a:t> </a:t>
-              </a:r>
-              <a:r>
-                <a:rPr lang="en-US" sz="1400" dirty="0" smtClean="0">
-                  <a:solidFill>
-                    <a:schemeClr val="tx1"/>
-                  </a:solidFill>
-                </a:rPr>
-                <a:t>Context</a:t>
-              </a:r>
-              <a:endParaRPr lang="en-US" sz="1400" dirty="0" smtClean="0">
-                <a:solidFill>
-                  <a:schemeClr val="tx1"/>
-                </a:solidFill>
-              </a:endParaRPr>
-            </a:p>
-          </p:txBody>
-        </p:sp>
-        <p:sp>
-          <p:nvSpPr>
-            <p:cNvPr id="54" name="正方形/長方形 53"/>
-            <p:cNvSpPr/>
-            <p:nvPr/>
-          </p:nvSpPr>
-          <p:spPr>
-            <a:xfrm>
-              <a:off x="9299638" y="2333540"/>
-              <a:ext cx="941025" cy="454927"/>
-            </a:xfrm>
-            <a:prstGeom prst="rect">
-              <a:avLst/>
-            </a:prstGeom>
-            <a:solidFill>
-              <a:schemeClr val="bg1"/>
-            </a:solidFill>
-          </p:spPr>
-          <p:style>
-            <a:lnRef idx="2">
-              <a:schemeClr val="dk1">
-                <a:shade val="50000"/>
-              </a:schemeClr>
-            </a:lnRef>
-            <a:fillRef idx="1">
-              <a:schemeClr val="dk1"/>
-            </a:fillRef>
-            <a:effectRef idx="0">
-              <a:schemeClr val="dk1"/>
-            </a:effectRef>
-            <a:fontRef idx="minor">
-              <a:schemeClr val="lt1"/>
-            </a:fontRef>
-          </p:style>
-          <p:txBody>
-            <a:bodyPr rtlCol="0" anchor="ctr"/>
-            <a:lstStyle/>
-            <a:p>
-              <a:pPr algn="ctr"/>
-              <a:r>
-                <a:rPr lang="en-US" sz="1400" dirty="0" smtClean="0">
-                  <a:solidFill>
-                    <a:schemeClr val="tx1"/>
-                  </a:solidFill>
-                </a:rPr>
-                <a:t>Parameter Server</a:t>
-              </a:r>
-              <a:endParaRPr lang="en-US" sz="1400" dirty="0">
-                <a:solidFill>
-                  <a:schemeClr val="tx1"/>
-                </a:solidFill>
-              </a:endParaRPr>
-            </a:p>
-          </p:txBody>
-        </p:sp>
-        <p:sp>
-          <p:nvSpPr>
-            <p:cNvPr id="57" name="正方形/長方形 56"/>
-            <p:cNvSpPr/>
-            <p:nvPr/>
-          </p:nvSpPr>
-          <p:spPr>
-            <a:xfrm>
-              <a:off x="9415604" y="3029151"/>
-              <a:ext cx="859853" cy="454927"/>
-            </a:xfrm>
-            <a:prstGeom prst="rect">
-              <a:avLst/>
-            </a:prstGeom>
-            <a:solidFill>
-              <a:schemeClr val="bg2"/>
-            </a:solidFill>
-          </p:spPr>
-          <p:style>
-            <a:lnRef idx="2">
-              <a:schemeClr val="dk1">
-                <a:shade val="50000"/>
-              </a:schemeClr>
-            </a:lnRef>
-            <a:fillRef idx="1">
-              <a:schemeClr val="dk1"/>
-            </a:fillRef>
-            <a:effectRef idx="0">
-              <a:schemeClr val="dk1"/>
-            </a:effectRef>
-            <a:fontRef idx="minor">
-              <a:schemeClr val="lt1"/>
-            </a:fontRef>
-          </p:style>
-          <p:txBody>
-            <a:bodyPr rtlCol="0" anchor="ctr"/>
-            <a:lstStyle/>
-            <a:p>
-              <a:pPr algn="ctr"/>
-              <a:r>
-                <a:rPr lang="en-US" sz="1400" dirty="0" smtClean="0">
-                  <a:solidFill>
-                    <a:schemeClr val="tx1"/>
-                  </a:solidFill>
-                </a:rPr>
-                <a:t>Behavior program</a:t>
-              </a:r>
-              <a:endParaRPr lang="en-US" sz="1400" dirty="0">
-                <a:solidFill>
-                  <a:schemeClr val="tx1"/>
-                </a:solidFill>
-              </a:endParaRPr>
-            </a:p>
-          </p:txBody>
-        </p:sp>
-        <p:sp>
-          <p:nvSpPr>
-            <p:cNvPr id="58" name="正方形/長方形 57"/>
-            <p:cNvSpPr/>
-            <p:nvPr/>
-          </p:nvSpPr>
-          <p:spPr>
-            <a:xfrm>
-              <a:off x="7816183" y="3029151"/>
-              <a:ext cx="1485519" cy="454927"/>
-            </a:xfrm>
-            <a:prstGeom prst="rect">
-              <a:avLst/>
-            </a:prstGeom>
-            <a:solidFill>
-              <a:schemeClr val="bg1"/>
-            </a:solidFill>
-          </p:spPr>
-          <p:style>
-            <a:lnRef idx="2">
-              <a:schemeClr val="dk1">
-                <a:shade val="50000"/>
-              </a:schemeClr>
-            </a:lnRef>
-            <a:fillRef idx="1">
-              <a:schemeClr val="dk1"/>
-            </a:fillRef>
-            <a:effectRef idx="0">
-              <a:schemeClr val="dk1"/>
-            </a:effectRef>
-            <a:fontRef idx="minor">
-              <a:schemeClr val="lt1"/>
-            </a:fontRef>
-          </p:style>
-          <p:txBody>
-            <a:bodyPr rtlCol="0" anchor="ctr"/>
-            <a:lstStyle/>
-            <a:p>
-              <a:pPr algn="ctr"/>
-              <a:r>
-                <a:rPr lang="en-US" sz="1400" dirty="0" smtClean="0">
-                  <a:solidFill>
-                    <a:schemeClr val="tx1"/>
-                  </a:solidFill>
-                </a:rPr>
-                <a:t>Behavior execution engine</a:t>
-              </a:r>
-              <a:endParaRPr lang="en-US" sz="1400" dirty="0">
-                <a:solidFill>
-                  <a:schemeClr val="tx1"/>
-                </a:solidFill>
-              </a:endParaRPr>
-            </a:p>
-          </p:txBody>
-        </p:sp>
-        <p:sp>
-          <p:nvSpPr>
-            <p:cNvPr id="59" name="正方形/長方形 58"/>
-            <p:cNvSpPr/>
-            <p:nvPr/>
-          </p:nvSpPr>
-          <p:spPr>
-            <a:xfrm>
-              <a:off x="6618048" y="3034440"/>
-              <a:ext cx="1120445" cy="454927"/>
-            </a:xfrm>
-            <a:prstGeom prst="rect">
-              <a:avLst/>
-            </a:prstGeom>
-            <a:solidFill>
-              <a:schemeClr val="bg1"/>
-            </a:solidFill>
-          </p:spPr>
-          <p:style>
-            <a:lnRef idx="2">
-              <a:schemeClr val="dk1">
-                <a:shade val="50000"/>
-              </a:schemeClr>
-            </a:lnRef>
-            <a:fillRef idx="1">
-              <a:schemeClr val="dk1"/>
-            </a:fillRef>
-            <a:effectRef idx="0">
-              <a:schemeClr val="dk1"/>
-            </a:effectRef>
-            <a:fontRef idx="minor">
-              <a:schemeClr val="lt1"/>
-            </a:fontRef>
-          </p:style>
-          <p:txBody>
-            <a:bodyPr rtlCol="0" anchor="ctr"/>
-            <a:lstStyle/>
-            <a:p>
-              <a:pPr algn="ctr"/>
-              <a:r>
-                <a:rPr lang="en-US" sz="1400" dirty="0" smtClean="0">
-                  <a:solidFill>
-                    <a:schemeClr val="tx1"/>
-                  </a:solidFill>
-                </a:rPr>
-                <a:t>Contex</a:t>
-              </a:r>
-              <a:r>
-                <a:rPr lang="en-US" sz="1400" dirty="0" smtClean="0">
-                  <a:solidFill>
-                    <a:schemeClr val="tx1"/>
-                  </a:solidFill>
-                </a:rPr>
-                <a:t>t orchestrator</a:t>
-              </a:r>
-              <a:endParaRPr lang="en-US" sz="1400" dirty="0">
-                <a:solidFill>
-                  <a:schemeClr val="tx1"/>
-                </a:solidFill>
-              </a:endParaRPr>
-            </a:p>
-          </p:txBody>
-        </p:sp>
-        <p:sp>
-          <p:nvSpPr>
-            <p:cNvPr id="60" name="正方形/長方形 59"/>
-            <p:cNvSpPr/>
-            <p:nvPr/>
-          </p:nvSpPr>
-          <p:spPr>
-            <a:xfrm>
-              <a:off x="6619523" y="2322814"/>
-              <a:ext cx="1165945" cy="465653"/>
-            </a:xfrm>
-            <a:prstGeom prst="rect">
-              <a:avLst/>
-            </a:prstGeom>
-            <a:solidFill>
-              <a:schemeClr val="bg1"/>
-            </a:solidFill>
-          </p:spPr>
-          <p:style>
-            <a:lnRef idx="2">
-              <a:schemeClr val="dk1">
-                <a:shade val="50000"/>
-              </a:schemeClr>
-            </a:lnRef>
-            <a:fillRef idx="1">
-              <a:schemeClr val="dk1"/>
-            </a:fillRef>
-            <a:effectRef idx="0">
-              <a:schemeClr val="dk1"/>
-            </a:effectRef>
-            <a:fontRef idx="minor">
-              <a:schemeClr val="lt1"/>
-            </a:fontRef>
-          </p:style>
-          <p:txBody>
-            <a:bodyPr rtlCol="0" anchor="ctr"/>
-            <a:lstStyle/>
-            <a:p>
-              <a:pPr algn="ctr"/>
-              <a:r>
-                <a:rPr lang="en-US" sz="1400" dirty="0" smtClean="0">
-                  <a:solidFill>
-                    <a:schemeClr val="tx1"/>
-                  </a:solidFill>
-                </a:rPr>
-                <a:t>Embedded web server</a:t>
-              </a:r>
-              <a:endParaRPr lang="en-US" sz="1400" dirty="0">
-                <a:solidFill>
-                  <a:schemeClr val="tx1"/>
-                </a:solidFill>
-              </a:endParaRPr>
-            </a:p>
-          </p:txBody>
-        </p:sp>
-        <p:sp>
-          <p:nvSpPr>
-            <p:cNvPr id="64" name="テキスト ボックス 63"/>
-            <p:cNvSpPr txBox="1"/>
-            <p:nvPr/>
-          </p:nvSpPr>
-          <p:spPr>
-            <a:xfrm>
-              <a:off x="7571144" y="3503567"/>
-              <a:ext cx="1960921" cy="307777"/>
-            </a:xfrm>
-            <a:prstGeom prst="rect">
-              <a:avLst/>
-            </a:prstGeom>
-            <a:noFill/>
-          </p:spPr>
-          <p:txBody>
-            <a:bodyPr wrap="none" rtlCol="0">
-              <a:spAutoFit/>
-            </a:bodyPr>
-            <a:lstStyle/>
-            <a:p>
-              <a:r>
-                <a:rPr lang="en-US" sz="1400" dirty="0" smtClean="0"/>
-                <a:t>Application components</a:t>
-              </a:r>
-              <a:endParaRPr lang="en-US" sz="1400" dirty="0"/>
-            </a:p>
-          </p:txBody>
-        </p:sp>
-        <p:cxnSp>
-          <p:nvCxnSpPr>
-            <p:cNvPr id="66" name="直線矢印コネクタ 65"/>
-            <p:cNvCxnSpPr>
-              <a:stCxn id="54" idx="1"/>
-              <a:endCxn id="53" idx="3"/>
-            </p:cNvCxnSpPr>
-            <p:nvPr/>
-          </p:nvCxnSpPr>
-          <p:spPr>
-            <a:xfrm flipH="1">
-              <a:off x="9115009" y="2561004"/>
-              <a:ext cx="184629" cy="0"/>
-            </a:xfrm>
-            <a:prstGeom prst="straightConnector1">
-              <a:avLst/>
-            </a:prstGeom>
-            <a:ln>
-              <a:solidFill>
-                <a:schemeClr val="tx1"/>
-              </a:solidFill>
-              <a:headEnd type="stealth"/>
-              <a:tailEnd type="triangle"/>
-            </a:ln>
-          </p:spPr>
-          <p:style>
-            <a:lnRef idx="1">
-              <a:schemeClr val="accent1"/>
-            </a:lnRef>
-            <a:fillRef idx="0">
-              <a:schemeClr val="accent1"/>
-            </a:fillRef>
-            <a:effectRef idx="0">
-              <a:schemeClr val="accent1"/>
-            </a:effectRef>
-            <a:fontRef idx="minor">
-              <a:schemeClr val="tx1"/>
-            </a:fontRef>
-          </p:style>
-        </p:cxnSp>
-        <p:cxnSp>
-          <p:nvCxnSpPr>
-            <p:cNvPr id="70" name="直線矢印コネクタ 69"/>
-            <p:cNvCxnSpPr>
-              <a:stCxn id="53" idx="1"/>
-              <a:endCxn id="60" idx="3"/>
-            </p:cNvCxnSpPr>
-            <p:nvPr/>
-          </p:nvCxnSpPr>
-          <p:spPr>
-            <a:xfrm flipH="1" flipV="1">
-              <a:off x="7785468" y="2555641"/>
-              <a:ext cx="202734" cy="5363"/>
-            </a:xfrm>
-            <a:prstGeom prst="straightConnector1">
-              <a:avLst/>
-            </a:prstGeom>
-            <a:ln>
-              <a:solidFill>
-                <a:schemeClr val="tx1"/>
-              </a:solidFill>
-              <a:headEnd type="stealth"/>
-              <a:tailEnd type="triangle"/>
-            </a:ln>
-          </p:spPr>
-          <p:style>
-            <a:lnRef idx="1">
-              <a:schemeClr val="accent1"/>
-            </a:lnRef>
-            <a:fillRef idx="0">
-              <a:schemeClr val="accent1"/>
-            </a:fillRef>
-            <a:effectRef idx="0">
-              <a:schemeClr val="accent1"/>
-            </a:effectRef>
-            <a:fontRef idx="minor">
-              <a:schemeClr val="tx1"/>
-            </a:fontRef>
-          </p:style>
-        </p:cxnSp>
-        <p:cxnSp>
-          <p:nvCxnSpPr>
-            <p:cNvPr id="75" name="カギ線コネクタ 74"/>
-            <p:cNvCxnSpPr>
-              <a:stCxn id="59" idx="0"/>
-              <a:endCxn id="53" idx="2"/>
-            </p:cNvCxnSpPr>
-            <p:nvPr/>
-          </p:nvCxnSpPr>
-          <p:spPr>
-            <a:xfrm rot="5400000" flipH="1" flipV="1">
-              <a:off x="7741952" y="2224787"/>
-              <a:ext cx="245973" cy="1373335"/>
-            </a:xfrm>
-            <a:prstGeom prst="bentConnector3">
-              <a:avLst/>
-            </a:prstGeom>
-            <a:ln>
-              <a:solidFill>
-                <a:schemeClr val="tx1"/>
-              </a:solidFill>
-              <a:tailEnd type="triangle"/>
-            </a:ln>
-          </p:spPr>
-          <p:style>
-            <a:lnRef idx="1">
-              <a:schemeClr val="accent1"/>
-            </a:lnRef>
-            <a:fillRef idx="0">
-              <a:schemeClr val="accent1"/>
-            </a:fillRef>
-            <a:effectRef idx="0">
-              <a:schemeClr val="accent1"/>
-            </a:effectRef>
-            <a:fontRef idx="minor">
-              <a:schemeClr val="tx1"/>
-            </a:fontRef>
-          </p:style>
-        </p:cxnSp>
-        <p:cxnSp>
-          <p:nvCxnSpPr>
-            <p:cNvPr id="78" name="直線矢印コネクタ 77"/>
-            <p:cNvCxnSpPr>
-              <a:endCxn id="57" idx="1"/>
-            </p:cNvCxnSpPr>
-            <p:nvPr/>
-          </p:nvCxnSpPr>
-          <p:spPr>
-            <a:xfrm>
-              <a:off x="9299638" y="3256614"/>
-              <a:ext cx="115966" cy="1"/>
-            </a:xfrm>
-            <a:prstGeom prst="straightConnector1">
-              <a:avLst/>
-            </a:prstGeom>
-            <a:ln>
-              <a:solidFill>
-                <a:schemeClr val="tx1"/>
-              </a:solidFill>
-              <a:tailEnd type="triangle"/>
-            </a:ln>
-          </p:spPr>
-          <p:style>
-            <a:lnRef idx="1">
-              <a:schemeClr val="accent1"/>
-            </a:lnRef>
-            <a:fillRef idx="0">
-              <a:schemeClr val="accent1"/>
-            </a:fillRef>
-            <a:effectRef idx="0">
-              <a:schemeClr val="accent1"/>
-            </a:effectRef>
-            <a:fontRef idx="minor">
-              <a:schemeClr val="tx1"/>
-            </a:fontRef>
-          </p:style>
-        </p:cxnSp>
-      </p:grpSp>
-      <p:grpSp>
-        <p:nvGrpSpPr>
-          <p:cNvPr id="80" name="グループ化 79"/>
-          <p:cNvGrpSpPr/>
-          <p:nvPr/>
-        </p:nvGrpSpPr>
-        <p:grpSpPr>
-          <a:xfrm>
-            <a:off x="5552185" y="3891464"/>
-            <a:ext cx="4768764" cy="1426620"/>
-            <a:chOff x="5552186" y="1401804"/>
-            <a:chExt cx="4768764" cy="1664532"/>
-          </a:xfrm>
-        </p:grpSpPr>
-        <p:sp>
-          <p:nvSpPr>
-            <p:cNvPr id="81" name="正方形/長方形 80"/>
-            <p:cNvSpPr/>
-            <p:nvPr/>
-          </p:nvSpPr>
-          <p:spPr>
-            <a:xfrm>
-              <a:off x="6590923" y="1401804"/>
-              <a:ext cx="3730027" cy="752921"/>
-            </a:xfrm>
-            <a:prstGeom prst="rect">
-              <a:avLst/>
-            </a:prstGeom>
-            <a:solidFill>
-              <a:schemeClr val="bg1"/>
-            </a:solidFill>
-          </p:spPr>
-          <p:style>
-            <a:lnRef idx="2">
-              <a:schemeClr val="dk1">
-                <a:shade val="50000"/>
-              </a:schemeClr>
-            </a:lnRef>
-            <a:fillRef idx="1">
-              <a:schemeClr val="dk1"/>
-            </a:fillRef>
-            <a:effectRef idx="0">
-              <a:schemeClr val="dk1"/>
-            </a:effectRef>
-            <a:fontRef idx="minor">
-              <a:schemeClr val="lt1"/>
-            </a:fontRef>
-          </p:style>
-          <p:txBody>
-            <a:bodyPr rtlCol="0" anchor="ctr"/>
-            <a:lstStyle/>
-            <a:p>
-              <a:pPr algn="ctr"/>
-              <a:endParaRPr lang="en-US" dirty="0"/>
-            </a:p>
-          </p:txBody>
-        </p:sp>
-        <p:sp>
-          <p:nvSpPr>
-            <p:cNvPr id="82" name="正方形/長方形 81"/>
-            <p:cNvSpPr/>
-            <p:nvPr/>
-          </p:nvSpPr>
-          <p:spPr>
-            <a:xfrm>
-              <a:off x="7738494" y="1660944"/>
-              <a:ext cx="1060487" cy="397513"/>
-            </a:xfrm>
-            <a:prstGeom prst="rect">
-              <a:avLst/>
-            </a:prstGeom>
-            <a:solidFill>
-              <a:schemeClr val="bg1"/>
-            </a:solidFill>
-          </p:spPr>
-          <p:style>
-            <a:lnRef idx="2">
-              <a:schemeClr val="dk1">
-                <a:shade val="50000"/>
-              </a:schemeClr>
-            </a:lnRef>
-            <a:fillRef idx="1">
-              <a:schemeClr val="dk1"/>
-            </a:fillRef>
-            <a:effectRef idx="0">
-              <a:schemeClr val="dk1"/>
-            </a:effectRef>
-            <a:fontRef idx="minor">
-              <a:schemeClr val="lt1"/>
-            </a:fontRef>
-          </p:style>
-          <p:txBody>
-            <a:bodyPr rtlCol="0" anchor="ctr"/>
-            <a:lstStyle/>
-            <a:p>
-              <a:pPr algn="ctr"/>
-              <a:r>
-                <a:rPr lang="en-US" sz="1400" dirty="0" smtClean="0">
-                  <a:solidFill>
-                    <a:schemeClr val="tx1"/>
-                  </a:solidFill>
-                </a:rPr>
-                <a:t>Localization</a:t>
-              </a:r>
-              <a:endParaRPr lang="en-US" sz="1400" dirty="0">
-                <a:solidFill>
-                  <a:schemeClr val="tx1"/>
-                </a:solidFill>
-              </a:endParaRPr>
-            </a:p>
-          </p:txBody>
-        </p:sp>
-        <p:sp>
-          <p:nvSpPr>
-            <p:cNvPr id="83" name="正方形/長方形 82"/>
-            <p:cNvSpPr/>
-            <p:nvPr/>
-          </p:nvSpPr>
-          <p:spPr>
-            <a:xfrm>
-              <a:off x="8876847" y="1487292"/>
-              <a:ext cx="882790" cy="571165"/>
-            </a:xfrm>
-            <a:prstGeom prst="rect">
-              <a:avLst/>
-            </a:prstGeom>
-            <a:solidFill>
-              <a:schemeClr val="bg1"/>
-            </a:solidFill>
-          </p:spPr>
-          <p:style>
-            <a:lnRef idx="2">
-              <a:schemeClr val="dk1">
-                <a:shade val="50000"/>
-              </a:schemeClr>
-            </a:lnRef>
-            <a:fillRef idx="1">
-              <a:schemeClr val="dk1"/>
-            </a:fillRef>
-            <a:effectRef idx="0">
-              <a:schemeClr val="dk1"/>
-            </a:effectRef>
-            <a:fontRef idx="minor">
-              <a:schemeClr val="lt1"/>
-            </a:fontRef>
-          </p:style>
-          <p:txBody>
-            <a:bodyPr rtlCol="0" anchor="ctr"/>
-            <a:lstStyle/>
-            <a:p>
-              <a:pPr algn="ctr"/>
-              <a:r>
-                <a:rPr lang="en-US" sz="1400" dirty="0" smtClean="0">
-                  <a:solidFill>
-                    <a:schemeClr val="tx1"/>
-                  </a:solidFill>
-                </a:rPr>
-                <a:t>Robot interface</a:t>
-              </a:r>
-              <a:endParaRPr lang="en-US" sz="1400" dirty="0">
-                <a:solidFill>
-                  <a:schemeClr val="tx1"/>
-                </a:solidFill>
-              </a:endParaRPr>
-            </a:p>
-          </p:txBody>
-        </p:sp>
-        <p:sp>
-          <p:nvSpPr>
-            <p:cNvPr id="84" name="テキスト ボックス 83"/>
-            <p:cNvSpPr txBox="1"/>
-            <p:nvPr/>
-          </p:nvSpPr>
-          <p:spPr>
-            <a:xfrm>
-              <a:off x="5552186" y="2543116"/>
-              <a:ext cx="836383" cy="523220"/>
-            </a:xfrm>
-            <a:prstGeom prst="rect">
-              <a:avLst/>
-            </a:prstGeom>
-            <a:noFill/>
-          </p:spPr>
-          <p:txBody>
-            <a:bodyPr wrap="none" rtlCol="0">
-              <a:spAutoFit/>
-            </a:bodyPr>
-            <a:lstStyle/>
-            <a:p>
-              <a:r>
-                <a:rPr lang="en-US" sz="1400" dirty="0" smtClean="0"/>
-                <a:t>Web</a:t>
-              </a:r>
-            </a:p>
-            <a:p>
-              <a:r>
-                <a:rPr lang="en-US" sz="1400" dirty="0" smtClean="0"/>
-                <a:t>Interface</a:t>
-              </a:r>
-              <a:endParaRPr lang="en-US" sz="1400" dirty="0"/>
-            </a:p>
-          </p:txBody>
-        </p:sp>
-      </p:grpSp>
-      <p:sp>
-        <p:nvSpPr>
-          <p:cNvPr id="85" name="正方形/長方形 84"/>
-          <p:cNvSpPr/>
-          <p:nvPr/>
-        </p:nvSpPr>
-        <p:spPr>
-          <a:xfrm>
-            <a:off x="6650228" y="3977078"/>
-            <a:ext cx="1032710" cy="489528"/>
-          </a:xfrm>
-          <a:prstGeom prst="rect">
-            <a:avLst/>
-          </a:prstGeom>
-          <a:solidFill>
-            <a:schemeClr val="bg1"/>
-          </a:solidFill>
-        </p:spPr>
-        <p:style>
-          <a:lnRef idx="2">
-            <a:schemeClr val="dk1">
-              <a:shade val="50000"/>
-            </a:schemeClr>
-          </a:lnRef>
-          <a:fillRef idx="1">
-            <a:schemeClr val="dk1"/>
-          </a:fillRef>
-          <a:effectRef idx="0">
-            <a:schemeClr val="dk1"/>
-          </a:effectRef>
-          <a:fontRef idx="minor">
-            <a:schemeClr val="lt1"/>
-          </a:fontRef>
-        </p:style>
-        <p:txBody>
-          <a:bodyPr rtlCol="0" anchor="ctr"/>
-          <a:lstStyle/>
-          <a:p>
-            <a:pPr algn="ctr"/>
-            <a:r>
-              <a:rPr lang="en-US" sz="1400" dirty="0" smtClean="0">
-                <a:solidFill>
-                  <a:schemeClr val="tx1"/>
-                </a:solidFill>
-              </a:rPr>
-              <a:t>Motion recognition</a:t>
-            </a:r>
-            <a:endParaRPr lang="en-US" sz="1400" dirty="0">
-              <a:solidFill>
-                <a:schemeClr val="tx1"/>
-              </a:solidFill>
-            </a:endParaRPr>
-          </a:p>
-        </p:txBody>
-      </p:sp>
-      <p:sp>
-        <p:nvSpPr>
-          <p:cNvPr id="86" name="正方形/長方形 85"/>
-          <p:cNvSpPr/>
-          <p:nvPr/>
-        </p:nvSpPr>
-        <p:spPr>
-          <a:xfrm>
-            <a:off x="7651847" y="4849102"/>
-            <a:ext cx="1032710" cy="489528"/>
-          </a:xfrm>
-          <a:prstGeom prst="rect">
-            <a:avLst/>
-          </a:prstGeom>
-          <a:solidFill>
-            <a:schemeClr val="bg1"/>
-          </a:solidFill>
-        </p:spPr>
-        <p:style>
-          <a:lnRef idx="2">
-            <a:schemeClr val="dk1">
-              <a:shade val="50000"/>
-            </a:schemeClr>
-          </a:lnRef>
-          <a:fillRef idx="1">
-            <a:schemeClr val="dk1"/>
-          </a:fillRef>
-          <a:effectRef idx="0">
-            <a:schemeClr val="dk1"/>
-          </a:effectRef>
-          <a:fontRef idx="minor">
-            <a:schemeClr val="lt1"/>
-          </a:fontRef>
-        </p:style>
-        <p:txBody>
-          <a:bodyPr rtlCol="0" anchor="ctr"/>
-          <a:lstStyle/>
-          <a:p>
-            <a:pPr algn="ctr"/>
-            <a:r>
-              <a:rPr lang="en-US" sz="1400" dirty="0" smtClean="0">
-                <a:solidFill>
-                  <a:schemeClr val="tx1"/>
-                </a:solidFill>
-              </a:rPr>
-              <a:t>Speech recognition</a:t>
-            </a:r>
-            <a:endParaRPr lang="en-US" sz="1400" dirty="0">
-              <a:solidFill>
-                <a:schemeClr val="tx1"/>
-              </a:solidFill>
-            </a:endParaRPr>
-          </a:p>
-        </p:txBody>
-      </p:sp>
     </p:spTree>
     <p:extLst>
       <p:ext uri="{BB962C8B-B14F-4D97-AF65-F5344CB8AC3E}">

</xml_diff>